<commit_message>
Update template file according to project guidelines
</commit_message>
<xml_diff>
--- a/designs/template.pptx
+++ b/designs/template.pptx
@@ -6,6 +6,7 @@
   </p:sldMasterIdLst>
   <p:sldIdLst>
     <p:sldId id="256" r:id="rId2"/>
+    <p:sldId id="257" r:id="rId3"/>
   </p:sldIdLst>
   <p:sldSz cx="9144000" cy="6858000" type="screen4x3"/>
   <p:notesSz cx="6858000" cy="9144000"/>
@@ -134,11 +135,569 @@
       </a:defRPr>
     </a:lvl9pPr>
   </p:defaultTextStyle>
+  <p:extLst>
+    <p:ext uri="{EFAFB233-063F-42B5-8137-9DF3F51BA10A}">
+      <p15:sldGuideLst xmlns:p15="http://schemas.microsoft.com/office/powerpoint/2012/main"/>
+    </p:ext>
+  </p:extLst>
 </p:presentation>
 </file>
 
+<file path=ppt/revisionInfo.xml><?xml version="1.0" encoding="utf-8"?>
+<p1510:revInfo xmlns:a="http://schemas.openxmlformats.org/drawingml/2006/main" xmlns:r="http://schemas.openxmlformats.org/officeDocument/2006/relationships" xmlns:p1510="http://schemas.microsoft.com/office/powerpoint/2015/10/main">
+  <p1510:revLst>
+    <p1510:client id="{963ABBFF-F7DD-4FE6-94B3-BE82FF263172}" v="71" dt="2019-10-24T21:55:42.301"/>
+  </p1510:revLst>
+</p1510:revInfo>
+</file>
+
+<file path=ppt/changesInfos/changesInfo1.xml><?xml version="1.0" encoding="utf-8"?>
+<pc:chgInfo xmlns:a="http://schemas.openxmlformats.org/drawingml/2006/main" xmlns:r="http://schemas.openxmlformats.org/officeDocument/2006/relationships" xmlns:ac="http://schemas.microsoft.com/office/drawing/2013/main/command" xmlns:pc="http://schemas.microsoft.com/office/powerpoint/2013/main/command">
+  <pc:docChgLst>
+    <pc:chgData name="Still Hsu" userId="4ca04788c324ab33" providerId="LiveId" clId="{963ABBFF-F7DD-4FE6-94B3-BE82FF263172}"/>
+    <pc:docChg chg="undo custSel addSld modSld modMainMaster">
+      <pc:chgData name="Still Hsu" userId="4ca04788c324ab33" providerId="LiveId" clId="{963ABBFF-F7DD-4FE6-94B3-BE82FF263172}" dt="2019-10-24T21:55:42.301" v="84" actId="207"/>
+      <pc:docMkLst>
+        <pc:docMk/>
+      </pc:docMkLst>
+      <pc:sldChg chg="addSp delSp modSp">
+        <pc:chgData name="Still Hsu" userId="4ca04788c324ab33" providerId="LiveId" clId="{963ABBFF-F7DD-4FE6-94B3-BE82FF263172}" dt="2019-10-24T21:48:31.969" v="57"/>
+        <pc:sldMkLst>
+          <pc:docMk/>
+          <pc:sldMk cId="1613215182" sldId="256"/>
+        </pc:sldMkLst>
+        <pc:spChg chg="del">
+          <ac:chgData name="Still Hsu" userId="4ca04788c324ab33" providerId="LiveId" clId="{963ABBFF-F7DD-4FE6-94B3-BE82FF263172}" dt="2019-10-24T21:48:31.969" v="57"/>
+          <ac:spMkLst>
+            <pc:docMk/>
+            <pc:sldMk cId="1613215182" sldId="256"/>
+            <ac:spMk id="2" creationId="{72A8166A-D275-4B50-B6D8-0DB938661C24}"/>
+          </ac:spMkLst>
+        </pc:spChg>
+        <pc:spChg chg="del">
+          <ac:chgData name="Still Hsu" userId="4ca04788c324ab33" providerId="LiveId" clId="{963ABBFF-F7DD-4FE6-94B3-BE82FF263172}" dt="2019-10-24T21:48:31.969" v="57"/>
+          <ac:spMkLst>
+            <pc:docMk/>
+            <pc:sldMk cId="1613215182" sldId="256"/>
+            <ac:spMk id="3" creationId="{42345507-6B03-439E-AB52-1CA92735FE45}"/>
+          </ac:spMkLst>
+        </pc:spChg>
+        <pc:spChg chg="add mod">
+          <ac:chgData name="Still Hsu" userId="4ca04788c324ab33" providerId="LiveId" clId="{963ABBFF-F7DD-4FE6-94B3-BE82FF263172}" dt="2019-10-24T21:48:31.969" v="57"/>
+          <ac:spMkLst>
+            <pc:docMk/>
+            <pc:sldMk cId="1613215182" sldId="256"/>
+            <ac:spMk id="4" creationId="{52F908BB-5702-4587-89C3-7C3DDEAEA015}"/>
+          </ac:spMkLst>
+        </pc:spChg>
+        <pc:spChg chg="add mod">
+          <ac:chgData name="Still Hsu" userId="4ca04788c324ab33" providerId="LiveId" clId="{963ABBFF-F7DD-4FE6-94B3-BE82FF263172}" dt="2019-10-24T21:48:31.969" v="57"/>
+          <ac:spMkLst>
+            <pc:docMk/>
+            <pc:sldMk cId="1613215182" sldId="256"/>
+            <ac:spMk id="5" creationId="{2FCEBE0E-A91A-4635-85E1-701CCE0309DA}"/>
+          </ac:spMkLst>
+        </pc:spChg>
+      </pc:sldChg>
+      <pc:sldChg chg="addSp delSp modSp new mod modClrScheme chgLayout">
+        <pc:chgData name="Still Hsu" userId="4ca04788c324ab33" providerId="LiveId" clId="{963ABBFF-F7DD-4FE6-94B3-BE82FF263172}" dt="2019-10-24T21:48:34.804" v="58"/>
+        <pc:sldMkLst>
+          <pc:docMk/>
+          <pc:sldMk cId="3529637247" sldId="257"/>
+        </pc:sldMkLst>
+        <pc:spChg chg="del mod ord">
+          <ac:chgData name="Still Hsu" userId="4ca04788c324ab33" providerId="LiveId" clId="{963ABBFF-F7DD-4FE6-94B3-BE82FF263172}" dt="2019-10-24T21:41:21.104" v="7" actId="700"/>
+          <ac:spMkLst>
+            <pc:docMk/>
+            <pc:sldMk cId="3529637247" sldId="257"/>
+            <ac:spMk id="2" creationId="{8AC56822-8724-421F-BDD0-6A2089A93360}"/>
+          </ac:spMkLst>
+        </pc:spChg>
+        <pc:spChg chg="add del mod ord">
+          <ac:chgData name="Still Hsu" userId="4ca04788c324ab33" providerId="LiveId" clId="{963ABBFF-F7DD-4FE6-94B3-BE82FF263172}" dt="2019-10-24T21:48:34.804" v="58"/>
+          <ac:spMkLst>
+            <pc:docMk/>
+            <pc:sldMk cId="3529637247" sldId="257"/>
+            <ac:spMk id="3" creationId="{3EEFE02E-9973-4B14-83B7-82B51872FA08}"/>
+          </ac:spMkLst>
+        </pc:spChg>
+        <pc:spChg chg="add del mod ord">
+          <ac:chgData name="Still Hsu" userId="4ca04788c324ab33" providerId="LiveId" clId="{963ABBFF-F7DD-4FE6-94B3-BE82FF263172}" dt="2019-10-24T21:48:34.804" v="58"/>
+          <ac:spMkLst>
+            <pc:docMk/>
+            <pc:sldMk cId="3529637247" sldId="257"/>
+            <ac:spMk id="4" creationId="{A075CD6F-1513-454D-ABBF-E241E0EE245C}"/>
+          </ac:spMkLst>
+        </pc:spChg>
+        <pc:spChg chg="add mod">
+          <ac:chgData name="Still Hsu" userId="4ca04788c324ab33" providerId="LiveId" clId="{963ABBFF-F7DD-4FE6-94B3-BE82FF263172}" dt="2019-10-24T21:48:34.804" v="58"/>
+          <ac:spMkLst>
+            <pc:docMk/>
+            <pc:sldMk cId="3529637247" sldId="257"/>
+            <ac:spMk id="5" creationId="{648E6F83-A0E3-42C4-A32B-E38810AEDD6A}"/>
+          </ac:spMkLst>
+        </pc:spChg>
+        <pc:spChg chg="add mod">
+          <ac:chgData name="Still Hsu" userId="4ca04788c324ab33" providerId="LiveId" clId="{963ABBFF-F7DD-4FE6-94B3-BE82FF263172}" dt="2019-10-24T21:48:34.804" v="58"/>
+          <ac:spMkLst>
+            <pc:docMk/>
+            <pc:sldMk cId="3529637247" sldId="257"/>
+            <ac:spMk id="6" creationId="{42B3B4AD-2EA0-4969-A183-69F15BF76F66}"/>
+          </ac:spMkLst>
+        </pc:spChg>
+      </pc:sldChg>
+      <pc:sldMasterChg chg="modSp addSldLayout delSldLayout modSldLayout sldLayoutOrd">
+        <pc:chgData name="Still Hsu" userId="4ca04788c324ab33" providerId="LiveId" clId="{963ABBFF-F7DD-4FE6-94B3-BE82FF263172}" dt="2019-10-24T21:55:42.301" v="84" actId="207"/>
+        <pc:sldMasterMkLst>
+          <pc:docMk/>
+          <pc:sldMasterMk cId="490527102" sldId="2147483672"/>
+        </pc:sldMasterMkLst>
+        <pc:spChg chg="mod">
+          <ac:chgData name="Still Hsu" userId="4ca04788c324ab33" providerId="LiveId" clId="{963ABBFF-F7DD-4FE6-94B3-BE82FF263172}" dt="2019-10-24T21:42:02.963" v="20" actId="403"/>
+          <ac:spMkLst>
+            <pc:docMk/>
+            <pc:sldMasterMk cId="490527102" sldId="2147483672"/>
+            <ac:spMk id="15362" creationId="{00000000-0000-0000-0000-000000000000}"/>
+          </ac:spMkLst>
+        </pc:spChg>
+        <pc:spChg chg="mod">
+          <ac:chgData name="Still Hsu" userId="4ca04788c324ab33" providerId="LiveId" clId="{963ABBFF-F7DD-4FE6-94B3-BE82FF263172}" dt="2019-10-24T21:41:57.220" v="15" actId="404"/>
+          <ac:spMkLst>
+            <pc:docMk/>
+            <pc:sldMasterMk cId="490527102" sldId="2147483672"/>
+            <ac:spMk id="15363" creationId="{00000000-0000-0000-0000-000000000000}"/>
+          </ac:spMkLst>
+        </pc:spChg>
+        <pc:sldLayoutChg chg="addSp delSp modSp">
+          <pc:chgData name="Still Hsu" userId="4ca04788c324ab33" providerId="LiveId" clId="{963ABBFF-F7DD-4FE6-94B3-BE82FF263172}" dt="2019-10-24T21:50:21.113" v="60" actId="113"/>
+          <pc:sldLayoutMkLst>
+            <pc:docMk/>
+            <pc:sldMasterMk cId="490527102" sldId="2147483672"/>
+            <pc:sldLayoutMk cId="3640921868" sldId="2147483673"/>
+          </pc:sldLayoutMkLst>
+          <pc:spChg chg="add">
+            <ac:chgData name="Still Hsu" userId="4ca04788c324ab33" providerId="LiveId" clId="{963ABBFF-F7DD-4FE6-94B3-BE82FF263172}" dt="2019-10-24T21:46:15.648" v="37"/>
+            <ac:spMkLst>
+              <pc:docMk/>
+              <pc:sldMasterMk cId="490527102" sldId="2147483672"/>
+              <pc:sldLayoutMk cId="3640921868" sldId="2147483673"/>
+              <ac:spMk id="10" creationId="{E7D4FC3C-1D88-474A-A6BF-E9EE21D82F64}"/>
+            </ac:spMkLst>
+          </pc:spChg>
+          <pc:spChg chg="add">
+            <ac:chgData name="Still Hsu" userId="4ca04788c324ab33" providerId="LiveId" clId="{963ABBFF-F7DD-4FE6-94B3-BE82FF263172}" dt="2019-10-24T21:46:15.648" v="37"/>
+            <ac:spMkLst>
+              <pc:docMk/>
+              <pc:sldMasterMk cId="490527102" sldId="2147483672"/>
+              <pc:sldLayoutMk cId="3640921868" sldId="2147483673"/>
+              <ac:spMk id="11" creationId="{CAFA7AD7-7079-46BB-9512-95E1C1C93A4C}"/>
+            </ac:spMkLst>
+          </pc:spChg>
+          <pc:spChg chg="add">
+            <ac:chgData name="Still Hsu" userId="4ca04788c324ab33" providerId="LiveId" clId="{963ABBFF-F7DD-4FE6-94B3-BE82FF263172}" dt="2019-10-24T21:46:15.648" v="37"/>
+            <ac:spMkLst>
+              <pc:docMk/>
+              <pc:sldMasterMk cId="490527102" sldId="2147483672"/>
+              <pc:sldLayoutMk cId="3640921868" sldId="2147483673"/>
+              <ac:spMk id="12" creationId="{2F2D1EAF-5811-4EF4-BFE6-BADE17C860A0}"/>
+            </ac:spMkLst>
+          </pc:spChg>
+          <pc:spChg chg="add mod">
+            <ac:chgData name="Still Hsu" userId="4ca04788c324ab33" providerId="LiveId" clId="{963ABBFF-F7DD-4FE6-94B3-BE82FF263172}" dt="2019-10-24T21:50:19.673" v="59" actId="113"/>
+            <ac:spMkLst>
+              <pc:docMk/>
+              <pc:sldMasterMk cId="490527102" sldId="2147483672"/>
+              <pc:sldLayoutMk cId="3640921868" sldId="2147483673"/>
+              <ac:spMk id="13" creationId="{F93C8682-563B-4AEA-9CC7-EA0EF506A6CD}"/>
+            </ac:spMkLst>
+          </pc:spChg>
+          <pc:spChg chg="add mod">
+            <ac:chgData name="Still Hsu" userId="4ca04788c324ab33" providerId="LiveId" clId="{963ABBFF-F7DD-4FE6-94B3-BE82FF263172}" dt="2019-10-24T21:50:21.113" v="60" actId="113"/>
+            <ac:spMkLst>
+              <pc:docMk/>
+              <pc:sldMasterMk cId="490527102" sldId="2147483672"/>
+              <pc:sldLayoutMk cId="3640921868" sldId="2147483673"/>
+              <ac:spMk id="14" creationId="{478357BF-44C4-425C-8EEB-7C10941A69C3}"/>
+            </ac:spMkLst>
+          </pc:spChg>
+          <pc:spChg chg="del mod">
+            <ac:chgData name="Still Hsu" userId="4ca04788c324ab33" providerId="LiveId" clId="{963ABBFF-F7DD-4FE6-94B3-BE82FF263172}" dt="2019-10-24T21:46:14.996" v="36" actId="478"/>
+            <ac:spMkLst>
+              <pc:docMk/>
+              <pc:sldMasterMk cId="490527102" sldId="2147483672"/>
+              <pc:sldLayoutMk cId="3640921868" sldId="2147483673"/>
+              <ac:spMk id="16386" creationId="{00000000-0000-0000-0000-000000000000}"/>
+            </ac:spMkLst>
+          </pc:spChg>
+          <pc:spChg chg="del mod">
+            <ac:chgData name="Still Hsu" userId="4ca04788c324ab33" providerId="LiveId" clId="{963ABBFF-F7DD-4FE6-94B3-BE82FF263172}" dt="2019-10-24T21:46:14.996" v="36" actId="478"/>
+            <ac:spMkLst>
+              <pc:docMk/>
+              <pc:sldMasterMk cId="490527102" sldId="2147483672"/>
+              <pc:sldLayoutMk cId="3640921868" sldId="2147483673"/>
+              <ac:spMk id="16387" creationId="{00000000-0000-0000-0000-000000000000}"/>
+            </ac:spMkLst>
+          </pc:spChg>
+          <pc:spChg chg="del">
+            <ac:chgData name="Still Hsu" userId="4ca04788c324ab33" providerId="LiveId" clId="{963ABBFF-F7DD-4FE6-94B3-BE82FF263172}" dt="2019-10-24T21:46:14.996" v="36" actId="478"/>
+            <ac:spMkLst>
+              <pc:docMk/>
+              <pc:sldMasterMk cId="490527102" sldId="2147483672"/>
+              <pc:sldLayoutMk cId="3640921868" sldId="2147483673"/>
+              <ac:spMk id="16392" creationId="{00000000-0000-0000-0000-000000000000}"/>
+            </ac:spMkLst>
+          </pc:spChg>
+          <pc:spChg chg="del">
+            <ac:chgData name="Still Hsu" userId="4ca04788c324ab33" providerId="LiveId" clId="{963ABBFF-F7DD-4FE6-94B3-BE82FF263172}" dt="2019-10-24T21:46:14.996" v="36" actId="478"/>
+            <ac:spMkLst>
+              <pc:docMk/>
+              <pc:sldMasterMk cId="490527102" sldId="2147483672"/>
+              <pc:sldLayoutMk cId="3640921868" sldId="2147483673"/>
+              <ac:spMk id="16393" creationId="{00000000-0000-0000-0000-000000000000}"/>
+            </ac:spMkLst>
+          </pc:spChg>
+          <pc:spChg chg="del">
+            <ac:chgData name="Still Hsu" userId="4ca04788c324ab33" providerId="LiveId" clId="{963ABBFF-F7DD-4FE6-94B3-BE82FF263172}" dt="2019-10-24T21:46:14.996" v="36" actId="478"/>
+            <ac:spMkLst>
+              <pc:docMk/>
+              <pc:sldMasterMk cId="490527102" sldId="2147483672"/>
+              <pc:sldLayoutMk cId="3640921868" sldId="2147483673"/>
+              <ac:spMk id="16394" creationId="{00000000-0000-0000-0000-000000000000}"/>
+            </ac:spMkLst>
+          </pc:spChg>
+        </pc:sldLayoutChg>
+        <pc:sldLayoutChg chg="modSp">
+          <pc:chgData name="Still Hsu" userId="4ca04788c324ab33" providerId="LiveId" clId="{963ABBFF-F7DD-4FE6-94B3-BE82FF263172}" dt="2019-10-24T21:52:36.913" v="63" actId="404"/>
+          <pc:sldLayoutMkLst>
+            <pc:docMk/>
+            <pc:sldMasterMk cId="490527102" sldId="2147483672"/>
+            <pc:sldLayoutMk cId="1404864942" sldId="2147483674"/>
+          </pc:sldLayoutMkLst>
+          <pc:spChg chg="mod">
+            <ac:chgData name="Still Hsu" userId="4ca04788c324ab33" providerId="LiveId" clId="{963ABBFF-F7DD-4FE6-94B3-BE82FF263172}" dt="2019-10-24T21:52:36.913" v="63" actId="404"/>
+            <ac:spMkLst>
+              <pc:docMk/>
+              <pc:sldMasterMk cId="490527102" sldId="2147483672"/>
+              <pc:sldLayoutMk cId="1404864942" sldId="2147483674"/>
+              <ac:spMk id="3" creationId="{00000000-0000-0000-0000-000000000000}"/>
+            </ac:spMkLst>
+          </pc:spChg>
+        </pc:sldLayoutChg>
+        <pc:sldLayoutChg chg="delSp modSp del">
+          <pc:chgData name="Still Hsu" userId="4ca04788c324ab33" providerId="LiveId" clId="{963ABBFF-F7DD-4FE6-94B3-BE82FF263172}" dt="2019-10-24T21:47:15.359" v="48" actId="2696"/>
+          <pc:sldLayoutMkLst>
+            <pc:docMk/>
+            <pc:sldMasterMk cId="490527102" sldId="2147483672"/>
+            <pc:sldLayoutMk cId="2864600874" sldId="2147483675"/>
+          </pc:sldLayoutMkLst>
+          <pc:spChg chg="mod">
+            <ac:chgData name="Still Hsu" userId="4ca04788c324ab33" providerId="LiveId" clId="{963ABBFF-F7DD-4FE6-94B3-BE82FF263172}" dt="2019-10-24T21:46:56.846" v="45" actId="14100"/>
+            <ac:spMkLst>
+              <pc:docMk/>
+              <pc:sldMasterMk cId="490527102" sldId="2147483672"/>
+              <pc:sldLayoutMk cId="2864600874" sldId="2147483675"/>
+              <ac:spMk id="2" creationId="{00000000-0000-0000-0000-000000000000}"/>
+            </ac:spMkLst>
+          </pc:spChg>
+          <pc:spChg chg="del">
+            <ac:chgData name="Still Hsu" userId="4ca04788c324ab33" providerId="LiveId" clId="{963ABBFF-F7DD-4FE6-94B3-BE82FF263172}" dt="2019-10-24T21:46:40.495" v="41" actId="478"/>
+            <ac:spMkLst>
+              <pc:docMk/>
+              <pc:sldMasterMk cId="490527102" sldId="2147483672"/>
+              <pc:sldLayoutMk cId="2864600874" sldId="2147483675"/>
+              <ac:spMk id="3" creationId="{00000000-0000-0000-0000-000000000000}"/>
+            </ac:spMkLst>
+          </pc:spChg>
+        </pc:sldLayoutChg>
+        <pc:sldLayoutChg chg="addSp delSp modSp add del mod ord modTransition">
+          <pc:chgData name="Still Hsu" userId="4ca04788c324ab33" providerId="LiveId" clId="{963ABBFF-F7DD-4FE6-94B3-BE82FF263172}" dt="2019-10-24T21:46:16.954" v="38" actId="2696"/>
+          <pc:sldLayoutMkLst>
+            <pc:docMk/>
+            <pc:sldMasterMk cId="490527102" sldId="2147483672"/>
+            <pc:sldLayoutMk cId="1676160343" sldId="2147483686"/>
+          </pc:sldLayoutMkLst>
+          <pc:spChg chg="add del mod">
+            <ac:chgData name="Still Hsu" userId="4ca04788c324ab33" providerId="LiveId" clId="{963ABBFF-F7DD-4FE6-94B3-BE82FF263172}" dt="2019-10-24T21:45:50.609" v="30" actId="478"/>
+            <ac:spMkLst>
+              <pc:docMk/>
+              <pc:sldMasterMk cId="490527102" sldId="2147483672"/>
+              <pc:sldLayoutMk cId="1676160343" sldId="2147483686"/>
+              <ac:spMk id="10" creationId="{6D9406CE-7AD9-4E1B-B9AA-4225B66AB9F2}"/>
+            </ac:spMkLst>
+          </pc:spChg>
+          <pc:spChg chg="add">
+            <ac:chgData name="Still Hsu" userId="4ca04788c324ab33" providerId="LiveId" clId="{963ABBFF-F7DD-4FE6-94B3-BE82FF263172}" dt="2019-10-24T21:45:43.314" v="29"/>
+            <ac:spMkLst>
+              <pc:docMk/>
+              <pc:sldMasterMk cId="490527102" sldId="2147483672"/>
+              <pc:sldLayoutMk cId="1676160343" sldId="2147483686"/>
+              <ac:spMk id="11" creationId="{4CEEC8E9-5A43-42CD-B4B9-6C39E136CC2E}"/>
+            </ac:spMkLst>
+          </pc:spChg>
+          <pc:spChg chg="add">
+            <ac:chgData name="Still Hsu" userId="4ca04788c324ab33" providerId="LiveId" clId="{963ABBFF-F7DD-4FE6-94B3-BE82FF263172}" dt="2019-10-24T21:45:43.314" v="29"/>
+            <ac:spMkLst>
+              <pc:docMk/>
+              <pc:sldMasterMk cId="490527102" sldId="2147483672"/>
+              <pc:sldLayoutMk cId="1676160343" sldId="2147483686"/>
+              <ac:spMk id="12" creationId="{C119B825-3282-4974-814F-83FCE640B23C}"/>
+            </ac:spMkLst>
+          </pc:spChg>
+          <pc:spChg chg="add">
+            <ac:chgData name="Still Hsu" userId="4ca04788c324ab33" providerId="LiveId" clId="{963ABBFF-F7DD-4FE6-94B3-BE82FF263172}" dt="2019-10-24T21:45:43.314" v="29"/>
+            <ac:spMkLst>
+              <pc:docMk/>
+              <pc:sldMasterMk cId="490527102" sldId="2147483672"/>
+              <pc:sldLayoutMk cId="1676160343" sldId="2147483686"/>
+              <ac:spMk id="13" creationId="{4F55FCC2-8E54-4D23-B880-630A835CA1FD}"/>
+            </ac:spMkLst>
+          </pc:spChg>
+          <pc:spChg chg="add mod">
+            <ac:chgData name="Still Hsu" userId="4ca04788c324ab33" providerId="LiveId" clId="{963ABBFF-F7DD-4FE6-94B3-BE82FF263172}" dt="2019-10-24T21:45:56.444" v="32" actId="255"/>
+            <ac:spMkLst>
+              <pc:docMk/>
+              <pc:sldMasterMk cId="490527102" sldId="2147483672"/>
+              <pc:sldLayoutMk cId="1676160343" sldId="2147483686"/>
+              <ac:spMk id="14" creationId="{71B9AEDB-BCFF-4C29-8411-B045D13536D5}"/>
+            </ac:spMkLst>
+          </pc:spChg>
+          <pc:spChg chg="add mod">
+            <ac:chgData name="Still Hsu" userId="4ca04788c324ab33" providerId="LiveId" clId="{963ABBFF-F7DD-4FE6-94B3-BE82FF263172}" dt="2019-10-24T21:45:58.920" v="33" actId="255"/>
+            <ac:spMkLst>
+              <pc:docMk/>
+              <pc:sldMasterMk cId="490527102" sldId="2147483672"/>
+              <pc:sldLayoutMk cId="1676160343" sldId="2147483686"/>
+              <ac:spMk id="15" creationId="{130AB885-D2CB-47A9-97DA-501A8006F729}"/>
+            </ac:spMkLst>
+          </pc:spChg>
+          <pc:spChg chg="del mod">
+            <ac:chgData name="Still Hsu" userId="4ca04788c324ab33" providerId="LiveId" clId="{963ABBFF-F7DD-4FE6-94B3-BE82FF263172}" dt="2019-10-24T21:45:50.609" v="30" actId="478"/>
+            <ac:spMkLst>
+              <pc:docMk/>
+              <pc:sldMasterMk cId="490527102" sldId="2147483672"/>
+              <pc:sldLayoutMk cId="1676160343" sldId="2147483686"/>
+              <ac:spMk id="16386" creationId="{00000000-0000-0000-0000-000000000000}"/>
+            </ac:spMkLst>
+          </pc:spChg>
+          <pc:spChg chg="del">
+            <ac:chgData name="Still Hsu" userId="4ca04788c324ab33" providerId="LiveId" clId="{963ABBFF-F7DD-4FE6-94B3-BE82FF263172}" dt="2019-10-24T21:40:01.259" v="2" actId="478"/>
+            <ac:spMkLst>
+              <pc:docMk/>
+              <pc:sldMasterMk cId="490527102" sldId="2147483672"/>
+              <pc:sldLayoutMk cId="1676160343" sldId="2147483686"/>
+              <ac:spMk id="16387" creationId="{00000000-0000-0000-0000-000000000000}"/>
+            </ac:spMkLst>
+          </pc:spChg>
+          <pc:spChg chg="del">
+            <ac:chgData name="Still Hsu" userId="4ca04788c324ab33" providerId="LiveId" clId="{963ABBFF-F7DD-4FE6-94B3-BE82FF263172}" dt="2019-10-24T21:45:42.695" v="28" actId="478"/>
+            <ac:spMkLst>
+              <pc:docMk/>
+              <pc:sldMasterMk cId="490527102" sldId="2147483672"/>
+              <pc:sldLayoutMk cId="1676160343" sldId="2147483686"/>
+              <ac:spMk id="16392" creationId="{00000000-0000-0000-0000-000000000000}"/>
+            </ac:spMkLst>
+          </pc:spChg>
+          <pc:spChg chg="del">
+            <ac:chgData name="Still Hsu" userId="4ca04788c324ab33" providerId="LiveId" clId="{963ABBFF-F7DD-4FE6-94B3-BE82FF263172}" dt="2019-10-24T21:45:42.695" v="28" actId="478"/>
+            <ac:spMkLst>
+              <pc:docMk/>
+              <pc:sldMasterMk cId="490527102" sldId="2147483672"/>
+              <pc:sldLayoutMk cId="1676160343" sldId="2147483686"/>
+              <ac:spMk id="16393" creationId="{00000000-0000-0000-0000-000000000000}"/>
+            </ac:spMkLst>
+          </pc:spChg>
+          <pc:spChg chg="del">
+            <ac:chgData name="Still Hsu" userId="4ca04788c324ab33" providerId="LiveId" clId="{963ABBFF-F7DD-4FE6-94B3-BE82FF263172}" dt="2019-10-24T21:45:42.695" v="28" actId="478"/>
+            <ac:spMkLst>
+              <pc:docMk/>
+              <pc:sldMasterMk cId="490527102" sldId="2147483672"/>
+              <pc:sldLayoutMk cId="1676160343" sldId="2147483686"/>
+              <ac:spMk id="16394" creationId="{00000000-0000-0000-0000-000000000000}"/>
+            </ac:spMkLst>
+          </pc:spChg>
+        </pc:sldLayoutChg>
+        <pc:sldLayoutChg chg="addSp delSp modSp add mod modTransition">
+          <pc:chgData name="Still Hsu" userId="4ca04788c324ab33" providerId="LiveId" clId="{963ABBFF-F7DD-4FE6-94B3-BE82FF263172}" dt="2019-10-24T21:50:28.468" v="62" actId="113"/>
+          <pc:sldLayoutMkLst>
+            <pc:docMk/>
+            <pc:sldMasterMk cId="490527102" sldId="2147483672"/>
+            <pc:sldLayoutMk cId="4205653529" sldId="2147483687"/>
+          </pc:sldLayoutMkLst>
+          <pc:spChg chg="add mod">
+            <ac:chgData name="Still Hsu" userId="4ca04788c324ab33" providerId="LiveId" clId="{963ABBFF-F7DD-4FE6-94B3-BE82FF263172}" dt="2019-10-24T21:50:25.042" v="61" actId="113"/>
+            <ac:spMkLst>
+              <pc:docMk/>
+              <pc:sldMasterMk cId="490527102" sldId="2147483672"/>
+              <pc:sldLayoutMk cId="4205653529" sldId="2147483687"/>
+              <ac:spMk id="10" creationId="{2AED8E50-C875-4879-BFC0-E7BF0E4386BE}"/>
+            </ac:spMkLst>
+          </pc:spChg>
+          <pc:spChg chg="mod">
+            <ac:chgData name="Still Hsu" userId="4ca04788c324ab33" providerId="LiveId" clId="{963ABBFF-F7DD-4FE6-94B3-BE82FF263172}" dt="2019-10-24T21:50:25.042" v="61" actId="113"/>
+            <ac:spMkLst>
+              <pc:docMk/>
+              <pc:sldMasterMk cId="490527102" sldId="2147483672"/>
+              <pc:sldLayoutMk cId="4205653529" sldId="2147483687"/>
+              <ac:spMk id="11" creationId="{4CEEC8E9-5A43-42CD-B4B9-6C39E136CC2E}"/>
+            </ac:spMkLst>
+          </pc:spChg>
+          <pc:spChg chg="mod">
+            <ac:chgData name="Still Hsu" userId="4ca04788c324ab33" providerId="LiveId" clId="{963ABBFF-F7DD-4FE6-94B3-BE82FF263172}" dt="2019-10-24T21:50:25.042" v="61" actId="113"/>
+            <ac:spMkLst>
+              <pc:docMk/>
+              <pc:sldMasterMk cId="490527102" sldId="2147483672"/>
+              <pc:sldLayoutMk cId="4205653529" sldId="2147483687"/>
+              <ac:spMk id="12" creationId="{C119B825-3282-4974-814F-83FCE640B23C}"/>
+            </ac:spMkLst>
+          </pc:spChg>
+          <pc:spChg chg="mod">
+            <ac:chgData name="Still Hsu" userId="4ca04788c324ab33" providerId="LiveId" clId="{963ABBFF-F7DD-4FE6-94B3-BE82FF263172}" dt="2019-10-24T21:50:25.042" v="61" actId="113"/>
+            <ac:spMkLst>
+              <pc:docMk/>
+              <pc:sldMasterMk cId="490527102" sldId="2147483672"/>
+              <pc:sldLayoutMk cId="4205653529" sldId="2147483687"/>
+              <ac:spMk id="13" creationId="{4F55FCC2-8E54-4D23-B880-630A835CA1FD}"/>
+            </ac:spMkLst>
+          </pc:spChg>
+          <pc:spChg chg="mod">
+            <ac:chgData name="Still Hsu" userId="4ca04788c324ab33" providerId="LiveId" clId="{963ABBFF-F7DD-4FE6-94B3-BE82FF263172}" dt="2019-10-24T21:50:28.468" v="62" actId="113"/>
+            <ac:spMkLst>
+              <pc:docMk/>
+              <pc:sldMasterMk cId="490527102" sldId="2147483672"/>
+              <pc:sldLayoutMk cId="4205653529" sldId="2147483687"/>
+              <ac:spMk id="14" creationId="{71B9AEDB-BCFF-4C29-8411-B045D13536D5}"/>
+            </ac:spMkLst>
+          </pc:spChg>
+          <pc:spChg chg="del">
+            <ac:chgData name="Still Hsu" userId="4ca04788c324ab33" providerId="LiveId" clId="{963ABBFF-F7DD-4FE6-94B3-BE82FF263172}" dt="2019-10-24T21:46:28.570" v="39" actId="478"/>
+            <ac:spMkLst>
+              <pc:docMk/>
+              <pc:sldMasterMk cId="490527102" sldId="2147483672"/>
+              <pc:sldLayoutMk cId="4205653529" sldId="2147483687"/>
+              <ac:spMk id="15" creationId="{130AB885-D2CB-47A9-97DA-501A8006F729}"/>
+            </ac:spMkLst>
+          </pc:spChg>
+          <pc:spChg chg="mod">
+            <ac:chgData name="Still Hsu" userId="4ca04788c324ab33" providerId="LiveId" clId="{963ABBFF-F7DD-4FE6-94B3-BE82FF263172}" dt="2019-10-24T21:50:25.042" v="61" actId="113"/>
+            <ac:spMkLst>
+              <pc:docMk/>
+              <pc:sldMasterMk cId="490527102" sldId="2147483672"/>
+              <pc:sldLayoutMk cId="4205653529" sldId="2147483687"/>
+              <ac:spMk id="16388" creationId="{00000000-0000-0000-0000-000000000000}"/>
+            </ac:spMkLst>
+          </pc:spChg>
+          <pc:spChg chg="mod">
+            <ac:chgData name="Still Hsu" userId="4ca04788c324ab33" providerId="LiveId" clId="{963ABBFF-F7DD-4FE6-94B3-BE82FF263172}" dt="2019-10-24T21:50:25.042" v="61" actId="113"/>
+            <ac:spMkLst>
+              <pc:docMk/>
+              <pc:sldMasterMk cId="490527102" sldId="2147483672"/>
+              <pc:sldLayoutMk cId="4205653529" sldId="2147483687"/>
+              <ac:spMk id="16389" creationId="{00000000-0000-0000-0000-000000000000}"/>
+            </ac:spMkLst>
+          </pc:spChg>
+          <pc:spChg chg="mod">
+            <ac:chgData name="Still Hsu" userId="4ca04788c324ab33" providerId="LiveId" clId="{963ABBFF-F7DD-4FE6-94B3-BE82FF263172}" dt="2019-10-24T21:50:25.042" v="61" actId="113"/>
+            <ac:spMkLst>
+              <pc:docMk/>
+              <pc:sldMasterMk cId="490527102" sldId="2147483672"/>
+              <pc:sldLayoutMk cId="4205653529" sldId="2147483687"/>
+              <ac:spMk id="16390" creationId="{00000000-0000-0000-0000-000000000000}"/>
+            </ac:spMkLst>
+          </pc:spChg>
+        </pc:sldLayoutChg>
+        <pc:sldLayoutChg chg="modSp add mod modTransition">
+          <pc:chgData name="Still Hsu" userId="4ca04788c324ab33" providerId="LiveId" clId="{963ABBFF-F7DD-4FE6-94B3-BE82FF263172}" dt="2019-10-24T21:47:51.509" v="56" actId="122"/>
+          <pc:sldLayoutMkLst>
+            <pc:docMk/>
+            <pc:sldMasterMk cId="490527102" sldId="2147483672"/>
+            <pc:sldLayoutMk cId="4161327237" sldId="2147483688"/>
+          </pc:sldLayoutMkLst>
+          <pc:spChg chg="mod">
+            <ac:chgData name="Still Hsu" userId="4ca04788c324ab33" providerId="LiveId" clId="{963ABBFF-F7DD-4FE6-94B3-BE82FF263172}" dt="2019-10-24T21:47:51.509" v="56" actId="122"/>
+            <ac:spMkLst>
+              <pc:docMk/>
+              <pc:sldMasterMk cId="490527102" sldId="2147483672"/>
+              <pc:sldLayoutMk cId="4161327237" sldId="2147483688"/>
+              <ac:spMk id="2" creationId="{00000000-0000-0000-0000-000000000000}"/>
+            </ac:spMkLst>
+          </pc:spChg>
+        </pc:sldLayoutChg>
+        <pc:sldLayoutChg chg="delSp modSp add del mod ord modTransition">
+          <pc:chgData name="Still Hsu" userId="4ca04788c324ab33" providerId="LiveId" clId="{963ABBFF-F7DD-4FE6-94B3-BE82FF263172}" dt="2019-10-24T21:54:25.644" v="65" actId="2696"/>
+          <pc:sldLayoutMkLst>
+            <pc:docMk/>
+            <pc:sldMasterMk cId="490527102" sldId="2147483672"/>
+            <pc:sldLayoutMk cId="495915112" sldId="2147483689"/>
+          </pc:sldLayoutMkLst>
+          <pc:spChg chg="mod">
+            <ac:chgData name="Still Hsu" userId="4ca04788c324ab33" providerId="LiveId" clId="{963ABBFF-F7DD-4FE6-94B3-BE82FF263172}" dt="2019-10-24T21:47:41.173" v="55" actId="113"/>
+            <ac:spMkLst>
+              <pc:docMk/>
+              <pc:sldMasterMk cId="490527102" sldId="2147483672"/>
+              <pc:sldLayoutMk cId="495915112" sldId="2147483689"/>
+              <ac:spMk id="13" creationId="{F93C8682-563B-4AEA-9CC7-EA0EF506A6CD}"/>
+            </ac:spMkLst>
+          </pc:spChg>
+          <pc:spChg chg="del">
+            <ac:chgData name="Still Hsu" userId="4ca04788c324ab33" providerId="LiveId" clId="{963ABBFF-F7DD-4FE6-94B3-BE82FF263172}" dt="2019-10-24T21:47:31.040" v="52" actId="478"/>
+            <ac:spMkLst>
+              <pc:docMk/>
+              <pc:sldMasterMk cId="490527102" sldId="2147483672"/>
+              <pc:sldLayoutMk cId="495915112" sldId="2147483689"/>
+              <ac:spMk id="14" creationId="{478357BF-44C4-425C-8EEB-7C10941A69C3}"/>
+            </ac:spMkLst>
+          </pc:spChg>
+        </pc:sldLayoutChg>
+        <pc:sldLayoutChg chg="add mod modTransition">
+          <pc:chgData name="Still Hsu" userId="4ca04788c324ab33" providerId="LiveId" clId="{963ABBFF-F7DD-4FE6-94B3-BE82FF263172}" dt="2019-10-24T21:54:18.910" v="64" actId="2890"/>
+          <pc:sldLayoutMkLst>
+            <pc:docMk/>
+            <pc:sldMasterMk cId="490527102" sldId="2147483672"/>
+            <pc:sldLayoutMk cId="869585866" sldId="2147483690"/>
+          </pc:sldLayoutMkLst>
+        </pc:sldLayoutChg>
+        <pc:sldLayoutChg chg="modSp add mod ord modTransition">
+          <pc:chgData name="Still Hsu" userId="4ca04788c324ab33" providerId="LiveId" clId="{963ABBFF-F7DD-4FE6-94B3-BE82FF263172}" dt="2019-10-24T21:55:42.301" v="84" actId="207"/>
+          <pc:sldLayoutMkLst>
+            <pc:docMk/>
+            <pc:sldMasterMk cId="490527102" sldId="2147483672"/>
+            <pc:sldLayoutMk cId="3382031660" sldId="2147483691"/>
+          </pc:sldLayoutMkLst>
+          <pc:spChg chg="mod">
+            <ac:chgData name="Still Hsu" userId="4ca04788c324ab33" providerId="LiveId" clId="{963ABBFF-F7DD-4FE6-94B3-BE82FF263172}" dt="2019-10-24T21:55:42.301" v="84" actId="207"/>
+            <ac:spMkLst>
+              <pc:docMk/>
+              <pc:sldMasterMk cId="490527102" sldId="2147483672"/>
+              <pc:sldLayoutMk cId="3382031660" sldId="2147483691"/>
+              <ac:spMk id="13" creationId="{F93C8682-563B-4AEA-9CC7-EA0EF506A6CD}"/>
+            </ac:spMkLst>
+          </pc:spChg>
+          <pc:spChg chg="mod">
+            <ac:chgData name="Still Hsu" userId="4ca04788c324ab33" providerId="LiveId" clId="{963ABBFF-F7DD-4FE6-94B3-BE82FF263172}" dt="2019-10-24T21:55:30.382" v="82" actId="14100"/>
+            <ac:spMkLst>
+              <pc:docMk/>
+              <pc:sldMasterMk cId="490527102" sldId="2147483672"/>
+              <pc:sldLayoutMk cId="3382031660" sldId="2147483691"/>
+              <ac:spMk id="14" creationId="{478357BF-44C4-425C-8EEB-7C10941A69C3}"/>
+            </ac:spMkLst>
+          </pc:spChg>
+        </pc:sldLayoutChg>
+        <pc:sldLayoutChg chg="add del mod modTransition">
+          <pc:chgData name="Still Hsu" userId="4ca04788c324ab33" providerId="LiveId" clId="{963ABBFF-F7DD-4FE6-94B3-BE82FF263172}" dt="2019-10-24T21:54:31.115" v="69" actId="2890"/>
+          <pc:sldLayoutMkLst>
+            <pc:docMk/>
+            <pc:sldMasterMk cId="490527102" sldId="2147483672"/>
+            <pc:sldLayoutMk cId="3693393627" sldId="2147483692"/>
+          </pc:sldLayoutMkLst>
+        </pc:sldLayoutChg>
+      </pc:sldMasterChg>
+    </pc:docChg>
+  </pc:docChgLst>
+</pc:chgInfo>
+</file>
+
 <file path=ppt/slideLayouts/slideLayout1.xml><?xml version="1.0" encoding="utf-8"?>
-<p:sldLayout xmlns:a="http://schemas.openxmlformats.org/drawingml/2006/main" xmlns:r="http://schemas.openxmlformats.org/officeDocument/2006/relationships" xmlns:p="http://schemas.openxmlformats.org/presentationml/2006/main" showMasterSp="0" type="title" preserve="1">
+<p:sldLayout xmlns:a="http://schemas.openxmlformats.org/drawingml/2006/main" xmlns:r="http://schemas.openxmlformats.org/officeDocument/2006/relationships" xmlns:p="http://schemas.openxmlformats.org/presentationml/2006/main" showMasterSp="0" preserve="1" userDrawn="1">
   <p:cSld name="標題投影片">
     <p:spTree>
       <p:nvGrpSpPr>
@@ -156,74 +715,6 @@
       </p:grpSpPr>
       <p:sp>
         <p:nvSpPr>
-          <p:cNvPr id="16386" name="Rectangle 2"/>
-          <p:cNvSpPr>
-            <a:spLocks noGrp="1" noChangeArrowheads="1"/>
-          </p:cNvSpPr>
-          <p:nvPr>
-            <p:ph type="ctrTitle"/>
-          </p:nvPr>
-        </p:nvSpPr>
-        <p:spPr>
-          <a:xfrm>
-            <a:off x="685800" y="685800"/>
-            <a:ext cx="7772400" cy="2127250"/>
-          </a:xfrm>
-        </p:spPr>
-        <p:txBody>
-          <a:bodyPr/>
-          <a:lstStyle>
-            <a:lvl1pPr algn="ctr">
-              <a:defRPr sz="5800"/>
-            </a:lvl1pPr>
-          </a:lstStyle>
-          <a:p>
-            <a:pPr lvl="0"/>
-            <a:r>
-              <a:rPr lang="en-US" altLang="zh-TW" noProof="0"/>
-              <a:t>Click to edit Master title style</a:t>
-            </a:r>
-            <a:endParaRPr lang="en-US" noProof="0" dirty="0"/>
-          </a:p>
-        </p:txBody>
-      </p:sp>
-      <p:sp>
-        <p:nvSpPr>
-          <p:cNvPr id="16387" name="Rectangle 3"/>
-          <p:cNvSpPr>
-            <a:spLocks noGrp="1" noChangeArrowheads="1"/>
-          </p:cNvSpPr>
-          <p:nvPr>
-            <p:ph type="subTitle" idx="1"/>
-          </p:nvPr>
-        </p:nvSpPr>
-        <p:spPr>
-          <a:xfrm>
-            <a:off x="1371600" y="3270250"/>
-            <a:ext cx="6400800" cy="2209800"/>
-          </a:xfrm>
-        </p:spPr>
-        <p:txBody>
-          <a:bodyPr/>
-          <a:lstStyle>
-            <a:lvl1pPr marL="0" indent="0" algn="ctr">
-              <a:buFont typeface="Wingdings" pitchFamily="2" charset="2"/>
-              <a:buNone/>
-              <a:defRPr sz="3000"/>
-            </a:lvl1pPr>
-          </a:lstStyle>
-          <a:p>
-            <a:pPr lvl="0"/>
-            <a:r>
-              <a:rPr lang="en-US" altLang="zh-TW" noProof="0"/>
-              <a:t>Click to edit Master subtitle style</a:t>
-            </a:r>
-            <a:endParaRPr lang="en-US" noProof="0"/>
-          </a:p>
-        </p:txBody>
-      </p:sp>
-      <p:sp>
-        <p:nvSpPr>
           <p:cNvPr id="16388" name="Rectangle 4"/>
           <p:cNvSpPr>
             <a:spLocks noGrp="1" noChangeArrowheads="1"/>
@@ -243,7 +734,7 @@
           <a:p>
             <a:fld id="{6DF925A2-9B04-41AD-AF8B-82A5F4D315EC}" type="datetimeFigureOut">
               <a:rPr lang="en-US" smtClean="0"/>
-              <a:t>9/12/2019</a:t>
+              <a:t>10/25/2019</a:t>
             </a:fld>
             <a:endParaRPr lang="en-US"/>
           </a:p>
@@ -301,15 +792,21 @@
       </p:sp>
       <p:sp>
         <p:nvSpPr>
-          <p:cNvPr id="16392" name="Rectangle 8" descr="Gold bar"/>
+          <p:cNvPr id="10" name="Rectangle 8" descr="Gold bar">
+            <a:extLst>
+              <a:ext uri="{FF2B5EF4-FFF2-40B4-BE49-F238E27FC236}">
+                <a16:creationId xmlns:a16="http://schemas.microsoft.com/office/drawing/2014/main" id="{E7D4FC3C-1D88-474A-A6BF-E9EE21D82F64}"/>
+              </a:ext>
+            </a:extLst>
+          </p:cNvPr>
           <p:cNvSpPr>
             <a:spLocks noChangeArrowheads="1"/>
           </p:cNvSpPr>
-          <p:nvPr/>
+          <p:nvPr userDrawn="1"/>
         </p:nvSpPr>
         <p:spPr bwMode="auto">
           <a:xfrm>
-            <a:off x="228600" y="2889250"/>
+            <a:off x="228600" y="2420888"/>
             <a:ext cx="2870200" cy="201613"/>
           </a:xfrm>
           <a:prstGeom prst="rect">
@@ -354,15 +851,21 @@
       </p:sp>
       <p:sp>
         <p:nvSpPr>
-          <p:cNvPr id="16393" name="Rectangle 9" descr="Orange bar"/>
+          <p:cNvPr id="11" name="Rectangle 9" descr="Orange bar">
+            <a:extLst>
+              <a:ext uri="{FF2B5EF4-FFF2-40B4-BE49-F238E27FC236}">
+                <a16:creationId xmlns:a16="http://schemas.microsoft.com/office/drawing/2014/main" id="{CAFA7AD7-7079-46BB-9512-95E1C1C93A4C}"/>
+              </a:ext>
+            </a:extLst>
+          </p:cNvPr>
           <p:cNvSpPr>
             <a:spLocks noChangeArrowheads="1"/>
           </p:cNvSpPr>
-          <p:nvPr/>
+          <p:nvPr userDrawn="1"/>
         </p:nvSpPr>
         <p:spPr bwMode="auto">
           <a:xfrm>
-            <a:off x="3098800" y="2889250"/>
+            <a:off x="3098800" y="2420888"/>
             <a:ext cx="2870200" cy="201613"/>
           </a:xfrm>
           <a:prstGeom prst="rect">
@@ -407,15 +910,21 @@
       </p:sp>
       <p:sp>
         <p:nvSpPr>
-          <p:cNvPr id="16394" name="Rectangle 10" descr="Slate bar"/>
+          <p:cNvPr id="12" name="Rectangle 10" descr="Slate bar">
+            <a:extLst>
+              <a:ext uri="{FF2B5EF4-FFF2-40B4-BE49-F238E27FC236}">
+                <a16:creationId xmlns:a16="http://schemas.microsoft.com/office/drawing/2014/main" id="{2F2D1EAF-5811-4EF4-BFE6-BADE17C860A0}"/>
+              </a:ext>
+            </a:extLst>
+          </p:cNvPr>
           <p:cNvSpPr>
             <a:spLocks noChangeArrowheads="1"/>
           </p:cNvSpPr>
-          <p:nvPr/>
+          <p:nvPr userDrawn="1"/>
         </p:nvSpPr>
         <p:spPr bwMode="auto">
           <a:xfrm>
-            <a:off x="5969000" y="2889250"/>
+            <a:off x="5969000" y="2420888"/>
             <a:ext cx="2870200" cy="201613"/>
           </a:xfrm>
           <a:prstGeom prst="rect">
@@ -458,6 +967,86 @@
           </a:p>
         </p:txBody>
       </p:sp>
+      <p:sp>
+        <p:nvSpPr>
+          <p:cNvPr id="13" name="Rectangle 2">
+            <a:extLst>
+              <a:ext uri="{FF2B5EF4-FFF2-40B4-BE49-F238E27FC236}">
+                <a16:creationId xmlns:a16="http://schemas.microsoft.com/office/drawing/2014/main" id="{F93C8682-563B-4AEA-9CC7-EA0EF506A6CD}"/>
+              </a:ext>
+            </a:extLst>
+          </p:cNvPr>
+          <p:cNvSpPr>
+            <a:spLocks noGrp="1" noChangeArrowheads="1"/>
+          </p:cNvSpPr>
+          <p:nvPr>
+            <p:ph type="ctrTitle"/>
+          </p:nvPr>
+        </p:nvSpPr>
+        <p:spPr>
+          <a:xfrm>
+            <a:off x="685800" y="685800"/>
+            <a:ext cx="7772400" cy="1735088"/>
+          </a:xfrm>
+        </p:spPr>
+        <p:txBody>
+          <a:bodyPr/>
+          <a:lstStyle>
+            <a:lvl1pPr algn="ctr">
+              <a:defRPr sz="4400" b="1"/>
+            </a:lvl1pPr>
+          </a:lstStyle>
+          <a:p>
+            <a:pPr lvl="0"/>
+            <a:r>
+              <a:rPr lang="zh-TW" altLang="en-US" noProof="0" dirty="0"/>
+              <a:t>按一下以編輯母片標題樣式</a:t>
+            </a:r>
+            <a:endParaRPr lang="en-US" noProof="0" dirty="0"/>
+          </a:p>
+        </p:txBody>
+      </p:sp>
+      <p:sp>
+        <p:nvSpPr>
+          <p:cNvPr id="14" name="Rectangle 3">
+            <a:extLst>
+              <a:ext uri="{FF2B5EF4-FFF2-40B4-BE49-F238E27FC236}">
+                <a16:creationId xmlns:a16="http://schemas.microsoft.com/office/drawing/2014/main" id="{478357BF-44C4-425C-8EEB-7C10941A69C3}"/>
+              </a:ext>
+            </a:extLst>
+          </p:cNvPr>
+          <p:cNvSpPr>
+            <a:spLocks noGrp="1" noChangeArrowheads="1"/>
+          </p:cNvSpPr>
+          <p:nvPr>
+            <p:ph type="subTitle" idx="1"/>
+          </p:nvPr>
+        </p:nvSpPr>
+        <p:spPr>
+          <a:xfrm>
+            <a:off x="1371600" y="3270250"/>
+            <a:ext cx="6400800" cy="2209800"/>
+          </a:xfrm>
+        </p:spPr>
+        <p:txBody>
+          <a:bodyPr/>
+          <a:lstStyle>
+            <a:lvl1pPr marL="0" indent="0" algn="ctr">
+              <a:buFont typeface="Wingdings" pitchFamily="2" charset="2"/>
+              <a:buNone/>
+              <a:defRPr sz="4000" b="1"/>
+            </a:lvl1pPr>
+          </a:lstStyle>
+          <a:p>
+            <a:pPr lvl="0"/>
+            <a:r>
+              <a:rPr lang="zh-TW" altLang="en-US" noProof="0" dirty="0"/>
+              <a:t>按一下以編輯母片副標題樣式</a:t>
+            </a:r>
+            <a:endParaRPr lang="en-US" noProof="0" dirty="0"/>
+          </a:p>
+        </p:txBody>
+      </p:sp>
     </p:spTree>
     <p:extLst>
       <p:ext uri="{BB962C8B-B14F-4D97-AF65-F5344CB8AC3E}">
@@ -472,6 +1061,671 @@
 </file>
 
 <file path=ppt/slideLayouts/slideLayout10.xml><?xml version="1.0" encoding="utf-8"?>
+<p:sldLayout xmlns:a="http://schemas.openxmlformats.org/drawingml/2006/main" xmlns:r="http://schemas.openxmlformats.org/officeDocument/2006/relationships" xmlns:p="http://schemas.openxmlformats.org/presentationml/2006/main" type="blank" preserve="1">
+  <p:cSld name="空白">
+    <p:spTree>
+      <p:nvGrpSpPr>
+        <p:cNvPr id="1" name=""/>
+        <p:cNvGrpSpPr/>
+        <p:nvPr/>
+      </p:nvGrpSpPr>
+      <p:grpSpPr>
+        <a:xfrm>
+          <a:off x="0" y="0"/>
+          <a:ext cx="0" cy="0"/>
+          <a:chOff x="0" y="0"/>
+          <a:chExt cx="0" cy="0"/>
+        </a:xfrm>
+      </p:grpSpPr>
+      <p:sp>
+        <p:nvSpPr>
+          <p:cNvPr id="2" name="Date Placeholder 1"/>
+          <p:cNvSpPr>
+            <a:spLocks noGrp="1"/>
+          </p:cNvSpPr>
+          <p:nvPr>
+            <p:ph type="dt" sz="half" idx="10"/>
+          </p:nvPr>
+        </p:nvSpPr>
+        <p:spPr/>
+        <p:txBody>
+          <a:bodyPr/>
+          <a:lstStyle>
+            <a:lvl1pPr>
+              <a:defRPr/>
+            </a:lvl1pPr>
+          </a:lstStyle>
+          <a:p>
+            <a:fld id="{6DF925A2-9B04-41AD-AF8B-82A5F4D315EC}" type="datetimeFigureOut">
+              <a:rPr lang="en-US" smtClean="0"/>
+              <a:t>10/25/2019</a:t>
+            </a:fld>
+            <a:endParaRPr lang="en-US"/>
+          </a:p>
+        </p:txBody>
+      </p:sp>
+      <p:sp>
+        <p:nvSpPr>
+          <p:cNvPr id="3" name="Footer Placeholder 2"/>
+          <p:cNvSpPr>
+            <a:spLocks noGrp="1"/>
+          </p:cNvSpPr>
+          <p:nvPr>
+            <p:ph type="ftr" sz="quarter" idx="11"/>
+          </p:nvPr>
+        </p:nvSpPr>
+        <p:spPr/>
+        <p:txBody>
+          <a:bodyPr/>
+          <a:lstStyle>
+            <a:lvl1pPr>
+              <a:defRPr/>
+            </a:lvl1pPr>
+          </a:lstStyle>
+          <a:p>
+            <a:endParaRPr lang="en-US"/>
+          </a:p>
+        </p:txBody>
+      </p:sp>
+      <p:sp>
+        <p:nvSpPr>
+          <p:cNvPr id="4" name="Slide Number Placeholder 3"/>
+          <p:cNvSpPr>
+            <a:spLocks noGrp="1"/>
+          </p:cNvSpPr>
+          <p:nvPr>
+            <p:ph type="sldNum" sz="quarter" idx="12"/>
+          </p:nvPr>
+        </p:nvSpPr>
+        <p:spPr/>
+        <p:txBody>
+          <a:bodyPr/>
+          <a:lstStyle>
+            <a:lvl1pPr>
+              <a:defRPr/>
+            </a:lvl1pPr>
+          </a:lstStyle>
+          <a:p>
+            <a:fld id="{9A950C51-85E1-4166-98BA-4226DDC92F1D}" type="slidenum">
+              <a:rPr lang="en-US" smtClean="0"/>
+              <a:t>‹#›</a:t>
+            </a:fld>
+            <a:endParaRPr lang="en-US"/>
+          </a:p>
+        </p:txBody>
+      </p:sp>
+    </p:spTree>
+    <p:extLst>
+      <p:ext uri="{BB962C8B-B14F-4D97-AF65-F5344CB8AC3E}">
+        <p14:creationId xmlns:p14="http://schemas.microsoft.com/office/powerpoint/2010/main" val="770823296"/>
+      </p:ext>
+    </p:extLst>
+  </p:cSld>
+  <p:clrMapOvr>
+    <a:masterClrMapping/>
+  </p:clrMapOvr>
+</p:sldLayout>
+</file>
+
+<file path=ppt/slideLayouts/slideLayout11.xml><?xml version="1.0" encoding="utf-8"?>
+<p:sldLayout xmlns:a="http://schemas.openxmlformats.org/drawingml/2006/main" xmlns:r="http://schemas.openxmlformats.org/officeDocument/2006/relationships" xmlns:p="http://schemas.openxmlformats.org/presentationml/2006/main" type="objTx" preserve="1">
+  <p:cSld name="含標題的內容">
+    <p:spTree>
+      <p:nvGrpSpPr>
+        <p:cNvPr id="1" name=""/>
+        <p:cNvGrpSpPr/>
+        <p:nvPr/>
+      </p:nvGrpSpPr>
+      <p:grpSpPr>
+        <a:xfrm>
+          <a:off x="0" y="0"/>
+          <a:ext cx="0" cy="0"/>
+          <a:chOff x="0" y="0"/>
+          <a:chExt cx="0" cy="0"/>
+        </a:xfrm>
+      </p:grpSpPr>
+      <p:sp>
+        <p:nvSpPr>
+          <p:cNvPr id="2" name="Title 1"/>
+          <p:cNvSpPr>
+            <a:spLocks noGrp="1"/>
+          </p:cNvSpPr>
+          <p:nvPr>
+            <p:ph type="title"/>
+          </p:nvPr>
+        </p:nvSpPr>
+        <p:spPr>
+          <a:xfrm>
+            <a:off x="457200" y="273050"/>
+            <a:ext cx="3008313" cy="1162050"/>
+          </a:xfrm>
+        </p:spPr>
+        <p:txBody>
+          <a:bodyPr/>
+          <a:lstStyle>
+            <a:lvl1pPr algn="l">
+              <a:defRPr sz="2000" b="1"/>
+            </a:lvl1pPr>
+          </a:lstStyle>
+          <a:p>
+            <a:r>
+              <a:rPr lang="en-US" altLang="zh-TW"/>
+              <a:t>Click to edit Master title style</a:t>
+            </a:r>
+            <a:endParaRPr lang="en-US"/>
+          </a:p>
+        </p:txBody>
+      </p:sp>
+      <p:sp>
+        <p:nvSpPr>
+          <p:cNvPr id="3" name="Content Placeholder 2"/>
+          <p:cNvSpPr>
+            <a:spLocks noGrp="1"/>
+          </p:cNvSpPr>
+          <p:nvPr>
+            <p:ph idx="1"/>
+          </p:nvPr>
+        </p:nvSpPr>
+        <p:spPr>
+          <a:xfrm>
+            <a:off x="3575050" y="273050"/>
+            <a:ext cx="5111750" cy="5853113"/>
+          </a:xfrm>
+        </p:spPr>
+        <p:txBody>
+          <a:bodyPr/>
+          <a:lstStyle>
+            <a:lvl1pPr>
+              <a:defRPr sz="3200"/>
+            </a:lvl1pPr>
+            <a:lvl2pPr>
+              <a:defRPr sz="2800"/>
+            </a:lvl2pPr>
+            <a:lvl3pPr>
+              <a:defRPr sz="2400"/>
+            </a:lvl3pPr>
+            <a:lvl4pPr>
+              <a:defRPr sz="2000"/>
+            </a:lvl4pPr>
+            <a:lvl5pPr>
+              <a:defRPr sz="2000"/>
+            </a:lvl5pPr>
+            <a:lvl6pPr>
+              <a:defRPr sz="2000"/>
+            </a:lvl6pPr>
+            <a:lvl7pPr>
+              <a:defRPr sz="2000"/>
+            </a:lvl7pPr>
+            <a:lvl8pPr>
+              <a:defRPr sz="2000"/>
+            </a:lvl8pPr>
+            <a:lvl9pPr>
+              <a:defRPr sz="2000"/>
+            </a:lvl9pPr>
+          </a:lstStyle>
+          <a:p>
+            <a:pPr lvl="0"/>
+            <a:r>
+              <a:rPr lang="en-US" altLang="zh-TW"/>
+              <a:t>Click to edit Master text styles</a:t>
+            </a:r>
+          </a:p>
+          <a:p>
+            <a:pPr lvl="1"/>
+            <a:r>
+              <a:rPr lang="en-US" altLang="zh-TW"/>
+              <a:t>Second level</a:t>
+            </a:r>
+          </a:p>
+          <a:p>
+            <a:pPr lvl="2"/>
+            <a:r>
+              <a:rPr lang="en-US" altLang="zh-TW"/>
+              <a:t>Third level</a:t>
+            </a:r>
+          </a:p>
+          <a:p>
+            <a:pPr lvl="3"/>
+            <a:r>
+              <a:rPr lang="en-US" altLang="zh-TW"/>
+              <a:t>Fourth level</a:t>
+            </a:r>
+          </a:p>
+          <a:p>
+            <a:pPr lvl="4"/>
+            <a:r>
+              <a:rPr lang="en-US" altLang="zh-TW"/>
+              <a:t>Fifth level</a:t>
+            </a:r>
+            <a:endParaRPr lang="en-US"/>
+          </a:p>
+        </p:txBody>
+      </p:sp>
+      <p:sp>
+        <p:nvSpPr>
+          <p:cNvPr id="4" name="Text Placeholder 3"/>
+          <p:cNvSpPr>
+            <a:spLocks noGrp="1"/>
+          </p:cNvSpPr>
+          <p:nvPr>
+            <p:ph type="body" sz="half" idx="2"/>
+          </p:nvPr>
+        </p:nvSpPr>
+        <p:spPr>
+          <a:xfrm>
+            <a:off x="457200" y="1435100"/>
+            <a:ext cx="3008313" cy="4691063"/>
+          </a:xfrm>
+        </p:spPr>
+        <p:txBody>
+          <a:bodyPr/>
+          <a:lstStyle>
+            <a:lvl1pPr marL="0" indent="0">
+              <a:buNone/>
+              <a:defRPr sz="1400"/>
+            </a:lvl1pPr>
+            <a:lvl2pPr marL="457200" indent="0">
+              <a:buNone/>
+              <a:defRPr sz="1200"/>
+            </a:lvl2pPr>
+            <a:lvl3pPr marL="914400" indent="0">
+              <a:buNone/>
+              <a:defRPr sz="1000"/>
+            </a:lvl3pPr>
+            <a:lvl4pPr marL="1371600" indent="0">
+              <a:buNone/>
+              <a:defRPr sz="900"/>
+            </a:lvl4pPr>
+            <a:lvl5pPr marL="1828800" indent="0">
+              <a:buNone/>
+              <a:defRPr sz="900"/>
+            </a:lvl5pPr>
+            <a:lvl6pPr marL="2286000" indent="0">
+              <a:buNone/>
+              <a:defRPr sz="900"/>
+            </a:lvl6pPr>
+            <a:lvl7pPr marL="2743200" indent="0">
+              <a:buNone/>
+              <a:defRPr sz="900"/>
+            </a:lvl7pPr>
+            <a:lvl8pPr marL="3200400" indent="0">
+              <a:buNone/>
+              <a:defRPr sz="900"/>
+            </a:lvl8pPr>
+            <a:lvl9pPr marL="3657600" indent="0">
+              <a:buNone/>
+              <a:defRPr sz="900"/>
+            </a:lvl9pPr>
+          </a:lstStyle>
+          <a:p>
+            <a:pPr lvl="0"/>
+            <a:r>
+              <a:rPr lang="en-US" altLang="zh-TW"/>
+              <a:t>Click to edit Master text styles</a:t>
+            </a:r>
+          </a:p>
+        </p:txBody>
+      </p:sp>
+      <p:sp>
+        <p:nvSpPr>
+          <p:cNvPr id="5" name="Date Placeholder 4"/>
+          <p:cNvSpPr>
+            <a:spLocks noGrp="1"/>
+          </p:cNvSpPr>
+          <p:nvPr>
+            <p:ph type="dt" sz="half" idx="10"/>
+          </p:nvPr>
+        </p:nvSpPr>
+        <p:spPr/>
+        <p:txBody>
+          <a:bodyPr/>
+          <a:lstStyle>
+            <a:lvl1pPr>
+              <a:defRPr/>
+            </a:lvl1pPr>
+          </a:lstStyle>
+          <a:p>
+            <a:fld id="{6DF925A2-9B04-41AD-AF8B-82A5F4D315EC}" type="datetimeFigureOut">
+              <a:rPr lang="en-US" smtClean="0"/>
+              <a:t>10/25/2019</a:t>
+            </a:fld>
+            <a:endParaRPr lang="en-US"/>
+          </a:p>
+        </p:txBody>
+      </p:sp>
+      <p:sp>
+        <p:nvSpPr>
+          <p:cNvPr id="6" name="Footer Placeholder 5"/>
+          <p:cNvSpPr>
+            <a:spLocks noGrp="1"/>
+          </p:cNvSpPr>
+          <p:nvPr>
+            <p:ph type="ftr" sz="quarter" idx="11"/>
+          </p:nvPr>
+        </p:nvSpPr>
+        <p:spPr/>
+        <p:txBody>
+          <a:bodyPr/>
+          <a:lstStyle>
+            <a:lvl1pPr>
+              <a:defRPr/>
+            </a:lvl1pPr>
+          </a:lstStyle>
+          <a:p>
+            <a:endParaRPr lang="en-US"/>
+          </a:p>
+        </p:txBody>
+      </p:sp>
+      <p:sp>
+        <p:nvSpPr>
+          <p:cNvPr id="7" name="Slide Number Placeholder 6"/>
+          <p:cNvSpPr>
+            <a:spLocks noGrp="1"/>
+          </p:cNvSpPr>
+          <p:nvPr>
+            <p:ph type="sldNum" sz="quarter" idx="12"/>
+          </p:nvPr>
+        </p:nvSpPr>
+        <p:spPr/>
+        <p:txBody>
+          <a:bodyPr/>
+          <a:lstStyle>
+            <a:lvl1pPr>
+              <a:defRPr/>
+            </a:lvl1pPr>
+          </a:lstStyle>
+          <a:p>
+            <a:fld id="{9A950C51-85E1-4166-98BA-4226DDC92F1D}" type="slidenum">
+              <a:rPr lang="en-US" smtClean="0"/>
+              <a:t>‹#›</a:t>
+            </a:fld>
+            <a:endParaRPr lang="en-US"/>
+          </a:p>
+        </p:txBody>
+      </p:sp>
+    </p:spTree>
+    <p:extLst>
+      <p:ext uri="{BB962C8B-B14F-4D97-AF65-F5344CB8AC3E}">
+        <p14:creationId xmlns:p14="http://schemas.microsoft.com/office/powerpoint/2010/main" val="872116414"/>
+      </p:ext>
+    </p:extLst>
+  </p:cSld>
+  <p:clrMapOvr>
+    <a:masterClrMapping/>
+  </p:clrMapOvr>
+</p:sldLayout>
+</file>
+
+<file path=ppt/slideLayouts/slideLayout12.xml><?xml version="1.0" encoding="utf-8"?>
+<p:sldLayout xmlns:a="http://schemas.openxmlformats.org/drawingml/2006/main" xmlns:r="http://schemas.openxmlformats.org/officeDocument/2006/relationships" xmlns:p="http://schemas.openxmlformats.org/presentationml/2006/main" type="picTx" preserve="1">
+  <p:cSld name="含標題的圖片">
+    <p:spTree>
+      <p:nvGrpSpPr>
+        <p:cNvPr id="1" name=""/>
+        <p:cNvGrpSpPr/>
+        <p:nvPr/>
+      </p:nvGrpSpPr>
+      <p:grpSpPr>
+        <a:xfrm>
+          <a:off x="0" y="0"/>
+          <a:ext cx="0" cy="0"/>
+          <a:chOff x="0" y="0"/>
+          <a:chExt cx="0" cy="0"/>
+        </a:xfrm>
+      </p:grpSpPr>
+      <p:sp>
+        <p:nvSpPr>
+          <p:cNvPr id="2" name="Title 1"/>
+          <p:cNvSpPr>
+            <a:spLocks noGrp="1"/>
+          </p:cNvSpPr>
+          <p:nvPr>
+            <p:ph type="title"/>
+          </p:nvPr>
+        </p:nvSpPr>
+        <p:spPr>
+          <a:xfrm>
+            <a:off x="1792288" y="4800600"/>
+            <a:ext cx="5486400" cy="566738"/>
+          </a:xfrm>
+        </p:spPr>
+        <p:txBody>
+          <a:bodyPr/>
+          <a:lstStyle>
+            <a:lvl1pPr algn="l">
+              <a:defRPr sz="2000" b="1"/>
+            </a:lvl1pPr>
+          </a:lstStyle>
+          <a:p>
+            <a:r>
+              <a:rPr lang="en-US" altLang="zh-TW"/>
+              <a:t>Click to edit Master title style</a:t>
+            </a:r>
+            <a:endParaRPr lang="en-US"/>
+          </a:p>
+        </p:txBody>
+      </p:sp>
+      <p:sp>
+        <p:nvSpPr>
+          <p:cNvPr id="3" name="Picture Placeholder 2"/>
+          <p:cNvSpPr>
+            <a:spLocks noGrp="1"/>
+          </p:cNvSpPr>
+          <p:nvPr>
+            <p:ph type="pic" idx="1"/>
+          </p:nvPr>
+        </p:nvSpPr>
+        <p:spPr>
+          <a:xfrm>
+            <a:off x="1792288" y="612775"/>
+            <a:ext cx="5486400" cy="4114800"/>
+          </a:xfrm>
+        </p:spPr>
+        <p:txBody>
+          <a:bodyPr/>
+          <a:lstStyle>
+            <a:lvl1pPr marL="0" indent="0">
+              <a:buNone/>
+              <a:defRPr sz="3200"/>
+            </a:lvl1pPr>
+            <a:lvl2pPr marL="457200" indent="0">
+              <a:buNone/>
+              <a:defRPr sz="2800"/>
+            </a:lvl2pPr>
+            <a:lvl3pPr marL="914400" indent="0">
+              <a:buNone/>
+              <a:defRPr sz="2400"/>
+            </a:lvl3pPr>
+            <a:lvl4pPr marL="1371600" indent="0">
+              <a:buNone/>
+              <a:defRPr sz="2000"/>
+            </a:lvl4pPr>
+            <a:lvl5pPr marL="1828800" indent="0">
+              <a:buNone/>
+              <a:defRPr sz="2000"/>
+            </a:lvl5pPr>
+            <a:lvl6pPr marL="2286000" indent="0">
+              <a:buNone/>
+              <a:defRPr sz="2000"/>
+            </a:lvl6pPr>
+            <a:lvl7pPr marL="2743200" indent="0">
+              <a:buNone/>
+              <a:defRPr sz="2000"/>
+            </a:lvl7pPr>
+            <a:lvl8pPr marL="3200400" indent="0">
+              <a:buNone/>
+              <a:defRPr sz="2000"/>
+            </a:lvl8pPr>
+            <a:lvl9pPr marL="3657600" indent="0">
+              <a:buNone/>
+              <a:defRPr sz="2000"/>
+            </a:lvl9pPr>
+          </a:lstStyle>
+          <a:p>
+            <a:r>
+              <a:rPr lang="en-US" altLang="zh-TW"/>
+              <a:t>Click icon to add picture</a:t>
+            </a:r>
+            <a:endParaRPr lang="en-US"/>
+          </a:p>
+        </p:txBody>
+      </p:sp>
+      <p:sp>
+        <p:nvSpPr>
+          <p:cNvPr id="4" name="Text Placeholder 3"/>
+          <p:cNvSpPr>
+            <a:spLocks noGrp="1"/>
+          </p:cNvSpPr>
+          <p:nvPr>
+            <p:ph type="body" sz="half" idx="2"/>
+          </p:nvPr>
+        </p:nvSpPr>
+        <p:spPr>
+          <a:xfrm>
+            <a:off x="1792288" y="5367338"/>
+            <a:ext cx="5486400" cy="804862"/>
+          </a:xfrm>
+        </p:spPr>
+        <p:txBody>
+          <a:bodyPr/>
+          <a:lstStyle>
+            <a:lvl1pPr marL="0" indent="0">
+              <a:buNone/>
+              <a:defRPr sz="1400"/>
+            </a:lvl1pPr>
+            <a:lvl2pPr marL="457200" indent="0">
+              <a:buNone/>
+              <a:defRPr sz="1200"/>
+            </a:lvl2pPr>
+            <a:lvl3pPr marL="914400" indent="0">
+              <a:buNone/>
+              <a:defRPr sz="1000"/>
+            </a:lvl3pPr>
+            <a:lvl4pPr marL="1371600" indent="0">
+              <a:buNone/>
+              <a:defRPr sz="900"/>
+            </a:lvl4pPr>
+            <a:lvl5pPr marL="1828800" indent="0">
+              <a:buNone/>
+              <a:defRPr sz="900"/>
+            </a:lvl5pPr>
+            <a:lvl6pPr marL="2286000" indent="0">
+              <a:buNone/>
+              <a:defRPr sz="900"/>
+            </a:lvl6pPr>
+            <a:lvl7pPr marL="2743200" indent="0">
+              <a:buNone/>
+              <a:defRPr sz="900"/>
+            </a:lvl7pPr>
+            <a:lvl8pPr marL="3200400" indent="0">
+              <a:buNone/>
+              <a:defRPr sz="900"/>
+            </a:lvl8pPr>
+            <a:lvl9pPr marL="3657600" indent="0">
+              <a:buNone/>
+              <a:defRPr sz="900"/>
+            </a:lvl9pPr>
+          </a:lstStyle>
+          <a:p>
+            <a:pPr lvl="0"/>
+            <a:r>
+              <a:rPr lang="en-US" altLang="zh-TW"/>
+              <a:t>Click to edit Master text styles</a:t>
+            </a:r>
+          </a:p>
+        </p:txBody>
+      </p:sp>
+      <p:sp>
+        <p:nvSpPr>
+          <p:cNvPr id="5" name="Date Placeholder 4"/>
+          <p:cNvSpPr>
+            <a:spLocks noGrp="1"/>
+          </p:cNvSpPr>
+          <p:nvPr>
+            <p:ph type="dt" sz="half" idx="10"/>
+          </p:nvPr>
+        </p:nvSpPr>
+        <p:spPr/>
+        <p:txBody>
+          <a:bodyPr/>
+          <a:lstStyle>
+            <a:lvl1pPr>
+              <a:defRPr/>
+            </a:lvl1pPr>
+          </a:lstStyle>
+          <a:p>
+            <a:fld id="{6DF925A2-9B04-41AD-AF8B-82A5F4D315EC}" type="datetimeFigureOut">
+              <a:rPr lang="en-US" smtClean="0"/>
+              <a:t>10/25/2019</a:t>
+            </a:fld>
+            <a:endParaRPr lang="en-US"/>
+          </a:p>
+        </p:txBody>
+      </p:sp>
+      <p:sp>
+        <p:nvSpPr>
+          <p:cNvPr id="6" name="Footer Placeholder 5"/>
+          <p:cNvSpPr>
+            <a:spLocks noGrp="1"/>
+          </p:cNvSpPr>
+          <p:nvPr>
+            <p:ph type="ftr" sz="quarter" idx="11"/>
+          </p:nvPr>
+        </p:nvSpPr>
+        <p:spPr/>
+        <p:txBody>
+          <a:bodyPr/>
+          <a:lstStyle>
+            <a:lvl1pPr>
+              <a:defRPr/>
+            </a:lvl1pPr>
+          </a:lstStyle>
+          <a:p>
+            <a:endParaRPr lang="en-US"/>
+          </a:p>
+        </p:txBody>
+      </p:sp>
+      <p:sp>
+        <p:nvSpPr>
+          <p:cNvPr id="7" name="Slide Number Placeholder 6"/>
+          <p:cNvSpPr>
+            <a:spLocks noGrp="1"/>
+          </p:cNvSpPr>
+          <p:nvPr>
+            <p:ph type="sldNum" sz="quarter" idx="12"/>
+          </p:nvPr>
+        </p:nvSpPr>
+        <p:spPr/>
+        <p:txBody>
+          <a:bodyPr/>
+          <a:lstStyle>
+            <a:lvl1pPr>
+              <a:defRPr/>
+            </a:lvl1pPr>
+          </a:lstStyle>
+          <a:p>
+            <a:fld id="{9A950C51-85E1-4166-98BA-4226DDC92F1D}" type="slidenum">
+              <a:rPr lang="en-US" smtClean="0"/>
+              <a:t>‹#›</a:t>
+            </a:fld>
+            <a:endParaRPr lang="en-US"/>
+          </a:p>
+        </p:txBody>
+      </p:sp>
+    </p:spTree>
+    <p:extLst>
+      <p:ext uri="{BB962C8B-B14F-4D97-AF65-F5344CB8AC3E}">
+        <p14:creationId xmlns:p14="http://schemas.microsoft.com/office/powerpoint/2010/main" val="2542579012"/>
+      </p:ext>
+    </p:extLst>
+  </p:cSld>
+  <p:clrMapOvr>
+    <a:masterClrMapping/>
+  </p:clrMapOvr>
+</p:sldLayout>
+</file>
+
+<file path=ppt/slideLayouts/slideLayout13.xml><?xml version="1.0" encoding="utf-8"?>
 <p:sldLayout xmlns:a="http://schemas.openxmlformats.org/drawingml/2006/main" xmlns:r="http://schemas.openxmlformats.org/officeDocument/2006/relationships" xmlns:p="http://schemas.openxmlformats.org/presentationml/2006/main" type="vertTx" preserve="1">
   <p:cSld name="標題及直排文字">
     <p:spTree>
@@ -584,7 +1838,7 @@
           <a:p>
             <a:fld id="{6DF925A2-9B04-41AD-AF8B-82A5F4D315EC}" type="datetimeFigureOut">
               <a:rPr lang="en-US" smtClean="0"/>
-              <a:t>9/12/2019</a:t>
+              <a:t>10/25/2019</a:t>
             </a:fld>
             <a:endParaRPr lang="en-US"/>
           </a:p>
@@ -653,7 +1907,7 @@
 </p:sldLayout>
 </file>
 
-<file path=ppt/slideLayouts/slideLayout11.xml><?xml version="1.0" encoding="utf-8"?>
+<file path=ppt/slideLayouts/slideLayout14.xml><?xml version="1.0" encoding="utf-8"?>
 <p:sldLayout xmlns:a="http://schemas.openxmlformats.org/drawingml/2006/main" xmlns:r="http://schemas.openxmlformats.org/officeDocument/2006/relationships" xmlns:p="http://schemas.openxmlformats.org/presentationml/2006/main" type="vertTitleAndTx" preserve="1">
   <p:cSld name="直排標題及文字">
     <p:spTree>
@@ -776,7 +2030,7 @@
           <a:p>
             <a:fld id="{6DF925A2-9B04-41AD-AF8B-82A5F4D315EC}" type="datetimeFigureOut">
               <a:rPr lang="en-US" smtClean="0"/>
-              <a:t>9/12/2019</a:t>
+              <a:t>10/25/2019</a:t>
             </a:fld>
             <a:endParaRPr lang="en-US"/>
           </a:p>
@@ -845,7 +2099,7 @@
 </p:sldLayout>
 </file>
 
-<file path=ppt/slideLayouts/slideLayout12.xml><?xml version="1.0" encoding="utf-8"?>
+<file path=ppt/slideLayouts/slideLayout15.xml><?xml version="1.0" encoding="utf-8"?>
 <p:sldLayout xmlns:a="http://schemas.openxmlformats.org/drawingml/2006/main" xmlns:r="http://schemas.openxmlformats.org/officeDocument/2006/relationships" xmlns:p="http://schemas.openxmlformats.org/presentationml/2006/main" type="txAndTwoObj" preserve="1">
   <p:cSld name="標題，文字及兩項物件">
     <p:spTree>
@@ -1087,7 +2341,7 @@
           <a:p>
             <a:fld id="{6DF925A2-9B04-41AD-AF8B-82A5F4D315EC}" type="datetimeFigureOut">
               <a:rPr lang="en-US" smtClean="0"/>
-              <a:t>9/12/2019</a:t>
+              <a:t>10/25/2019</a:t>
             </a:fld>
             <a:endParaRPr lang="en-US"/>
           </a:p>
@@ -1166,7 +2420,7 @@
 </p:sldLayout>
 </file>
 
-<file path=ppt/slideLayouts/slideLayout13.xml><?xml version="1.0" encoding="utf-8"?>
+<file path=ppt/slideLayouts/slideLayout16.xml><?xml version="1.0" encoding="utf-8"?>
 <p:sldLayout xmlns:a="http://schemas.openxmlformats.org/drawingml/2006/main" xmlns:r="http://schemas.openxmlformats.org/officeDocument/2006/relationships" xmlns:p="http://schemas.openxmlformats.org/presentationml/2006/main" type="txAndClipArt" preserve="1">
   <p:cSld name="標題，文字及美工圖案">
     <p:spTree>
@@ -1322,7 +2576,7 @@
           <a:p>
             <a:fld id="{6DF925A2-9B04-41AD-AF8B-82A5F4D315EC}" type="datetimeFigureOut">
               <a:rPr lang="en-US" smtClean="0"/>
-              <a:t>9/12/2019</a:t>
+              <a:t>10/25/2019</a:t>
             </a:fld>
             <a:endParaRPr lang="en-US"/>
           </a:p>
@@ -1454,42 +2708,58 @@
         <p:spPr/>
         <p:txBody>
           <a:bodyPr/>
-          <a:lstStyle/>
+          <a:lstStyle>
+            <a:lvl1pPr>
+              <a:defRPr sz="2800"/>
+            </a:lvl1pPr>
+            <a:lvl2pPr>
+              <a:defRPr sz="2400"/>
+            </a:lvl2pPr>
+            <a:lvl3pPr>
+              <a:defRPr sz="2000"/>
+            </a:lvl3pPr>
+            <a:lvl4pPr>
+              <a:defRPr sz="1800"/>
+            </a:lvl4pPr>
+            <a:lvl5pPr>
+              <a:defRPr sz="1800"/>
+            </a:lvl5pPr>
+          </a:lstStyle>
           <a:p>
             <a:pPr lvl="0"/>
             <a:r>
-              <a:rPr lang="en-US" altLang="zh-TW"/>
+              <a:rPr lang="en-US" altLang="zh-TW" dirty="0"/>
               <a:t>Click to edit Master text styles</a:t>
             </a:r>
           </a:p>
           <a:p>
             <a:pPr lvl="1"/>
             <a:r>
-              <a:rPr lang="en-US" altLang="zh-TW"/>
+              <a:rPr lang="en-US" altLang="zh-TW" dirty="0"/>
               <a:t>Second level</a:t>
             </a:r>
           </a:p>
           <a:p>
             <a:pPr lvl="2"/>
             <a:r>
-              <a:rPr lang="en-US" altLang="zh-TW"/>
+              <a:rPr lang="en-US" altLang="zh-TW" dirty="0"/>
               <a:t>Third level</a:t>
             </a:r>
           </a:p>
           <a:p>
             <a:pPr lvl="3"/>
             <a:r>
-              <a:rPr lang="en-US" altLang="zh-TW"/>
+              <a:rPr lang="en-US" altLang="zh-TW" dirty="0"/>
               <a:t>Fourth level</a:t>
             </a:r>
           </a:p>
           <a:p>
             <a:pPr lvl="4"/>
             <a:r>
-              <a:rPr lang="en-US" altLang="zh-TW"/>
+              <a:rPr lang="en-US" altLang="zh-TW" dirty="0"/>
               <a:t>Fifth level</a:t>
             </a:r>
-            <a:endParaRPr lang="en-US"/>
+            <a:endParaRPr lang="en-US" dirty="0"/>
           </a:p>
         </p:txBody>
       </p:sp>
@@ -1514,7 +2784,7 @@
           <a:p>
             <a:fld id="{6DF925A2-9B04-41AD-AF8B-82A5F4D315EC}" type="datetimeFigureOut">
               <a:rPr lang="en-US" smtClean="0"/>
-              <a:t>9/12/2019</a:t>
+              <a:t>10/25/2019</a:t>
             </a:fld>
             <a:endParaRPr lang="en-US"/>
           </a:p>
@@ -1584,8 +2854,8 @@
 </file>
 
 <file path=ppt/slideLayouts/slideLayout3.xml><?xml version="1.0" encoding="utf-8"?>
-<p:sldLayout xmlns:a="http://schemas.openxmlformats.org/drawingml/2006/main" xmlns:r="http://schemas.openxmlformats.org/officeDocument/2006/relationships" xmlns:p="http://schemas.openxmlformats.org/presentationml/2006/main" type="secHead" preserve="1">
-  <p:cSld name="章節標題">
+<p:sldLayout xmlns:a="http://schemas.openxmlformats.org/drawingml/2006/main" xmlns:r="http://schemas.openxmlformats.org/officeDocument/2006/relationships" xmlns:p="http://schemas.openxmlformats.org/presentationml/2006/main" showMasterSp="0" preserve="1" userDrawn="1">
+  <p:cSld name="大綱投影片">
     <p:spTree>
       <p:nvGrpSpPr>
         <p:cNvPr id="1" name=""/>
@@ -1602,109 +2872,12 @@
       </p:grpSpPr>
       <p:sp>
         <p:nvSpPr>
-          <p:cNvPr id="2" name="Title 1"/>
-          <p:cNvSpPr>
-            <a:spLocks noGrp="1"/>
-          </p:cNvSpPr>
-          <p:nvPr>
-            <p:ph type="title"/>
-          </p:nvPr>
-        </p:nvSpPr>
-        <p:spPr>
-          <a:xfrm>
-            <a:off x="722313" y="4406900"/>
-            <a:ext cx="7772400" cy="1362075"/>
-          </a:xfrm>
-        </p:spPr>
-        <p:txBody>
-          <a:bodyPr anchor="t"/>
-          <a:lstStyle>
-            <a:lvl1pPr algn="l">
-              <a:defRPr sz="4000" b="1" cap="all"/>
-            </a:lvl1pPr>
-          </a:lstStyle>
-          <a:p>
-            <a:r>
-              <a:rPr lang="en-US" altLang="zh-TW"/>
-              <a:t>Click to edit Master title style</a:t>
-            </a:r>
-            <a:endParaRPr lang="en-US"/>
-          </a:p>
-        </p:txBody>
-      </p:sp>
-      <p:sp>
-        <p:nvSpPr>
-          <p:cNvPr id="3" name="Text Placeholder 2"/>
-          <p:cNvSpPr>
-            <a:spLocks noGrp="1"/>
-          </p:cNvSpPr>
-          <p:nvPr>
-            <p:ph type="body" idx="1"/>
-          </p:nvPr>
-        </p:nvSpPr>
-        <p:spPr>
-          <a:xfrm>
-            <a:off x="722313" y="2906713"/>
-            <a:ext cx="7772400" cy="1500187"/>
-          </a:xfrm>
-        </p:spPr>
-        <p:txBody>
-          <a:bodyPr anchor="b"/>
-          <a:lstStyle>
-            <a:lvl1pPr marL="0" indent="0">
-              <a:buNone/>
-              <a:defRPr sz="2000"/>
-            </a:lvl1pPr>
-            <a:lvl2pPr marL="457200" indent="0">
-              <a:buNone/>
-              <a:defRPr sz="1800"/>
-            </a:lvl2pPr>
-            <a:lvl3pPr marL="914400" indent="0">
-              <a:buNone/>
-              <a:defRPr sz="1600"/>
-            </a:lvl3pPr>
-            <a:lvl4pPr marL="1371600" indent="0">
-              <a:buNone/>
-              <a:defRPr sz="1400"/>
-            </a:lvl4pPr>
-            <a:lvl5pPr marL="1828800" indent="0">
-              <a:buNone/>
-              <a:defRPr sz="1400"/>
-            </a:lvl5pPr>
-            <a:lvl6pPr marL="2286000" indent="0">
-              <a:buNone/>
-              <a:defRPr sz="1400"/>
-            </a:lvl6pPr>
-            <a:lvl7pPr marL="2743200" indent="0">
-              <a:buNone/>
-              <a:defRPr sz="1400"/>
-            </a:lvl7pPr>
-            <a:lvl8pPr marL="3200400" indent="0">
-              <a:buNone/>
-              <a:defRPr sz="1400"/>
-            </a:lvl8pPr>
-            <a:lvl9pPr marL="3657600" indent="0">
-              <a:buNone/>
-              <a:defRPr sz="1400"/>
-            </a:lvl9pPr>
-          </a:lstStyle>
-          <a:p>
-            <a:pPr lvl="0"/>
-            <a:r>
-              <a:rPr lang="en-US" altLang="zh-TW"/>
-              <a:t>Click to edit Master text styles</a:t>
-            </a:r>
-          </a:p>
-        </p:txBody>
-      </p:sp>
-      <p:sp>
-        <p:nvSpPr>
-          <p:cNvPr id="4" name="Date Placeholder 3"/>
-          <p:cNvSpPr>
-            <a:spLocks noGrp="1"/>
-          </p:cNvSpPr>
-          <p:nvPr>
-            <p:ph type="dt" sz="half" idx="10"/>
+          <p:cNvPr id="16388" name="Rectangle 4"/>
+          <p:cNvSpPr>
+            <a:spLocks noGrp="1" noChangeArrowheads="1"/>
+          </p:cNvSpPr>
+          <p:nvPr>
+            <p:ph type="dt" sz="half" idx="2"/>
           </p:nvPr>
         </p:nvSpPr>
         <p:spPr/>
@@ -1718,7 +2891,7 @@
           <a:p>
             <a:fld id="{6DF925A2-9B04-41AD-AF8B-82A5F4D315EC}" type="datetimeFigureOut">
               <a:rPr lang="en-US" smtClean="0"/>
-              <a:t>9/12/2019</a:t>
+              <a:t>10/25/2019</a:t>
             </a:fld>
             <a:endParaRPr lang="en-US"/>
           </a:p>
@@ -1726,12 +2899,12 @@
       </p:sp>
       <p:sp>
         <p:nvSpPr>
-          <p:cNvPr id="5" name="Footer Placeholder 4"/>
-          <p:cNvSpPr>
-            <a:spLocks noGrp="1"/>
-          </p:cNvSpPr>
-          <p:nvPr>
-            <p:ph type="ftr" sz="quarter" idx="11"/>
+          <p:cNvPr id="16389" name="Rectangle 5"/>
+          <p:cNvSpPr>
+            <a:spLocks noGrp="1" noChangeArrowheads="1"/>
+          </p:cNvSpPr>
+          <p:nvPr>
+            <p:ph type="ftr" sz="quarter" idx="3"/>
           </p:nvPr>
         </p:nvSpPr>
         <p:spPr/>
@@ -1749,12 +2922,12 @@
       </p:sp>
       <p:sp>
         <p:nvSpPr>
-          <p:cNvPr id="6" name="Slide Number Placeholder 5"/>
-          <p:cNvSpPr>
-            <a:spLocks noGrp="1"/>
-          </p:cNvSpPr>
-          <p:nvPr>
-            <p:ph type="sldNum" sz="quarter" idx="12"/>
+          <p:cNvPr id="16390" name="Rectangle 6"/>
+          <p:cNvSpPr>
+            <a:spLocks noGrp="1" noChangeArrowheads="1"/>
+          </p:cNvSpPr>
+          <p:nvPr>
+            <p:ph type="sldNum" sz="quarter" idx="4"/>
           </p:nvPr>
         </p:nvSpPr>
         <p:spPr/>
@@ -1774,10 +2947,272 @@
           </a:p>
         </p:txBody>
       </p:sp>
+      <p:sp>
+        <p:nvSpPr>
+          <p:cNvPr id="10" name="Rectangle 8" descr="Gold bar">
+            <a:extLst>
+              <a:ext uri="{FF2B5EF4-FFF2-40B4-BE49-F238E27FC236}">
+                <a16:creationId xmlns:a16="http://schemas.microsoft.com/office/drawing/2014/main" id="{E7D4FC3C-1D88-474A-A6BF-E9EE21D82F64}"/>
+              </a:ext>
+            </a:extLst>
+          </p:cNvPr>
+          <p:cNvSpPr>
+            <a:spLocks noChangeArrowheads="1"/>
+          </p:cNvSpPr>
+          <p:nvPr userDrawn="1"/>
+        </p:nvSpPr>
+        <p:spPr bwMode="auto">
+          <a:xfrm>
+            <a:off x="228600" y="2420888"/>
+            <a:ext cx="2870200" cy="201613"/>
+          </a:xfrm>
+          <a:prstGeom prst="rect">
+            <a:avLst/>
+          </a:prstGeom>
+          <a:solidFill>
+            <a:schemeClr val="bg2"/>
+          </a:solidFill>
+          <a:ln>
+            <a:noFill/>
+          </a:ln>
+          <a:effectLst/>
+          <a:extLst>
+            <a:ext uri="{91240B29-F687-4F45-9708-019B960494DF}">
+              <a14:hiddenLine xmlns:a14="http://schemas.microsoft.com/office/drawing/2010/main" w="9525">
+                <a:solidFill>
+                  <a:schemeClr val="tx1"/>
+                </a:solidFill>
+                <a:miter lim="800000"/>
+                <a:headEnd/>
+                <a:tailEnd/>
+              </a14:hiddenLine>
+            </a:ext>
+            <a:ext uri="{AF507438-7753-43E0-B8FC-AC1667EBCBE1}">
+              <a14:hiddenEffects xmlns:a14="http://schemas.microsoft.com/office/drawing/2010/main">
+                <a:effectLst>
+                  <a:outerShdw dist="35921" dir="2700000" algn="ctr" rotWithShape="0">
+                    <a:schemeClr val="bg2"/>
+                  </a:outerShdw>
+                </a:effectLst>
+              </a14:hiddenEffects>
+            </a:ext>
+          </a:extLst>
+        </p:spPr>
+        <p:txBody>
+          <a:bodyPr wrap="none" anchor="ctr"/>
+          <a:lstStyle/>
+          <a:p>
+            <a:endParaRPr lang="en-US"/>
+          </a:p>
+        </p:txBody>
+      </p:sp>
+      <p:sp>
+        <p:nvSpPr>
+          <p:cNvPr id="11" name="Rectangle 9" descr="Orange bar">
+            <a:extLst>
+              <a:ext uri="{FF2B5EF4-FFF2-40B4-BE49-F238E27FC236}">
+                <a16:creationId xmlns:a16="http://schemas.microsoft.com/office/drawing/2014/main" id="{CAFA7AD7-7079-46BB-9512-95E1C1C93A4C}"/>
+              </a:ext>
+            </a:extLst>
+          </p:cNvPr>
+          <p:cNvSpPr>
+            <a:spLocks noChangeArrowheads="1"/>
+          </p:cNvSpPr>
+          <p:nvPr userDrawn="1"/>
+        </p:nvSpPr>
+        <p:spPr bwMode="auto">
+          <a:xfrm>
+            <a:off x="3098800" y="2420888"/>
+            <a:ext cx="2870200" cy="201613"/>
+          </a:xfrm>
+          <a:prstGeom prst="rect">
+            <a:avLst/>
+          </a:prstGeom>
+          <a:solidFill>
+            <a:schemeClr val="accent1"/>
+          </a:solidFill>
+          <a:ln>
+            <a:noFill/>
+          </a:ln>
+          <a:effectLst/>
+          <a:extLst>
+            <a:ext uri="{91240B29-F687-4F45-9708-019B960494DF}">
+              <a14:hiddenLine xmlns:a14="http://schemas.microsoft.com/office/drawing/2010/main" w="9525">
+                <a:solidFill>
+                  <a:schemeClr val="tx1"/>
+                </a:solidFill>
+                <a:miter lim="800000"/>
+                <a:headEnd/>
+                <a:tailEnd/>
+              </a14:hiddenLine>
+            </a:ext>
+            <a:ext uri="{AF507438-7753-43E0-B8FC-AC1667EBCBE1}">
+              <a14:hiddenEffects xmlns:a14="http://schemas.microsoft.com/office/drawing/2010/main">
+                <a:effectLst>
+                  <a:outerShdw dist="35921" dir="2700000" algn="ctr" rotWithShape="0">
+                    <a:schemeClr val="bg2"/>
+                  </a:outerShdw>
+                </a:effectLst>
+              </a14:hiddenEffects>
+            </a:ext>
+          </a:extLst>
+        </p:spPr>
+        <p:txBody>
+          <a:bodyPr wrap="none" anchor="ctr"/>
+          <a:lstStyle/>
+          <a:p>
+            <a:endParaRPr lang="en-US"/>
+          </a:p>
+        </p:txBody>
+      </p:sp>
+      <p:sp>
+        <p:nvSpPr>
+          <p:cNvPr id="12" name="Rectangle 10" descr="Slate bar">
+            <a:extLst>
+              <a:ext uri="{FF2B5EF4-FFF2-40B4-BE49-F238E27FC236}">
+                <a16:creationId xmlns:a16="http://schemas.microsoft.com/office/drawing/2014/main" id="{2F2D1EAF-5811-4EF4-BFE6-BADE17C860A0}"/>
+              </a:ext>
+            </a:extLst>
+          </p:cNvPr>
+          <p:cNvSpPr>
+            <a:spLocks noChangeArrowheads="1"/>
+          </p:cNvSpPr>
+          <p:nvPr userDrawn="1"/>
+        </p:nvSpPr>
+        <p:spPr bwMode="auto">
+          <a:xfrm>
+            <a:off x="5969000" y="2420888"/>
+            <a:ext cx="2870200" cy="201613"/>
+          </a:xfrm>
+          <a:prstGeom prst="rect">
+            <a:avLst/>
+          </a:prstGeom>
+          <a:solidFill>
+            <a:schemeClr val="tx2"/>
+          </a:solidFill>
+          <a:ln>
+            <a:noFill/>
+          </a:ln>
+          <a:effectLst/>
+          <a:extLst>
+            <a:ext uri="{91240B29-F687-4F45-9708-019B960494DF}">
+              <a14:hiddenLine xmlns:a14="http://schemas.microsoft.com/office/drawing/2010/main" w="9525">
+                <a:solidFill>
+                  <a:schemeClr val="tx1"/>
+                </a:solidFill>
+                <a:miter lim="800000"/>
+                <a:headEnd/>
+                <a:tailEnd/>
+              </a14:hiddenLine>
+            </a:ext>
+            <a:ext uri="{AF507438-7753-43E0-B8FC-AC1667EBCBE1}">
+              <a14:hiddenEffects xmlns:a14="http://schemas.microsoft.com/office/drawing/2010/main">
+                <a:effectLst>
+                  <a:outerShdw dist="35921" dir="2700000" algn="ctr" rotWithShape="0">
+                    <a:schemeClr val="bg2"/>
+                  </a:outerShdw>
+                </a:effectLst>
+              </a14:hiddenEffects>
+            </a:ext>
+          </a:extLst>
+        </p:spPr>
+        <p:txBody>
+          <a:bodyPr wrap="none" anchor="ctr"/>
+          <a:lstStyle/>
+          <a:p>
+            <a:endParaRPr lang="en-US"/>
+          </a:p>
+        </p:txBody>
+      </p:sp>
+      <p:sp>
+        <p:nvSpPr>
+          <p:cNvPr id="13" name="Rectangle 2">
+            <a:extLst>
+              <a:ext uri="{FF2B5EF4-FFF2-40B4-BE49-F238E27FC236}">
+                <a16:creationId xmlns:a16="http://schemas.microsoft.com/office/drawing/2014/main" id="{F93C8682-563B-4AEA-9CC7-EA0EF506A6CD}"/>
+              </a:ext>
+            </a:extLst>
+          </p:cNvPr>
+          <p:cNvSpPr>
+            <a:spLocks noGrp="1" noChangeArrowheads="1"/>
+          </p:cNvSpPr>
+          <p:nvPr>
+            <p:ph type="ctrTitle"/>
+          </p:nvPr>
+        </p:nvSpPr>
+        <p:spPr>
+          <a:xfrm>
+            <a:off x="228600" y="685800"/>
+            <a:ext cx="8229600" cy="1589451"/>
+          </a:xfrm>
+        </p:spPr>
+        <p:txBody>
+          <a:bodyPr/>
+          <a:lstStyle>
+            <a:lvl1pPr algn="l">
+              <a:defRPr sz="3000" b="1">
+                <a:solidFill>
+                  <a:schemeClr val="tx1"/>
+                </a:solidFill>
+              </a:defRPr>
+            </a:lvl1pPr>
+          </a:lstStyle>
+          <a:p>
+            <a:pPr lvl="0"/>
+            <a:r>
+              <a:rPr lang="zh-TW" altLang="en-US" noProof="0" dirty="0"/>
+              <a:t>按一下以編輯母片標題樣式</a:t>
+            </a:r>
+            <a:endParaRPr lang="en-US" noProof="0" dirty="0"/>
+          </a:p>
+        </p:txBody>
+      </p:sp>
+      <p:sp>
+        <p:nvSpPr>
+          <p:cNvPr id="14" name="Rectangle 3">
+            <a:extLst>
+              <a:ext uri="{FF2B5EF4-FFF2-40B4-BE49-F238E27FC236}">
+                <a16:creationId xmlns:a16="http://schemas.microsoft.com/office/drawing/2014/main" id="{478357BF-44C4-425C-8EEB-7C10941A69C3}"/>
+              </a:ext>
+            </a:extLst>
+          </p:cNvPr>
+          <p:cNvSpPr>
+            <a:spLocks noGrp="1" noChangeArrowheads="1"/>
+          </p:cNvSpPr>
+          <p:nvPr>
+            <p:ph type="subTitle" idx="1"/>
+          </p:nvPr>
+        </p:nvSpPr>
+        <p:spPr>
+          <a:xfrm>
+            <a:off x="228599" y="2768138"/>
+            <a:ext cx="8229599" cy="2711912"/>
+          </a:xfrm>
+        </p:spPr>
+        <p:txBody>
+          <a:bodyPr/>
+          <a:lstStyle>
+            <a:lvl1pPr marL="457200" indent="-457200" algn="l">
+              <a:buSzPct val="100000"/>
+              <a:buFont typeface="Wingdings" panose="05000000000000000000" pitchFamily="2" charset="2"/>
+              <a:buChar char="§"/>
+              <a:defRPr sz="3000" b="0"/>
+            </a:lvl1pPr>
+          </a:lstStyle>
+          <a:p>
+            <a:pPr lvl="0"/>
+            <a:r>
+              <a:rPr lang="zh-TW" altLang="en-US" noProof="0" dirty="0"/>
+              <a:t>按一下以編輯母片副標題樣式</a:t>
+            </a:r>
+            <a:endParaRPr lang="en-US" noProof="0" dirty="0"/>
+          </a:p>
+        </p:txBody>
+      </p:sp>
     </p:spTree>
     <p:extLst>
       <p:ext uri="{BB962C8B-B14F-4D97-AF65-F5344CB8AC3E}">
-        <p14:creationId xmlns:p14="http://schemas.microsoft.com/office/powerpoint/2010/main" val="2864600874"/>
+        <p14:creationId xmlns:p14="http://schemas.microsoft.com/office/powerpoint/2010/main" val="3382031660"/>
       </p:ext>
     </p:extLst>
   </p:cSld>
@@ -1788,6 +3223,1016 @@
 </file>
 
 <file path=ppt/slideLayouts/slideLayout4.xml><?xml version="1.0" encoding="utf-8"?>
+<p:sldLayout xmlns:a="http://schemas.openxmlformats.org/drawingml/2006/main" xmlns:r="http://schemas.openxmlformats.org/officeDocument/2006/relationships" xmlns:p="http://schemas.openxmlformats.org/presentationml/2006/main" showMasterSp="0" preserve="1" userDrawn="1">
+  <p:cSld name="1_標題投影片 + 浮水印">
+    <p:spTree>
+      <p:nvGrpSpPr>
+        <p:cNvPr id="1" name=""/>
+        <p:cNvGrpSpPr/>
+        <p:nvPr/>
+      </p:nvGrpSpPr>
+      <p:grpSpPr>
+        <a:xfrm>
+          <a:off x="0" y="0"/>
+          <a:ext cx="0" cy="0"/>
+          <a:chOff x="0" y="0"/>
+          <a:chExt cx="0" cy="0"/>
+        </a:xfrm>
+      </p:grpSpPr>
+      <p:sp>
+        <p:nvSpPr>
+          <p:cNvPr id="16388" name="Rectangle 4"/>
+          <p:cNvSpPr>
+            <a:spLocks noGrp="1" noChangeArrowheads="1"/>
+          </p:cNvSpPr>
+          <p:nvPr>
+            <p:ph type="dt" sz="half" idx="2"/>
+          </p:nvPr>
+        </p:nvSpPr>
+        <p:spPr/>
+        <p:txBody>
+          <a:bodyPr/>
+          <a:lstStyle>
+            <a:lvl1pPr>
+              <a:defRPr/>
+            </a:lvl1pPr>
+          </a:lstStyle>
+          <a:p>
+            <a:fld id="{6DF925A2-9B04-41AD-AF8B-82A5F4D315EC}" type="datetimeFigureOut">
+              <a:rPr lang="en-US" smtClean="0"/>
+              <a:t>10/25/2019</a:t>
+            </a:fld>
+            <a:endParaRPr lang="en-US"/>
+          </a:p>
+        </p:txBody>
+      </p:sp>
+      <p:sp>
+        <p:nvSpPr>
+          <p:cNvPr id="16389" name="Rectangle 5"/>
+          <p:cNvSpPr>
+            <a:spLocks noGrp="1" noChangeArrowheads="1"/>
+          </p:cNvSpPr>
+          <p:nvPr>
+            <p:ph type="ftr" sz="quarter" idx="3"/>
+          </p:nvPr>
+        </p:nvSpPr>
+        <p:spPr/>
+        <p:txBody>
+          <a:bodyPr/>
+          <a:lstStyle>
+            <a:lvl1pPr>
+              <a:defRPr/>
+            </a:lvl1pPr>
+          </a:lstStyle>
+          <a:p>
+            <a:endParaRPr lang="en-US"/>
+          </a:p>
+        </p:txBody>
+      </p:sp>
+      <p:sp>
+        <p:nvSpPr>
+          <p:cNvPr id="16390" name="Rectangle 6"/>
+          <p:cNvSpPr>
+            <a:spLocks noGrp="1" noChangeArrowheads="1"/>
+          </p:cNvSpPr>
+          <p:nvPr>
+            <p:ph type="sldNum" sz="quarter" idx="4"/>
+          </p:nvPr>
+        </p:nvSpPr>
+        <p:spPr/>
+        <p:txBody>
+          <a:bodyPr/>
+          <a:lstStyle>
+            <a:lvl1pPr>
+              <a:defRPr/>
+            </a:lvl1pPr>
+          </a:lstStyle>
+          <a:p>
+            <a:fld id="{9A950C51-85E1-4166-98BA-4226DDC92F1D}" type="slidenum">
+              <a:rPr lang="en-US" smtClean="0"/>
+              <a:t>‹#›</a:t>
+            </a:fld>
+            <a:endParaRPr lang="en-US"/>
+          </a:p>
+        </p:txBody>
+      </p:sp>
+      <p:sp>
+        <p:nvSpPr>
+          <p:cNvPr id="11" name="Rectangle 8" descr="Gold bar">
+            <a:extLst>
+              <a:ext uri="{FF2B5EF4-FFF2-40B4-BE49-F238E27FC236}">
+                <a16:creationId xmlns:a16="http://schemas.microsoft.com/office/drawing/2014/main" id="{4CEEC8E9-5A43-42CD-B4B9-6C39E136CC2E}"/>
+              </a:ext>
+            </a:extLst>
+          </p:cNvPr>
+          <p:cNvSpPr>
+            <a:spLocks noChangeArrowheads="1"/>
+          </p:cNvSpPr>
+          <p:nvPr userDrawn="1"/>
+        </p:nvSpPr>
+        <p:spPr bwMode="auto">
+          <a:xfrm>
+            <a:off x="228600" y="2420888"/>
+            <a:ext cx="2870200" cy="201613"/>
+          </a:xfrm>
+          <a:prstGeom prst="rect">
+            <a:avLst/>
+          </a:prstGeom>
+          <a:solidFill>
+            <a:schemeClr val="bg2"/>
+          </a:solidFill>
+          <a:ln>
+            <a:noFill/>
+          </a:ln>
+          <a:effectLst/>
+          <a:extLst>
+            <a:ext uri="{91240B29-F687-4F45-9708-019B960494DF}">
+              <a14:hiddenLine xmlns:a14="http://schemas.microsoft.com/office/drawing/2010/main" w="9525">
+                <a:solidFill>
+                  <a:schemeClr val="tx1"/>
+                </a:solidFill>
+                <a:miter lim="800000"/>
+                <a:headEnd/>
+                <a:tailEnd/>
+              </a14:hiddenLine>
+            </a:ext>
+            <a:ext uri="{AF507438-7753-43E0-B8FC-AC1667EBCBE1}">
+              <a14:hiddenEffects xmlns:a14="http://schemas.microsoft.com/office/drawing/2010/main">
+                <a:effectLst>
+                  <a:outerShdw dist="35921" dir="2700000" algn="ctr" rotWithShape="0">
+                    <a:schemeClr val="bg2"/>
+                  </a:outerShdw>
+                </a:effectLst>
+              </a14:hiddenEffects>
+            </a:ext>
+          </a:extLst>
+        </p:spPr>
+        <p:txBody>
+          <a:bodyPr wrap="none" anchor="ctr"/>
+          <a:lstStyle/>
+          <a:p>
+            <a:endParaRPr lang="en-US"/>
+          </a:p>
+        </p:txBody>
+      </p:sp>
+      <p:sp>
+        <p:nvSpPr>
+          <p:cNvPr id="12" name="Rectangle 9" descr="Orange bar">
+            <a:extLst>
+              <a:ext uri="{FF2B5EF4-FFF2-40B4-BE49-F238E27FC236}">
+                <a16:creationId xmlns:a16="http://schemas.microsoft.com/office/drawing/2014/main" id="{C119B825-3282-4974-814F-83FCE640B23C}"/>
+              </a:ext>
+            </a:extLst>
+          </p:cNvPr>
+          <p:cNvSpPr>
+            <a:spLocks noChangeArrowheads="1"/>
+          </p:cNvSpPr>
+          <p:nvPr userDrawn="1"/>
+        </p:nvSpPr>
+        <p:spPr bwMode="auto">
+          <a:xfrm>
+            <a:off x="3098800" y="2420888"/>
+            <a:ext cx="2870200" cy="201613"/>
+          </a:xfrm>
+          <a:prstGeom prst="rect">
+            <a:avLst/>
+          </a:prstGeom>
+          <a:solidFill>
+            <a:schemeClr val="accent1"/>
+          </a:solidFill>
+          <a:ln>
+            <a:noFill/>
+          </a:ln>
+          <a:effectLst/>
+          <a:extLst>
+            <a:ext uri="{91240B29-F687-4F45-9708-019B960494DF}">
+              <a14:hiddenLine xmlns:a14="http://schemas.microsoft.com/office/drawing/2010/main" w="9525">
+                <a:solidFill>
+                  <a:schemeClr val="tx1"/>
+                </a:solidFill>
+                <a:miter lim="800000"/>
+                <a:headEnd/>
+                <a:tailEnd/>
+              </a14:hiddenLine>
+            </a:ext>
+            <a:ext uri="{AF507438-7753-43E0-B8FC-AC1667EBCBE1}">
+              <a14:hiddenEffects xmlns:a14="http://schemas.microsoft.com/office/drawing/2010/main">
+                <a:effectLst>
+                  <a:outerShdw dist="35921" dir="2700000" algn="ctr" rotWithShape="0">
+                    <a:schemeClr val="bg2"/>
+                  </a:outerShdw>
+                </a:effectLst>
+              </a14:hiddenEffects>
+            </a:ext>
+          </a:extLst>
+        </p:spPr>
+        <p:txBody>
+          <a:bodyPr wrap="none" anchor="ctr"/>
+          <a:lstStyle/>
+          <a:p>
+            <a:endParaRPr lang="en-US"/>
+          </a:p>
+        </p:txBody>
+      </p:sp>
+      <p:sp>
+        <p:nvSpPr>
+          <p:cNvPr id="13" name="Rectangle 10" descr="Slate bar">
+            <a:extLst>
+              <a:ext uri="{FF2B5EF4-FFF2-40B4-BE49-F238E27FC236}">
+                <a16:creationId xmlns:a16="http://schemas.microsoft.com/office/drawing/2014/main" id="{4F55FCC2-8E54-4D23-B880-630A835CA1FD}"/>
+              </a:ext>
+            </a:extLst>
+          </p:cNvPr>
+          <p:cNvSpPr>
+            <a:spLocks noChangeArrowheads="1"/>
+          </p:cNvSpPr>
+          <p:nvPr userDrawn="1"/>
+        </p:nvSpPr>
+        <p:spPr bwMode="auto">
+          <a:xfrm>
+            <a:off x="5969000" y="2420888"/>
+            <a:ext cx="2870200" cy="201613"/>
+          </a:xfrm>
+          <a:prstGeom prst="rect">
+            <a:avLst/>
+          </a:prstGeom>
+          <a:solidFill>
+            <a:schemeClr val="tx2"/>
+          </a:solidFill>
+          <a:ln>
+            <a:noFill/>
+          </a:ln>
+          <a:effectLst/>
+          <a:extLst>
+            <a:ext uri="{91240B29-F687-4F45-9708-019B960494DF}">
+              <a14:hiddenLine xmlns:a14="http://schemas.microsoft.com/office/drawing/2010/main" w="9525">
+                <a:solidFill>
+                  <a:schemeClr val="tx1"/>
+                </a:solidFill>
+                <a:miter lim="800000"/>
+                <a:headEnd/>
+                <a:tailEnd/>
+              </a14:hiddenLine>
+            </a:ext>
+            <a:ext uri="{AF507438-7753-43E0-B8FC-AC1667EBCBE1}">
+              <a14:hiddenEffects xmlns:a14="http://schemas.microsoft.com/office/drawing/2010/main">
+                <a:effectLst>
+                  <a:outerShdw dist="35921" dir="2700000" algn="ctr" rotWithShape="0">
+                    <a:schemeClr val="bg2"/>
+                  </a:outerShdw>
+                </a:effectLst>
+              </a14:hiddenEffects>
+            </a:ext>
+          </a:extLst>
+        </p:spPr>
+        <p:txBody>
+          <a:bodyPr wrap="none" anchor="ctr"/>
+          <a:lstStyle/>
+          <a:p>
+            <a:endParaRPr lang="en-US"/>
+          </a:p>
+        </p:txBody>
+      </p:sp>
+      <p:sp>
+        <p:nvSpPr>
+          <p:cNvPr id="14" name="Rectangle 2">
+            <a:extLst>
+              <a:ext uri="{FF2B5EF4-FFF2-40B4-BE49-F238E27FC236}">
+                <a16:creationId xmlns:a16="http://schemas.microsoft.com/office/drawing/2014/main" id="{71B9AEDB-BCFF-4C29-8411-B045D13536D5}"/>
+              </a:ext>
+            </a:extLst>
+          </p:cNvPr>
+          <p:cNvSpPr>
+            <a:spLocks noGrp="1" noChangeArrowheads="1"/>
+          </p:cNvSpPr>
+          <p:nvPr>
+            <p:ph type="ctrTitle"/>
+          </p:nvPr>
+        </p:nvSpPr>
+        <p:spPr>
+          <a:xfrm>
+            <a:off x="685800" y="685800"/>
+            <a:ext cx="7772400" cy="1735088"/>
+          </a:xfrm>
+        </p:spPr>
+        <p:txBody>
+          <a:bodyPr/>
+          <a:lstStyle>
+            <a:lvl1pPr algn="ctr">
+              <a:defRPr sz="4400" b="1"/>
+            </a:lvl1pPr>
+          </a:lstStyle>
+          <a:p>
+            <a:pPr lvl="0"/>
+            <a:r>
+              <a:rPr lang="zh-TW" altLang="en-US" noProof="0" dirty="0"/>
+              <a:t>按一下以編輯母片標題樣式</a:t>
+            </a:r>
+            <a:endParaRPr lang="en-US" noProof="0" dirty="0"/>
+          </a:p>
+        </p:txBody>
+      </p:sp>
+      <p:sp>
+        <p:nvSpPr>
+          <p:cNvPr id="10" name="Rectangle 2">
+            <a:extLst>
+              <a:ext uri="{FF2B5EF4-FFF2-40B4-BE49-F238E27FC236}">
+                <a16:creationId xmlns:a16="http://schemas.microsoft.com/office/drawing/2014/main" id="{2AED8E50-C875-4879-BFC0-E7BF0E4386BE}"/>
+              </a:ext>
+            </a:extLst>
+          </p:cNvPr>
+          <p:cNvSpPr txBox="1">
+            <a:spLocks noChangeArrowheads="1"/>
+          </p:cNvSpPr>
+          <p:nvPr userDrawn="1"/>
+        </p:nvSpPr>
+        <p:spPr bwMode="auto">
+          <a:xfrm>
+            <a:off x="184893" y="2944363"/>
+            <a:ext cx="8707587" cy="3160001"/>
+          </a:xfrm>
+          <a:prstGeom prst="rect">
+            <a:avLst/>
+          </a:prstGeom>
+          <a:noFill/>
+          <a:ln>
+            <a:noFill/>
+          </a:ln>
+          <a:effectLst/>
+          <a:extLst>
+            <a:ext uri="{909E8E84-426E-40DD-AFC4-6F175D3DCCD1}">
+              <a14:hiddenFill xmlns:a14="http://schemas.microsoft.com/office/drawing/2010/main">
+                <a:solidFill>
+                  <a:schemeClr val="accent1"/>
+                </a:solidFill>
+              </a14:hiddenFill>
+            </a:ext>
+            <a:ext uri="{91240B29-F687-4F45-9708-019B960494DF}">
+              <a14:hiddenLine xmlns:a14="http://schemas.microsoft.com/office/drawing/2010/main" w="9525">
+                <a:solidFill>
+                  <a:schemeClr val="tx1"/>
+                </a:solidFill>
+                <a:miter lim="800000"/>
+                <a:headEnd/>
+                <a:tailEnd/>
+              </a14:hiddenLine>
+            </a:ext>
+            <a:ext uri="{AF507438-7753-43E0-B8FC-AC1667EBCBE1}">
+              <a14:hiddenEffects xmlns:a14="http://schemas.microsoft.com/office/drawing/2010/main">
+                <a:effectLst>
+                  <a:outerShdw dist="35921" dir="2700000" algn="ctr" rotWithShape="0">
+                    <a:schemeClr val="bg2"/>
+                  </a:outerShdw>
+                </a:effectLst>
+              </a14:hiddenEffects>
+            </a:ext>
+          </a:extLst>
+        </p:spPr>
+        <p:txBody>
+          <a:bodyPr vert="horz" wrap="square" lIns="91440" tIns="45720" rIns="91440" bIns="45720" numCol="1" anchor="b" anchorCtr="0" compatLnSpc="1">
+            <a:prstTxWarp prst="textNoShape">
+              <a:avLst/>
+            </a:prstTxWarp>
+          </a:bodyPr>
+          <a:lstStyle>
+            <a:lvl1pPr algn="ctr" rtl="0" eaLnBrk="1" fontAlgn="base" hangingPunct="1">
+              <a:spcBef>
+                <a:spcPct val="0"/>
+              </a:spcBef>
+              <a:spcAft>
+                <a:spcPct val="0"/>
+              </a:spcAft>
+              <a:defRPr sz="5800">
+                <a:solidFill>
+                  <a:schemeClr val="tx2"/>
+                </a:solidFill>
+                <a:latin typeface="+mj-lt"/>
+                <a:ea typeface="+mj-ea"/>
+                <a:cs typeface="+mj-cs"/>
+              </a:defRPr>
+            </a:lvl1pPr>
+            <a:lvl2pPr algn="l" rtl="0" eaLnBrk="1" fontAlgn="base" hangingPunct="1">
+              <a:spcBef>
+                <a:spcPct val="0"/>
+              </a:spcBef>
+              <a:spcAft>
+                <a:spcPct val="0"/>
+              </a:spcAft>
+              <a:defRPr sz="4400">
+                <a:solidFill>
+                  <a:schemeClr val="tx2"/>
+                </a:solidFill>
+                <a:latin typeface="Times New Roman" pitchFamily="18" charset="0"/>
+              </a:defRPr>
+            </a:lvl2pPr>
+            <a:lvl3pPr algn="l" rtl="0" eaLnBrk="1" fontAlgn="base" hangingPunct="1">
+              <a:spcBef>
+                <a:spcPct val="0"/>
+              </a:spcBef>
+              <a:spcAft>
+                <a:spcPct val="0"/>
+              </a:spcAft>
+              <a:defRPr sz="4400">
+                <a:solidFill>
+                  <a:schemeClr val="tx2"/>
+                </a:solidFill>
+                <a:latin typeface="Times New Roman" pitchFamily="18" charset="0"/>
+              </a:defRPr>
+            </a:lvl3pPr>
+            <a:lvl4pPr algn="l" rtl="0" eaLnBrk="1" fontAlgn="base" hangingPunct="1">
+              <a:spcBef>
+                <a:spcPct val="0"/>
+              </a:spcBef>
+              <a:spcAft>
+                <a:spcPct val="0"/>
+              </a:spcAft>
+              <a:defRPr sz="4400">
+                <a:solidFill>
+                  <a:schemeClr val="tx2"/>
+                </a:solidFill>
+                <a:latin typeface="Times New Roman" pitchFamily="18" charset="0"/>
+              </a:defRPr>
+            </a:lvl4pPr>
+            <a:lvl5pPr algn="l" rtl="0" eaLnBrk="1" fontAlgn="base" hangingPunct="1">
+              <a:spcBef>
+                <a:spcPct val="0"/>
+              </a:spcBef>
+              <a:spcAft>
+                <a:spcPct val="0"/>
+              </a:spcAft>
+              <a:defRPr sz="4400">
+                <a:solidFill>
+                  <a:schemeClr val="tx2"/>
+                </a:solidFill>
+                <a:latin typeface="Times New Roman" pitchFamily="18" charset="0"/>
+              </a:defRPr>
+            </a:lvl5pPr>
+            <a:lvl6pPr marL="457200" algn="l" rtl="0" eaLnBrk="1" fontAlgn="base" hangingPunct="1">
+              <a:spcBef>
+                <a:spcPct val="0"/>
+              </a:spcBef>
+              <a:spcAft>
+                <a:spcPct val="0"/>
+              </a:spcAft>
+              <a:defRPr sz="4400">
+                <a:solidFill>
+                  <a:schemeClr val="tx2"/>
+                </a:solidFill>
+                <a:latin typeface="Times New Roman" pitchFamily="18" charset="0"/>
+              </a:defRPr>
+            </a:lvl6pPr>
+            <a:lvl7pPr marL="914400" algn="l" rtl="0" eaLnBrk="1" fontAlgn="base" hangingPunct="1">
+              <a:spcBef>
+                <a:spcPct val="0"/>
+              </a:spcBef>
+              <a:spcAft>
+                <a:spcPct val="0"/>
+              </a:spcAft>
+              <a:defRPr sz="4400">
+                <a:solidFill>
+                  <a:schemeClr val="tx2"/>
+                </a:solidFill>
+                <a:latin typeface="Times New Roman" pitchFamily="18" charset="0"/>
+              </a:defRPr>
+            </a:lvl7pPr>
+            <a:lvl8pPr marL="1371600" algn="l" rtl="0" eaLnBrk="1" fontAlgn="base" hangingPunct="1">
+              <a:spcBef>
+                <a:spcPct val="0"/>
+              </a:spcBef>
+              <a:spcAft>
+                <a:spcPct val="0"/>
+              </a:spcAft>
+              <a:defRPr sz="4400">
+                <a:solidFill>
+                  <a:schemeClr val="tx2"/>
+                </a:solidFill>
+                <a:latin typeface="Times New Roman" pitchFamily="18" charset="0"/>
+              </a:defRPr>
+            </a:lvl8pPr>
+            <a:lvl9pPr marL="1828800" algn="l" rtl="0" eaLnBrk="1" fontAlgn="base" hangingPunct="1">
+              <a:spcBef>
+                <a:spcPct val="0"/>
+              </a:spcBef>
+              <a:spcAft>
+                <a:spcPct val="0"/>
+              </a:spcAft>
+              <a:defRPr sz="4400">
+                <a:solidFill>
+                  <a:schemeClr val="tx2"/>
+                </a:solidFill>
+                <a:latin typeface="Times New Roman" pitchFamily="18" charset="0"/>
+              </a:defRPr>
+            </a:lvl9pPr>
+          </a:lstStyle>
+          <a:p>
+            <a:r>
+              <a:rPr lang="zh-TW" altLang="en-US" sz="4000" b="1" dirty="0"/>
+              <a:t>教育部新型態資安實務示範課程</a:t>
+            </a:r>
+            <a:endParaRPr lang="en-US" altLang="zh-TW" sz="4000" b="1" dirty="0"/>
+          </a:p>
+          <a:p>
+            <a:r>
+              <a:rPr lang="zh-TW" altLang="en-US" sz="4000" b="1" dirty="0"/>
+              <a:t>發展計畫</a:t>
+            </a:r>
+            <a:endParaRPr lang="en-US" altLang="zh-TW" sz="4000" b="1" dirty="0"/>
+          </a:p>
+          <a:p>
+            <a:endParaRPr lang="en-US" altLang="zh-TW" sz="4000" b="1" dirty="0"/>
+          </a:p>
+          <a:p>
+            <a:r>
+              <a:rPr lang="zh-TW" altLang="en-US" sz="4000" b="1" kern="0" dirty="0"/>
+              <a:t>國立屏東大學資料庫安全實務團隊</a:t>
+            </a:r>
+            <a:endParaRPr lang="en-US" altLang="zh-TW" sz="4000" b="1" kern="0" dirty="0"/>
+          </a:p>
+          <a:p>
+            <a:endParaRPr lang="zh-TW" altLang="en-US" sz="4400" b="1" kern="0" dirty="0">
+              <a:latin typeface="Arial Unicode MS" panose="020B0604020202020204" pitchFamily="34" charset="-120"/>
+              <a:ea typeface="Arial Unicode MS" panose="020B0604020202020204" pitchFamily="34" charset="-120"/>
+              <a:cs typeface="Arial Unicode MS" panose="020B0604020202020204" pitchFamily="34" charset="-120"/>
+            </a:endParaRPr>
+          </a:p>
+        </p:txBody>
+      </p:sp>
+    </p:spTree>
+    <p:extLst>
+      <p:ext uri="{BB962C8B-B14F-4D97-AF65-F5344CB8AC3E}">
+        <p14:creationId xmlns:p14="http://schemas.microsoft.com/office/powerpoint/2010/main" val="4205653529"/>
+      </p:ext>
+    </p:extLst>
+  </p:cSld>
+  <p:clrMapOvr>
+    <a:masterClrMapping/>
+  </p:clrMapOvr>
+</p:sldLayout>
+</file>
+
+<file path=ppt/slideLayouts/slideLayout5.xml><?xml version="1.0" encoding="utf-8"?>
+<p:sldLayout xmlns:a="http://schemas.openxmlformats.org/drawingml/2006/main" xmlns:r="http://schemas.openxmlformats.org/officeDocument/2006/relationships" xmlns:p="http://schemas.openxmlformats.org/presentationml/2006/main" showMasterSp="0" preserve="1" userDrawn="1">
+  <p:cSld name="2_標題投影片">
+    <p:spTree>
+      <p:nvGrpSpPr>
+        <p:cNvPr id="1" name=""/>
+        <p:cNvGrpSpPr/>
+        <p:nvPr/>
+      </p:nvGrpSpPr>
+      <p:grpSpPr>
+        <a:xfrm>
+          <a:off x="0" y="0"/>
+          <a:ext cx="0" cy="0"/>
+          <a:chOff x="0" y="0"/>
+          <a:chExt cx="0" cy="0"/>
+        </a:xfrm>
+      </p:grpSpPr>
+      <p:sp>
+        <p:nvSpPr>
+          <p:cNvPr id="16388" name="Rectangle 4"/>
+          <p:cNvSpPr>
+            <a:spLocks noGrp="1" noChangeArrowheads="1"/>
+          </p:cNvSpPr>
+          <p:nvPr>
+            <p:ph type="dt" sz="half" idx="2"/>
+          </p:nvPr>
+        </p:nvSpPr>
+        <p:spPr/>
+        <p:txBody>
+          <a:bodyPr/>
+          <a:lstStyle>
+            <a:lvl1pPr>
+              <a:defRPr/>
+            </a:lvl1pPr>
+          </a:lstStyle>
+          <a:p>
+            <a:fld id="{6DF925A2-9B04-41AD-AF8B-82A5F4D315EC}" type="datetimeFigureOut">
+              <a:rPr lang="en-US" smtClean="0"/>
+              <a:t>10/25/2019</a:t>
+            </a:fld>
+            <a:endParaRPr lang="en-US"/>
+          </a:p>
+        </p:txBody>
+      </p:sp>
+      <p:sp>
+        <p:nvSpPr>
+          <p:cNvPr id="16389" name="Rectangle 5"/>
+          <p:cNvSpPr>
+            <a:spLocks noGrp="1" noChangeArrowheads="1"/>
+          </p:cNvSpPr>
+          <p:nvPr>
+            <p:ph type="ftr" sz="quarter" idx="3"/>
+          </p:nvPr>
+        </p:nvSpPr>
+        <p:spPr/>
+        <p:txBody>
+          <a:bodyPr/>
+          <a:lstStyle>
+            <a:lvl1pPr>
+              <a:defRPr/>
+            </a:lvl1pPr>
+          </a:lstStyle>
+          <a:p>
+            <a:endParaRPr lang="en-US"/>
+          </a:p>
+        </p:txBody>
+      </p:sp>
+      <p:sp>
+        <p:nvSpPr>
+          <p:cNvPr id="16390" name="Rectangle 6"/>
+          <p:cNvSpPr>
+            <a:spLocks noGrp="1" noChangeArrowheads="1"/>
+          </p:cNvSpPr>
+          <p:nvPr>
+            <p:ph type="sldNum" sz="quarter" idx="4"/>
+          </p:nvPr>
+        </p:nvSpPr>
+        <p:spPr/>
+        <p:txBody>
+          <a:bodyPr/>
+          <a:lstStyle>
+            <a:lvl1pPr>
+              <a:defRPr/>
+            </a:lvl1pPr>
+          </a:lstStyle>
+          <a:p>
+            <a:fld id="{9A950C51-85E1-4166-98BA-4226DDC92F1D}" type="slidenum">
+              <a:rPr lang="en-US" smtClean="0"/>
+              <a:t>‹#›</a:t>
+            </a:fld>
+            <a:endParaRPr lang="en-US"/>
+          </a:p>
+        </p:txBody>
+      </p:sp>
+      <p:sp>
+        <p:nvSpPr>
+          <p:cNvPr id="10" name="Rectangle 8" descr="Gold bar">
+            <a:extLst>
+              <a:ext uri="{FF2B5EF4-FFF2-40B4-BE49-F238E27FC236}">
+                <a16:creationId xmlns:a16="http://schemas.microsoft.com/office/drawing/2014/main" id="{E7D4FC3C-1D88-474A-A6BF-E9EE21D82F64}"/>
+              </a:ext>
+            </a:extLst>
+          </p:cNvPr>
+          <p:cNvSpPr>
+            <a:spLocks noChangeArrowheads="1"/>
+          </p:cNvSpPr>
+          <p:nvPr userDrawn="1"/>
+        </p:nvSpPr>
+        <p:spPr bwMode="auto">
+          <a:xfrm>
+            <a:off x="228600" y="2420888"/>
+            <a:ext cx="2870200" cy="201613"/>
+          </a:xfrm>
+          <a:prstGeom prst="rect">
+            <a:avLst/>
+          </a:prstGeom>
+          <a:solidFill>
+            <a:schemeClr val="bg2"/>
+          </a:solidFill>
+          <a:ln>
+            <a:noFill/>
+          </a:ln>
+          <a:effectLst/>
+          <a:extLst>
+            <a:ext uri="{91240B29-F687-4F45-9708-019B960494DF}">
+              <a14:hiddenLine xmlns:a14="http://schemas.microsoft.com/office/drawing/2010/main" w="9525">
+                <a:solidFill>
+                  <a:schemeClr val="tx1"/>
+                </a:solidFill>
+                <a:miter lim="800000"/>
+                <a:headEnd/>
+                <a:tailEnd/>
+              </a14:hiddenLine>
+            </a:ext>
+            <a:ext uri="{AF507438-7753-43E0-B8FC-AC1667EBCBE1}">
+              <a14:hiddenEffects xmlns:a14="http://schemas.microsoft.com/office/drawing/2010/main">
+                <a:effectLst>
+                  <a:outerShdw dist="35921" dir="2700000" algn="ctr" rotWithShape="0">
+                    <a:schemeClr val="bg2"/>
+                  </a:outerShdw>
+                </a:effectLst>
+              </a14:hiddenEffects>
+            </a:ext>
+          </a:extLst>
+        </p:spPr>
+        <p:txBody>
+          <a:bodyPr wrap="none" anchor="ctr"/>
+          <a:lstStyle/>
+          <a:p>
+            <a:endParaRPr lang="en-US"/>
+          </a:p>
+        </p:txBody>
+      </p:sp>
+      <p:sp>
+        <p:nvSpPr>
+          <p:cNvPr id="11" name="Rectangle 9" descr="Orange bar">
+            <a:extLst>
+              <a:ext uri="{FF2B5EF4-FFF2-40B4-BE49-F238E27FC236}">
+                <a16:creationId xmlns:a16="http://schemas.microsoft.com/office/drawing/2014/main" id="{CAFA7AD7-7079-46BB-9512-95E1C1C93A4C}"/>
+              </a:ext>
+            </a:extLst>
+          </p:cNvPr>
+          <p:cNvSpPr>
+            <a:spLocks noChangeArrowheads="1"/>
+          </p:cNvSpPr>
+          <p:nvPr userDrawn="1"/>
+        </p:nvSpPr>
+        <p:spPr bwMode="auto">
+          <a:xfrm>
+            <a:off x="3098800" y="2420888"/>
+            <a:ext cx="2870200" cy="201613"/>
+          </a:xfrm>
+          <a:prstGeom prst="rect">
+            <a:avLst/>
+          </a:prstGeom>
+          <a:solidFill>
+            <a:schemeClr val="accent1"/>
+          </a:solidFill>
+          <a:ln>
+            <a:noFill/>
+          </a:ln>
+          <a:effectLst/>
+          <a:extLst>
+            <a:ext uri="{91240B29-F687-4F45-9708-019B960494DF}">
+              <a14:hiddenLine xmlns:a14="http://schemas.microsoft.com/office/drawing/2010/main" w="9525">
+                <a:solidFill>
+                  <a:schemeClr val="tx1"/>
+                </a:solidFill>
+                <a:miter lim="800000"/>
+                <a:headEnd/>
+                <a:tailEnd/>
+              </a14:hiddenLine>
+            </a:ext>
+            <a:ext uri="{AF507438-7753-43E0-B8FC-AC1667EBCBE1}">
+              <a14:hiddenEffects xmlns:a14="http://schemas.microsoft.com/office/drawing/2010/main">
+                <a:effectLst>
+                  <a:outerShdw dist="35921" dir="2700000" algn="ctr" rotWithShape="0">
+                    <a:schemeClr val="bg2"/>
+                  </a:outerShdw>
+                </a:effectLst>
+              </a14:hiddenEffects>
+            </a:ext>
+          </a:extLst>
+        </p:spPr>
+        <p:txBody>
+          <a:bodyPr wrap="none" anchor="ctr"/>
+          <a:lstStyle/>
+          <a:p>
+            <a:endParaRPr lang="en-US"/>
+          </a:p>
+        </p:txBody>
+      </p:sp>
+      <p:sp>
+        <p:nvSpPr>
+          <p:cNvPr id="12" name="Rectangle 10" descr="Slate bar">
+            <a:extLst>
+              <a:ext uri="{FF2B5EF4-FFF2-40B4-BE49-F238E27FC236}">
+                <a16:creationId xmlns:a16="http://schemas.microsoft.com/office/drawing/2014/main" id="{2F2D1EAF-5811-4EF4-BFE6-BADE17C860A0}"/>
+              </a:ext>
+            </a:extLst>
+          </p:cNvPr>
+          <p:cNvSpPr>
+            <a:spLocks noChangeArrowheads="1"/>
+          </p:cNvSpPr>
+          <p:nvPr userDrawn="1"/>
+        </p:nvSpPr>
+        <p:spPr bwMode="auto">
+          <a:xfrm>
+            <a:off x="5969000" y="2420888"/>
+            <a:ext cx="2870200" cy="201613"/>
+          </a:xfrm>
+          <a:prstGeom prst="rect">
+            <a:avLst/>
+          </a:prstGeom>
+          <a:solidFill>
+            <a:schemeClr val="tx2"/>
+          </a:solidFill>
+          <a:ln>
+            <a:noFill/>
+          </a:ln>
+          <a:effectLst/>
+          <a:extLst>
+            <a:ext uri="{91240B29-F687-4F45-9708-019B960494DF}">
+              <a14:hiddenLine xmlns:a14="http://schemas.microsoft.com/office/drawing/2010/main" w="9525">
+                <a:solidFill>
+                  <a:schemeClr val="tx1"/>
+                </a:solidFill>
+                <a:miter lim="800000"/>
+                <a:headEnd/>
+                <a:tailEnd/>
+              </a14:hiddenLine>
+            </a:ext>
+            <a:ext uri="{AF507438-7753-43E0-B8FC-AC1667EBCBE1}">
+              <a14:hiddenEffects xmlns:a14="http://schemas.microsoft.com/office/drawing/2010/main">
+                <a:effectLst>
+                  <a:outerShdw dist="35921" dir="2700000" algn="ctr" rotWithShape="0">
+                    <a:schemeClr val="bg2"/>
+                  </a:outerShdw>
+                </a:effectLst>
+              </a14:hiddenEffects>
+            </a:ext>
+          </a:extLst>
+        </p:spPr>
+        <p:txBody>
+          <a:bodyPr wrap="none" anchor="ctr"/>
+          <a:lstStyle/>
+          <a:p>
+            <a:endParaRPr lang="en-US"/>
+          </a:p>
+        </p:txBody>
+      </p:sp>
+      <p:sp>
+        <p:nvSpPr>
+          <p:cNvPr id="13" name="Rectangle 2">
+            <a:extLst>
+              <a:ext uri="{FF2B5EF4-FFF2-40B4-BE49-F238E27FC236}">
+                <a16:creationId xmlns:a16="http://schemas.microsoft.com/office/drawing/2014/main" id="{F93C8682-563B-4AEA-9CC7-EA0EF506A6CD}"/>
+              </a:ext>
+            </a:extLst>
+          </p:cNvPr>
+          <p:cNvSpPr>
+            <a:spLocks noGrp="1" noChangeArrowheads="1"/>
+          </p:cNvSpPr>
+          <p:nvPr>
+            <p:ph type="ctrTitle"/>
+          </p:nvPr>
+        </p:nvSpPr>
+        <p:spPr>
+          <a:xfrm>
+            <a:off x="685800" y="2880360"/>
+            <a:ext cx="7772400" cy="1143000"/>
+          </a:xfrm>
+        </p:spPr>
+        <p:txBody>
+          <a:bodyPr/>
+          <a:lstStyle>
+            <a:lvl1pPr algn="ctr">
+              <a:defRPr sz="4400" b="1"/>
+            </a:lvl1pPr>
+          </a:lstStyle>
+          <a:p>
+            <a:pPr lvl="0"/>
+            <a:r>
+              <a:rPr lang="zh-TW" altLang="en-US" noProof="0" dirty="0"/>
+              <a:t>按一下以編輯母片標題樣式</a:t>
+            </a:r>
+            <a:endParaRPr lang="en-US" noProof="0" dirty="0"/>
+          </a:p>
+        </p:txBody>
+      </p:sp>
+    </p:spTree>
+    <p:extLst>
+      <p:ext uri="{BB962C8B-B14F-4D97-AF65-F5344CB8AC3E}">
+        <p14:creationId xmlns:p14="http://schemas.microsoft.com/office/powerpoint/2010/main" val="869585866"/>
+      </p:ext>
+    </p:extLst>
+  </p:cSld>
+  <p:clrMapOvr>
+    <a:masterClrMapping/>
+  </p:clrMapOvr>
+</p:sldLayout>
+</file>
+
+<file path=ppt/slideLayouts/slideLayout6.xml><?xml version="1.0" encoding="utf-8"?>
+<p:sldLayout xmlns:a="http://schemas.openxmlformats.org/drawingml/2006/main" xmlns:r="http://schemas.openxmlformats.org/officeDocument/2006/relationships" xmlns:p="http://schemas.openxmlformats.org/presentationml/2006/main" preserve="1" userDrawn="1">
+  <p:cSld name="1_章節副標題">
+    <p:spTree>
+      <p:nvGrpSpPr>
+        <p:cNvPr id="1" name=""/>
+        <p:cNvGrpSpPr/>
+        <p:nvPr/>
+      </p:nvGrpSpPr>
+      <p:grpSpPr>
+        <a:xfrm>
+          <a:off x="0" y="0"/>
+          <a:ext cx="0" cy="0"/>
+          <a:chOff x="0" y="0"/>
+          <a:chExt cx="0" cy="0"/>
+        </a:xfrm>
+      </p:grpSpPr>
+      <p:sp>
+        <p:nvSpPr>
+          <p:cNvPr id="2" name="Title 1"/>
+          <p:cNvSpPr>
+            <a:spLocks noGrp="1"/>
+          </p:cNvSpPr>
+          <p:nvPr>
+            <p:ph type="title"/>
+          </p:nvPr>
+        </p:nvSpPr>
+        <p:spPr>
+          <a:xfrm>
+            <a:off x="722313" y="2523518"/>
+            <a:ext cx="7772400" cy="1898853"/>
+          </a:xfrm>
+        </p:spPr>
+        <p:txBody>
+          <a:bodyPr anchor="t"/>
+          <a:lstStyle>
+            <a:lvl1pPr algn="ctr">
+              <a:defRPr sz="4400" b="1" cap="all"/>
+            </a:lvl1pPr>
+          </a:lstStyle>
+          <a:p>
+            <a:r>
+              <a:rPr lang="en-US" altLang="zh-TW" dirty="0"/>
+              <a:t>Click to edit Master title style</a:t>
+            </a:r>
+            <a:endParaRPr lang="en-US" dirty="0"/>
+          </a:p>
+        </p:txBody>
+      </p:sp>
+      <p:sp>
+        <p:nvSpPr>
+          <p:cNvPr id="4" name="Date Placeholder 3"/>
+          <p:cNvSpPr>
+            <a:spLocks noGrp="1"/>
+          </p:cNvSpPr>
+          <p:nvPr>
+            <p:ph type="dt" sz="half" idx="10"/>
+          </p:nvPr>
+        </p:nvSpPr>
+        <p:spPr/>
+        <p:txBody>
+          <a:bodyPr/>
+          <a:lstStyle>
+            <a:lvl1pPr>
+              <a:defRPr/>
+            </a:lvl1pPr>
+          </a:lstStyle>
+          <a:p>
+            <a:fld id="{6DF925A2-9B04-41AD-AF8B-82A5F4D315EC}" type="datetimeFigureOut">
+              <a:rPr lang="en-US" smtClean="0"/>
+              <a:t>10/25/2019</a:t>
+            </a:fld>
+            <a:endParaRPr lang="en-US"/>
+          </a:p>
+        </p:txBody>
+      </p:sp>
+      <p:sp>
+        <p:nvSpPr>
+          <p:cNvPr id="5" name="Footer Placeholder 4"/>
+          <p:cNvSpPr>
+            <a:spLocks noGrp="1"/>
+          </p:cNvSpPr>
+          <p:nvPr>
+            <p:ph type="ftr" sz="quarter" idx="11"/>
+          </p:nvPr>
+        </p:nvSpPr>
+        <p:spPr/>
+        <p:txBody>
+          <a:bodyPr/>
+          <a:lstStyle>
+            <a:lvl1pPr>
+              <a:defRPr/>
+            </a:lvl1pPr>
+          </a:lstStyle>
+          <a:p>
+            <a:endParaRPr lang="en-US"/>
+          </a:p>
+        </p:txBody>
+      </p:sp>
+      <p:sp>
+        <p:nvSpPr>
+          <p:cNvPr id="6" name="Slide Number Placeholder 5"/>
+          <p:cNvSpPr>
+            <a:spLocks noGrp="1"/>
+          </p:cNvSpPr>
+          <p:nvPr>
+            <p:ph type="sldNum" sz="quarter" idx="12"/>
+          </p:nvPr>
+        </p:nvSpPr>
+        <p:spPr/>
+        <p:txBody>
+          <a:bodyPr/>
+          <a:lstStyle>
+            <a:lvl1pPr>
+              <a:defRPr/>
+            </a:lvl1pPr>
+          </a:lstStyle>
+          <a:p>
+            <a:fld id="{9A950C51-85E1-4166-98BA-4226DDC92F1D}" type="slidenum">
+              <a:rPr lang="en-US" smtClean="0"/>
+              <a:t>‹#›</a:t>
+            </a:fld>
+            <a:endParaRPr lang="en-US"/>
+          </a:p>
+        </p:txBody>
+      </p:sp>
+    </p:spTree>
+    <p:extLst>
+      <p:ext uri="{BB962C8B-B14F-4D97-AF65-F5344CB8AC3E}">
+        <p14:creationId xmlns:p14="http://schemas.microsoft.com/office/powerpoint/2010/main" val="4161327237"/>
+      </p:ext>
+    </p:extLst>
+  </p:cSld>
+  <p:clrMapOvr>
+    <a:masterClrMapping/>
+  </p:clrMapOvr>
+</p:sldLayout>
+</file>
+
+<file path=ppt/slideLayouts/slideLayout7.xml><?xml version="1.0" encoding="utf-8"?>
 <p:sldLayout xmlns:a="http://schemas.openxmlformats.org/drawingml/2006/main" xmlns:r="http://schemas.openxmlformats.org/officeDocument/2006/relationships" xmlns:p="http://schemas.openxmlformats.org/presentationml/2006/main" type="twoObj" preserve="1">
   <p:cSld name="兩項物件">
     <p:spTree>
@@ -2018,7 +4463,7 @@
           <a:p>
             <a:fld id="{6DF925A2-9B04-41AD-AF8B-82A5F4D315EC}" type="datetimeFigureOut">
               <a:rPr lang="en-US" smtClean="0"/>
-              <a:t>9/12/2019</a:t>
+              <a:t>10/25/2019</a:t>
             </a:fld>
             <a:endParaRPr lang="en-US"/>
           </a:p>
@@ -2087,7 +4532,7 @@
 </p:sldLayout>
 </file>
 
-<file path=ppt/slideLayouts/slideLayout5.xml><?xml version="1.0" encoding="utf-8"?>
+<file path=ppt/slideLayouts/slideLayout8.xml><?xml version="1.0" encoding="utf-8"?>
 <p:sldLayout xmlns:a="http://schemas.openxmlformats.org/drawingml/2006/main" xmlns:r="http://schemas.openxmlformats.org/officeDocument/2006/relationships" xmlns:p="http://schemas.openxmlformats.org/presentationml/2006/main" type="twoTxTwoObj" preserve="1">
   <p:cSld name="比對">
     <p:spTree>
@@ -2457,7 +4902,7 @@
           <a:p>
             <a:fld id="{6DF925A2-9B04-41AD-AF8B-82A5F4D315EC}" type="datetimeFigureOut">
               <a:rPr lang="en-US" smtClean="0"/>
-              <a:t>9/12/2019</a:t>
+              <a:t>10/25/2019</a:t>
             </a:fld>
             <a:endParaRPr lang="en-US"/>
           </a:p>
@@ -2526,7 +4971,7 @@
 </p:sldLayout>
 </file>
 
-<file path=ppt/slideLayouts/slideLayout6.xml><?xml version="1.0" encoding="utf-8"?>
+<file path=ppt/slideLayouts/slideLayout9.xml><?xml version="1.0" encoding="utf-8"?>
 <p:sldLayout xmlns:a="http://schemas.openxmlformats.org/drawingml/2006/main" xmlns:r="http://schemas.openxmlformats.org/officeDocument/2006/relationships" xmlns:p="http://schemas.openxmlformats.org/presentationml/2006/main" type="titleOnly" preserve="1">
   <p:cSld name="只有標題">
     <p:spTree>
@@ -2587,7 +5032,7 @@
           <a:p>
             <a:fld id="{6DF925A2-9B04-41AD-AF8B-82A5F4D315EC}" type="datetimeFigureOut">
               <a:rPr lang="en-US" smtClean="0"/>
-              <a:t>9/12/2019</a:t>
+              <a:t>10/25/2019</a:t>
             </a:fld>
             <a:endParaRPr lang="en-US"/>
           </a:p>
@@ -2647,671 +5092,6 @@
     <p:extLst>
       <p:ext uri="{BB962C8B-B14F-4D97-AF65-F5344CB8AC3E}">
         <p14:creationId xmlns:p14="http://schemas.microsoft.com/office/powerpoint/2010/main" val="1158447595"/>
-      </p:ext>
-    </p:extLst>
-  </p:cSld>
-  <p:clrMapOvr>
-    <a:masterClrMapping/>
-  </p:clrMapOvr>
-</p:sldLayout>
-</file>
-
-<file path=ppt/slideLayouts/slideLayout7.xml><?xml version="1.0" encoding="utf-8"?>
-<p:sldLayout xmlns:a="http://schemas.openxmlformats.org/drawingml/2006/main" xmlns:r="http://schemas.openxmlformats.org/officeDocument/2006/relationships" xmlns:p="http://schemas.openxmlformats.org/presentationml/2006/main" type="blank" preserve="1">
-  <p:cSld name="空白">
-    <p:spTree>
-      <p:nvGrpSpPr>
-        <p:cNvPr id="1" name=""/>
-        <p:cNvGrpSpPr/>
-        <p:nvPr/>
-      </p:nvGrpSpPr>
-      <p:grpSpPr>
-        <a:xfrm>
-          <a:off x="0" y="0"/>
-          <a:ext cx="0" cy="0"/>
-          <a:chOff x="0" y="0"/>
-          <a:chExt cx="0" cy="0"/>
-        </a:xfrm>
-      </p:grpSpPr>
-      <p:sp>
-        <p:nvSpPr>
-          <p:cNvPr id="2" name="Date Placeholder 1"/>
-          <p:cNvSpPr>
-            <a:spLocks noGrp="1"/>
-          </p:cNvSpPr>
-          <p:nvPr>
-            <p:ph type="dt" sz="half" idx="10"/>
-          </p:nvPr>
-        </p:nvSpPr>
-        <p:spPr/>
-        <p:txBody>
-          <a:bodyPr/>
-          <a:lstStyle>
-            <a:lvl1pPr>
-              <a:defRPr/>
-            </a:lvl1pPr>
-          </a:lstStyle>
-          <a:p>
-            <a:fld id="{6DF925A2-9B04-41AD-AF8B-82A5F4D315EC}" type="datetimeFigureOut">
-              <a:rPr lang="en-US" smtClean="0"/>
-              <a:t>9/12/2019</a:t>
-            </a:fld>
-            <a:endParaRPr lang="en-US"/>
-          </a:p>
-        </p:txBody>
-      </p:sp>
-      <p:sp>
-        <p:nvSpPr>
-          <p:cNvPr id="3" name="Footer Placeholder 2"/>
-          <p:cNvSpPr>
-            <a:spLocks noGrp="1"/>
-          </p:cNvSpPr>
-          <p:nvPr>
-            <p:ph type="ftr" sz="quarter" idx="11"/>
-          </p:nvPr>
-        </p:nvSpPr>
-        <p:spPr/>
-        <p:txBody>
-          <a:bodyPr/>
-          <a:lstStyle>
-            <a:lvl1pPr>
-              <a:defRPr/>
-            </a:lvl1pPr>
-          </a:lstStyle>
-          <a:p>
-            <a:endParaRPr lang="en-US"/>
-          </a:p>
-        </p:txBody>
-      </p:sp>
-      <p:sp>
-        <p:nvSpPr>
-          <p:cNvPr id="4" name="Slide Number Placeholder 3"/>
-          <p:cNvSpPr>
-            <a:spLocks noGrp="1"/>
-          </p:cNvSpPr>
-          <p:nvPr>
-            <p:ph type="sldNum" sz="quarter" idx="12"/>
-          </p:nvPr>
-        </p:nvSpPr>
-        <p:spPr/>
-        <p:txBody>
-          <a:bodyPr/>
-          <a:lstStyle>
-            <a:lvl1pPr>
-              <a:defRPr/>
-            </a:lvl1pPr>
-          </a:lstStyle>
-          <a:p>
-            <a:fld id="{9A950C51-85E1-4166-98BA-4226DDC92F1D}" type="slidenum">
-              <a:rPr lang="en-US" smtClean="0"/>
-              <a:t>‹#›</a:t>
-            </a:fld>
-            <a:endParaRPr lang="en-US"/>
-          </a:p>
-        </p:txBody>
-      </p:sp>
-    </p:spTree>
-    <p:extLst>
-      <p:ext uri="{BB962C8B-B14F-4D97-AF65-F5344CB8AC3E}">
-        <p14:creationId xmlns:p14="http://schemas.microsoft.com/office/powerpoint/2010/main" val="770823296"/>
-      </p:ext>
-    </p:extLst>
-  </p:cSld>
-  <p:clrMapOvr>
-    <a:masterClrMapping/>
-  </p:clrMapOvr>
-</p:sldLayout>
-</file>
-
-<file path=ppt/slideLayouts/slideLayout8.xml><?xml version="1.0" encoding="utf-8"?>
-<p:sldLayout xmlns:a="http://schemas.openxmlformats.org/drawingml/2006/main" xmlns:r="http://schemas.openxmlformats.org/officeDocument/2006/relationships" xmlns:p="http://schemas.openxmlformats.org/presentationml/2006/main" type="objTx" preserve="1">
-  <p:cSld name="含標題的內容">
-    <p:spTree>
-      <p:nvGrpSpPr>
-        <p:cNvPr id="1" name=""/>
-        <p:cNvGrpSpPr/>
-        <p:nvPr/>
-      </p:nvGrpSpPr>
-      <p:grpSpPr>
-        <a:xfrm>
-          <a:off x="0" y="0"/>
-          <a:ext cx="0" cy="0"/>
-          <a:chOff x="0" y="0"/>
-          <a:chExt cx="0" cy="0"/>
-        </a:xfrm>
-      </p:grpSpPr>
-      <p:sp>
-        <p:nvSpPr>
-          <p:cNvPr id="2" name="Title 1"/>
-          <p:cNvSpPr>
-            <a:spLocks noGrp="1"/>
-          </p:cNvSpPr>
-          <p:nvPr>
-            <p:ph type="title"/>
-          </p:nvPr>
-        </p:nvSpPr>
-        <p:spPr>
-          <a:xfrm>
-            <a:off x="457200" y="273050"/>
-            <a:ext cx="3008313" cy="1162050"/>
-          </a:xfrm>
-        </p:spPr>
-        <p:txBody>
-          <a:bodyPr/>
-          <a:lstStyle>
-            <a:lvl1pPr algn="l">
-              <a:defRPr sz="2000" b="1"/>
-            </a:lvl1pPr>
-          </a:lstStyle>
-          <a:p>
-            <a:r>
-              <a:rPr lang="en-US" altLang="zh-TW"/>
-              <a:t>Click to edit Master title style</a:t>
-            </a:r>
-            <a:endParaRPr lang="en-US"/>
-          </a:p>
-        </p:txBody>
-      </p:sp>
-      <p:sp>
-        <p:nvSpPr>
-          <p:cNvPr id="3" name="Content Placeholder 2"/>
-          <p:cNvSpPr>
-            <a:spLocks noGrp="1"/>
-          </p:cNvSpPr>
-          <p:nvPr>
-            <p:ph idx="1"/>
-          </p:nvPr>
-        </p:nvSpPr>
-        <p:spPr>
-          <a:xfrm>
-            <a:off x="3575050" y="273050"/>
-            <a:ext cx="5111750" cy="5853113"/>
-          </a:xfrm>
-        </p:spPr>
-        <p:txBody>
-          <a:bodyPr/>
-          <a:lstStyle>
-            <a:lvl1pPr>
-              <a:defRPr sz="3200"/>
-            </a:lvl1pPr>
-            <a:lvl2pPr>
-              <a:defRPr sz="2800"/>
-            </a:lvl2pPr>
-            <a:lvl3pPr>
-              <a:defRPr sz="2400"/>
-            </a:lvl3pPr>
-            <a:lvl4pPr>
-              <a:defRPr sz="2000"/>
-            </a:lvl4pPr>
-            <a:lvl5pPr>
-              <a:defRPr sz="2000"/>
-            </a:lvl5pPr>
-            <a:lvl6pPr>
-              <a:defRPr sz="2000"/>
-            </a:lvl6pPr>
-            <a:lvl7pPr>
-              <a:defRPr sz="2000"/>
-            </a:lvl7pPr>
-            <a:lvl8pPr>
-              <a:defRPr sz="2000"/>
-            </a:lvl8pPr>
-            <a:lvl9pPr>
-              <a:defRPr sz="2000"/>
-            </a:lvl9pPr>
-          </a:lstStyle>
-          <a:p>
-            <a:pPr lvl="0"/>
-            <a:r>
-              <a:rPr lang="en-US" altLang="zh-TW"/>
-              <a:t>Click to edit Master text styles</a:t>
-            </a:r>
-          </a:p>
-          <a:p>
-            <a:pPr lvl="1"/>
-            <a:r>
-              <a:rPr lang="en-US" altLang="zh-TW"/>
-              <a:t>Second level</a:t>
-            </a:r>
-          </a:p>
-          <a:p>
-            <a:pPr lvl="2"/>
-            <a:r>
-              <a:rPr lang="en-US" altLang="zh-TW"/>
-              <a:t>Third level</a:t>
-            </a:r>
-          </a:p>
-          <a:p>
-            <a:pPr lvl="3"/>
-            <a:r>
-              <a:rPr lang="en-US" altLang="zh-TW"/>
-              <a:t>Fourth level</a:t>
-            </a:r>
-          </a:p>
-          <a:p>
-            <a:pPr lvl="4"/>
-            <a:r>
-              <a:rPr lang="en-US" altLang="zh-TW"/>
-              <a:t>Fifth level</a:t>
-            </a:r>
-            <a:endParaRPr lang="en-US"/>
-          </a:p>
-        </p:txBody>
-      </p:sp>
-      <p:sp>
-        <p:nvSpPr>
-          <p:cNvPr id="4" name="Text Placeholder 3"/>
-          <p:cNvSpPr>
-            <a:spLocks noGrp="1"/>
-          </p:cNvSpPr>
-          <p:nvPr>
-            <p:ph type="body" sz="half" idx="2"/>
-          </p:nvPr>
-        </p:nvSpPr>
-        <p:spPr>
-          <a:xfrm>
-            <a:off x="457200" y="1435100"/>
-            <a:ext cx="3008313" cy="4691063"/>
-          </a:xfrm>
-        </p:spPr>
-        <p:txBody>
-          <a:bodyPr/>
-          <a:lstStyle>
-            <a:lvl1pPr marL="0" indent="0">
-              <a:buNone/>
-              <a:defRPr sz="1400"/>
-            </a:lvl1pPr>
-            <a:lvl2pPr marL="457200" indent="0">
-              <a:buNone/>
-              <a:defRPr sz="1200"/>
-            </a:lvl2pPr>
-            <a:lvl3pPr marL="914400" indent="0">
-              <a:buNone/>
-              <a:defRPr sz="1000"/>
-            </a:lvl3pPr>
-            <a:lvl4pPr marL="1371600" indent="0">
-              <a:buNone/>
-              <a:defRPr sz="900"/>
-            </a:lvl4pPr>
-            <a:lvl5pPr marL="1828800" indent="0">
-              <a:buNone/>
-              <a:defRPr sz="900"/>
-            </a:lvl5pPr>
-            <a:lvl6pPr marL="2286000" indent="0">
-              <a:buNone/>
-              <a:defRPr sz="900"/>
-            </a:lvl6pPr>
-            <a:lvl7pPr marL="2743200" indent="0">
-              <a:buNone/>
-              <a:defRPr sz="900"/>
-            </a:lvl7pPr>
-            <a:lvl8pPr marL="3200400" indent="0">
-              <a:buNone/>
-              <a:defRPr sz="900"/>
-            </a:lvl8pPr>
-            <a:lvl9pPr marL="3657600" indent="0">
-              <a:buNone/>
-              <a:defRPr sz="900"/>
-            </a:lvl9pPr>
-          </a:lstStyle>
-          <a:p>
-            <a:pPr lvl="0"/>
-            <a:r>
-              <a:rPr lang="en-US" altLang="zh-TW"/>
-              <a:t>Click to edit Master text styles</a:t>
-            </a:r>
-          </a:p>
-        </p:txBody>
-      </p:sp>
-      <p:sp>
-        <p:nvSpPr>
-          <p:cNvPr id="5" name="Date Placeholder 4"/>
-          <p:cNvSpPr>
-            <a:spLocks noGrp="1"/>
-          </p:cNvSpPr>
-          <p:nvPr>
-            <p:ph type="dt" sz="half" idx="10"/>
-          </p:nvPr>
-        </p:nvSpPr>
-        <p:spPr/>
-        <p:txBody>
-          <a:bodyPr/>
-          <a:lstStyle>
-            <a:lvl1pPr>
-              <a:defRPr/>
-            </a:lvl1pPr>
-          </a:lstStyle>
-          <a:p>
-            <a:fld id="{6DF925A2-9B04-41AD-AF8B-82A5F4D315EC}" type="datetimeFigureOut">
-              <a:rPr lang="en-US" smtClean="0"/>
-              <a:t>9/12/2019</a:t>
-            </a:fld>
-            <a:endParaRPr lang="en-US"/>
-          </a:p>
-        </p:txBody>
-      </p:sp>
-      <p:sp>
-        <p:nvSpPr>
-          <p:cNvPr id="6" name="Footer Placeholder 5"/>
-          <p:cNvSpPr>
-            <a:spLocks noGrp="1"/>
-          </p:cNvSpPr>
-          <p:nvPr>
-            <p:ph type="ftr" sz="quarter" idx="11"/>
-          </p:nvPr>
-        </p:nvSpPr>
-        <p:spPr/>
-        <p:txBody>
-          <a:bodyPr/>
-          <a:lstStyle>
-            <a:lvl1pPr>
-              <a:defRPr/>
-            </a:lvl1pPr>
-          </a:lstStyle>
-          <a:p>
-            <a:endParaRPr lang="en-US"/>
-          </a:p>
-        </p:txBody>
-      </p:sp>
-      <p:sp>
-        <p:nvSpPr>
-          <p:cNvPr id="7" name="Slide Number Placeholder 6"/>
-          <p:cNvSpPr>
-            <a:spLocks noGrp="1"/>
-          </p:cNvSpPr>
-          <p:nvPr>
-            <p:ph type="sldNum" sz="quarter" idx="12"/>
-          </p:nvPr>
-        </p:nvSpPr>
-        <p:spPr/>
-        <p:txBody>
-          <a:bodyPr/>
-          <a:lstStyle>
-            <a:lvl1pPr>
-              <a:defRPr/>
-            </a:lvl1pPr>
-          </a:lstStyle>
-          <a:p>
-            <a:fld id="{9A950C51-85E1-4166-98BA-4226DDC92F1D}" type="slidenum">
-              <a:rPr lang="en-US" smtClean="0"/>
-              <a:t>‹#›</a:t>
-            </a:fld>
-            <a:endParaRPr lang="en-US"/>
-          </a:p>
-        </p:txBody>
-      </p:sp>
-    </p:spTree>
-    <p:extLst>
-      <p:ext uri="{BB962C8B-B14F-4D97-AF65-F5344CB8AC3E}">
-        <p14:creationId xmlns:p14="http://schemas.microsoft.com/office/powerpoint/2010/main" val="872116414"/>
-      </p:ext>
-    </p:extLst>
-  </p:cSld>
-  <p:clrMapOvr>
-    <a:masterClrMapping/>
-  </p:clrMapOvr>
-</p:sldLayout>
-</file>
-
-<file path=ppt/slideLayouts/slideLayout9.xml><?xml version="1.0" encoding="utf-8"?>
-<p:sldLayout xmlns:a="http://schemas.openxmlformats.org/drawingml/2006/main" xmlns:r="http://schemas.openxmlformats.org/officeDocument/2006/relationships" xmlns:p="http://schemas.openxmlformats.org/presentationml/2006/main" type="picTx" preserve="1">
-  <p:cSld name="含標題的圖片">
-    <p:spTree>
-      <p:nvGrpSpPr>
-        <p:cNvPr id="1" name=""/>
-        <p:cNvGrpSpPr/>
-        <p:nvPr/>
-      </p:nvGrpSpPr>
-      <p:grpSpPr>
-        <a:xfrm>
-          <a:off x="0" y="0"/>
-          <a:ext cx="0" cy="0"/>
-          <a:chOff x="0" y="0"/>
-          <a:chExt cx="0" cy="0"/>
-        </a:xfrm>
-      </p:grpSpPr>
-      <p:sp>
-        <p:nvSpPr>
-          <p:cNvPr id="2" name="Title 1"/>
-          <p:cNvSpPr>
-            <a:spLocks noGrp="1"/>
-          </p:cNvSpPr>
-          <p:nvPr>
-            <p:ph type="title"/>
-          </p:nvPr>
-        </p:nvSpPr>
-        <p:spPr>
-          <a:xfrm>
-            <a:off x="1792288" y="4800600"/>
-            <a:ext cx="5486400" cy="566738"/>
-          </a:xfrm>
-        </p:spPr>
-        <p:txBody>
-          <a:bodyPr/>
-          <a:lstStyle>
-            <a:lvl1pPr algn="l">
-              <a:defRPr sz="2000" b="1"/>
-            </a:lvl1pPr>
-          </a:lstStyle>
-          <a:p>
-            <a:r>
-              <a:rPr lang="en-US" altLang="zh-TW"/>
-              <a:t>Click to edit Master title style</a:t>
-            </a:r>
-            <a:endParaRPr lang="en-US"/>
-          </a:p>
-        </p:txBody>
-      </p:sp>
-      <p:sp>
-        <p:nvSpPr>
-          <p:cNvPr id="3" name="Picture Placeholder 2"/>
-          <p:cNvSpPr>
-            <a:spLocks noGrp="1"/>
-          </p:cNvSpPr>
-          <p:nvPr>
-            <p:ph type="pic" idx="1"/>
-          </p:nvPr>
-        </p:nvSpPr>
-        <p:spPr>
-          <a:xfrm>
-            <a:off x="1792288" y="612775"/>
-            <a:ext cx="5486400" cy="4114800"/>
-          </a:xfrm>
-        </p:spPr>
-        <p:txBody>
-          <a:bodyPr/>
-          <a:lstStyle>
-            <a:lvl1pPr marL="0" indent="0">
-              <a:buNone/>
-              <a:defRPr sz="3200"/>
-            </a:lvl1pPr>
-            <a:lvl2pPr marL="457200" indent="0">
-              <a:buNone/>
-              <a:defRPr sz="2800"/>
-            </a:lvl2pPr>
-            <a:lvl3pPr marL="914400" indent="0">
-              <a:buNone/>
-              <a:defRPr sz="2400"/>
-            </a:lvl3pPr>
-            <a:lvl4pPr marL="1371600" indent="0">
-              <a:buNone/>
-              <a:defRPr sz="2000"/>
-            </a:lvl4pPr>
-            <a:lvl5pPr marL="1828800" indent="0">
-              <a:buNone/>
-              <a:defRPr sz="2000"/>
-            </a:lvl5pPr>
-            <a:lvl6pPr marL="2286000" indent="0">
-              <a:buNone/>
-              <a:defRPr sz="2000"/>
-            </a:lvl6pPr>
-            <a:lvl7pPr marL="2743200" indent="0">
-              <a:buNone/>
-              <a:defRPr sz="2000"/>
-            </a:lvl7pPr>
-            <a:lvl8pPr marL="3200400" indent="0">
-              <a:buNone/>
-              <a:defRPr sz="2000"/>
-            </a:lvl8pPr>
-            <a:lvl9pPr marL="3657600" indent="0">
-              <a:buNone/>
-              <a:defRPr sz="2000"/>
-            </a:lvl9pPr>
-          </a:lstStyle>
-          <a:p>
-            <a:r>
-              <a:rPr lang="en-US" altLang="zh-TW"/>
-              <a:t>Click icon to add picture</a:t>
-            </a:r>
-            <a:endParaRPr lang="en-US"/>
-          </a:p>
-        </p:txBody>
-      </p:sp>
-      <p:sp>
-        <p:nvSpPr>
-          <p:cNvPr id="4" name="Text Placeholder 3"/>
-          <p:cNvSpPr>
-            <a:spLocks noGrp="1"/>
-          </p:cNvSpPr>
-          <p:nvPr>
-            <p:ph type="body" sz="half" idx="2"/>
-          </p:nvPr>
-        </p:nvSpPr>
-        <p:spPr>
-          <a:xfrm>
-            <a:off x="1792288" y="5367338"/>
-            <a:ext cx="5486400" cy="804862"/>
-          </a:xfrm>
-        </p:spPr>
-        <p:txBody>
-          <a:bodyPr/>
-          <a:lstStyle>
-            <a:lvl1pPr marL="0" indent="0">
-              <a:buNone/>
-              <a:defRPr sz="1400"/>
-            </a:lvl1pPr>
-            <a:lvl2pPr marL="457200" indent="0">
-              <a:buNone/>
-              <a:defRPr sz="1200"/>
-            </a:lvl2pPr>
-            <a:lvl3pPr marL="914400" indent="0">
-              <a:buNone/>
-              <a:defRPr sz="1000"/>
-            </a:lvl3pPr>
-            <a:lvl4pPr marL="1371600" indent="0">
-              <a:buNone/>
-              <a:defRPr sz="900"/>
-            </a:lvl4pPr>
-            <a:lvl5pPr marL="1828800" indent="0">
-              <a:buNone/>
-              <a:defRPr sz="900"/>
-            </a:lvl5pPr>
-            <a:lvl6pPr marL="2286000" indent="0">
-              <a:buNone/>
-              <a:defRPr sz="900"/>
-            </a:lvl6pPr>
-            <a:lvl7pPr marL="2743200" indent="0">
-              <a:buNone/>
-              <a:defRPr sz="900"/>
-            </a:lvl7pPr>
-            <a:lvl8pPr marL="3200400" indent="0">
-              <a:buNone/>
-              <a:defRPr sz="900"/>
-            </a:lvl8pPr>
-            <a:lvl9pPr marL="3657600" indent="0">
-              <a:buNone/>
-              <a:defRPr sz="900"/>
-            </a:lvl9pPr>
-          </a:lstStyle>
-          <a:p>
-            <a:pPr lvl="0"/>
-            <a:r>
-              <a:rPr lang="en-US" altLang="zh-TW"/>
-              <a:t>Click to edit Master text styles</a:t>
-            </a:r>
-          </a:p>
-        </p:txBody>
-      </p:sp>
-      <p:sp>
-        <p:nvSpPr>
-          <p:cNvPr id="5" name="Date Placeholder 4"/>
-          <p:cNvSpPr>
-            <a:spLocks noGrp="1"/>
-          </p:cNvSpPr>
-          <p:nvPr>
-            <p:ph type="dt" sz="half" idx="10"/>
-          </p:nvPr>
-        </p:nvSpPr>
-        <p:spPr/>
-        <p:txBody>
-          <a:bodyPr/>
-          <a:lstStyle>
-            <a:lvl1pPr>
-              <a:defRPr/>
-            </a:lvl1pPr>
-          </a:lstStyle>
-          <a:p>
-            <a:fld id="{6DF925A2-9B04-41AD-AF8B-82A5F4D315EC}" type="datetimeFigureOut">
-              <a:rPr lang="en-US" smtClean="0"/>
-              <a:t>9/12/2019</a:t>
-            </a:fld>
-            <a:endParaRPr lang="en-US"/>
-          </a:p>
-        </p:txBody>
-      </p:sp>
-      <p:sp>
-        <p:nvSpPr>
-          <p:cNvPr id="6" name="Footer Placeholder 5"/>
-          <p:cNvSpPr>
-            <a:spLocks noGrp="1"/>
-          </p:cNvSpPr>
-          <p:nvPr>
-            <p:ph type="ftr" sz="quarter" idx="11"/>
-          </p:nvPr>
-        </p:nvSpPr>
-        <p:spPr/>
-        <p:txBody>
-          <a:bodyPr/>
-          <a:lstStyle>
-            <a:lvl1pPr>
-              <a:defRPr/>
-            </a:lvl1pPr>
-          </a:lstStyle>
-          <a:p>
-            <a:endParaRPr lang="en-US"/>
-          </a:p>
-        </p:txBody>
-      </p:sp>
-      <p:sp>
-        <p:nvSpPr>
-          <p:cNvPr id="7" name="Slide Number Placeholder 6"/>
-          <p:cNvSpPr>
-            <a:spLocks noGrp="1"/>
-          </p:cNvSpPr>
-          <p:nvPr>
-            <p:ph type="sldNum" sz="quarter" idx="12"/>
-          </p:nvPr>
-        </p:nvSpPr>
-        <p:spPr/>
-        <p:txBody>
-          <a:bodyPr/>
-          <a:lstStyle>
-            <a:lvl1pPr>
-              <a:defRPr/>
-            </a:lvl1pPr>
-          </a:lstStyle>
-          <a:p>
-            <a:fld id="{9A950C51-85E1-4166-98BA-4226DDC92F1D}" type="slidenum">
-              <a:rPr lang="en-US" smtClean="0"/>
-              <a:t>‹#›</a:t>
-            </a:fld>
-            <a:endParaRPr lang="en-US"/>
-          </a:p>
-        </p:txBody>
-      </p:sp>
-    </p:spTree>
-    <p:extLst>
-      <p:ext uri="{BB962C8B-B14F-4D97-AF65-F5344CB8AC3E}">
-        <p14:creationId xmlns:p14="http://schemas.microsoft.com/office/powerpoint/2010/main" val="2542579012"/>
       </p:ext>
     </p:extLst>
   </p:cSld>
@@ -3578,7 +5358,7 @@
           <a:p>
             <a:fld id="{6DF925A2-9B04-41AD-AF8B-82A5F4D315EC}" type="datetimeFigureOut">
               <a:rPr lang="en-US" smtClean="0"/>
-              <a:t>9/12/2019</a:t>
+              <a:t>10/25/2019</a:t>
             </a:fld>
             <a:endParaRPr lang="en-US"/>
           </a:p>
@@ -3954,17 +5734,20 @@
   <p:sldLayoutIdLst>
     <p:sldLayoutId id="2147483673" r:id="rId1"/>
     <p:sldLayoutId id="2147483674" r:id="rId2"/>
-    <p:sldLayoutId id="2147483675" r:id="rId3"/>
-    <p:sldLayoutId id="2147483676" r:id="rId4"/>
-    <p:sldLayoutId id="2147483677" r:id="rId5"/>
-    <p:sldLayoutId id="2147483678" r:id="rId6"/>
-    <p:sldLayoutId id="2147483679" r:id="rId7"/>
-    <p:sldLayoutId id="2147483680" r:id="rId8"/>
-    <p:sldLayoutId id="2147483681" r:id="rId9"/>
-    <p:sldLayoutId id="2147483682" r:id="rId10"/>
-    <p:sldLayoutId id="2147483683" r:id="rId11"/>
-    <p:sldLayoutId id="2147483684" r:id="rId12"/>
-    <p:sldLayoutId id="2147483685" r:id="rId13"/>
+    <p:sldLayoutId id="2147483691" r:id="rId3"/>
+    <p:sldLayoutId id="2147483687" r:id="rId4"/>
+    <p:sldLayoutId id="2147483690" r:id="rId5"/>
+    <p:sldLayoutId id="2147483688" r:id="rId6"/>
+    <p:sldLayoutId id="2147483676" r:id="rId7"/>
+    <p:sldLayoutId id="2147483677" r:id="rId8"/>
+    <p:sldLayoutId id="2147483678" r:id="rId9"/>
+    <p:sldLayoutId id="2147483679" r:id="rId10"/>
+    <p:sldLayoutId id="2147483680" r:id="rId11"/>
+    <p:sldLayoutId id="2147483681" r:id="rId12"/>
+    <p:sldLayoutId id="2147483682" r:id="rId13"/>
+    <p:sldLayoutId id="2147483683" r:id="rId14"/>
+    <p:sldLayoutId id="2147483684" r:id="rId15"/>
+    <p:sldLayoutId id="2147483685" r:id="rId16"/>
   </p:sldLayoutIdLst>
   <p:txStyles>
     <p:titleStyle>
@@ -3975,12 +5758,12 @@
         <a:spcAft>
           <a:spcPct val="0"/>
         </a:spcAft>
-        <a:defRPr sz="4400" baseline="0">
+        <a:defRPr sz="3200" baseline="0">
           <a:solidFill>
             <a:schemeClr val="tx2"/>
           </a:solidFill>
-          <a:latin typeface="Times New Roman" panose="02020603050405020304" pitchFamily="18" charset="0"/>
-          <a:ea typeface="DFKai-SB" panose="03000509000000000000" pitchFamily="65" charset="-120"/>
+          <a:latin typeface="+mj-ea"/>
+          <a:ea typeface="+mj-ea"/>
           <a:cs typeface="+mj-cs"/>
         </a:defRPr>
       </a:lvl1pPr>
@@ -4111,12 +5894,12 @@
         <a:buSzPct val="75000"/>
         <a:buFont typeface="Wingdings" pitchFamily="2" charset="2"/>
         <a:buChar char="p"/>
-        <a:defRPr sz="2800" baseline="0">
+        <a:defRPr sz="3200" baseline="0">
           <a:solidFill>
             <a:schemeClr val="tx1"/>
           </a:solidFill>
-          <a:latin typeface="Times New Roman" panose="02020603050405020304" pitchFamily="18" charset="0"/>
-          <a:ea typeface="DFKai-SB" panose="03000509000000000000" pitchFamily="65" charset="-120"/>
+          <a:latin typeface="+mj-ea"/>
+          <a:ea typeface="+mj-ea"/>
           <a:cs typeface="+mn-cs"/>
         </a:defRPr>
       </a:lvl1pPr>
@@ -4133,12 +5916,12 @@
         <a:buSzPct val="75000"/>
         <a:buFont typeface="Wingdings" pitchFamily="2" charset="2"/>
         <a:buChar char="n"/>
-        <a:defRPr sz="2400" baseline="0">
+        <a:defRPr sz="2800" baseline="0">
           <a:solidFill>
             <a:schemeClr val="tx1"/>
           </a:solidFill>
-          <a:latin typeface="Times New Roman" panose="02020603050405020304" pitchFamily="18" charset="0"/>
-          <a:ea typeface="DFKai-SB" panose="03000509000000000000" pitchFamily="65" charset="-120"/>
+          <a:latin typeface="+mj-ea"/>
+          <a:ea typeface="+mj-ea"/>
         </a:defRPr>
       </a:lvl2pPr>
       <a:lvl3pPr marL="1143000" indent="-228600" algn="l" rtl="0" eaLnBrk="1" fontAlgn="base" hangingPunct="1">
@@ -4154,12 +5937,12 @@
         <a:buSzPct val="65000"/>
         <a:buFont typeface="Wingdings" pitchFamily="2" charset="2"/>
         <a:buChar char="p"/>
-        <a:defRPr sz="2000" baseline="0">
+        <a:defRPr sz="2400" baseline="0">
           <a:solidFill>
             <a:schemeClr val="tx1"/>
           </a:solidFill>
-          <a:latin typeface="Times New Roman" panose="02020603050405020304" pitchFamily="18" charset="0"/>
-          <a:ea typeface="DFKai-SB" panose="03000509000000000000" pitchFamily="65" charset="-120"/>
+          <a:latin typeface="+mj-ea"/>
+          <a:ea typeface="+mj-ea"/>
         </a:defRPr>
       </a:lvl3pPr>
       <a:lvl4pPr marL="1600200" indent="-228600" algn="l" rtl="0" eaLnBrk="1" fontAlgn="base" hangingPunct="1">
@@ -4174,12 +5957,12 @@
         </a:buClr>
         <a:buFont typeface="Wingdings" pitchFamily="2" charset="2"/>
         <a:buChar char="§"/>
-        <a:defRPr baseline="0">
+        <a:defRPr sz="2000" baseline="0">
           <a:solidFill>
             <a:schemeClr val="tx1"/>
           </a:solidFill>
-          <a:latin typeface="Times New Roman" panose="02020603050405020304" pitchFamily="18" charset="0"/>
-          <a:ea typeface="DFKai-SB" panose="03000509000000000000" pitchFamily="65" charset="-120"/>
+          <a:latin typeface="+mj-ea"/>
+          <a:ea typeface="+mj-ea"/>
         </a:defRPr>
       </a:lvl4pPr>
       <a:lvl5pPr marL="2057400" indent="-228600" algn="l" rtl="0" eaLnBrk="1" fontAlgn="base" hangingPunct="1">
@@ -4195,12 +5978,12 @@
         <a:buSzPct val="80000"/>
         <a:buFont typeface="Wingdings" pitchFamily="2" charset="2"/>
         <a:buChar char="§"/>
-        <a:defRPr baseline="0">
+        <a:defRPr sz="2000" baseline="0">
           <a:solidFill>
             <a:schemeClr val="tx1"/>
           </a:solidFill>
-          <a:latin typeface="Times New Roman" panose="02020603050405020304" pitchFamily="18" charset="0"/>
-          <a:ea typeface="DFKai-SB" panose="03000509000000000000" pitchFamily="65" charset="-120"/>
+          <a:latin typeface="+mj-ea"/>
+          <a:ea typeface="+mj-ea"/>
         </a:defRPr>
       </a:lvl5pPr>
       <a:lvl6pPr marL="2514600" indent="-228600" algn="l" rtl="0" eaLnBrk="1" fontAlgn="base" hangingPunct="1">
@@ -4402,10 +6185,10 @@
       </p:grpSpPr>
       <p:sp>
         <p:nvSpPr>
-          <p:cNvPr id="2" name="Title 1">
+          <p:cNvPr id="4" name="Title 3">
             <a:extLst>
               <a:ext uri="{FF2B5EF4-FFF2-40B4-BE49-F238E27FC236}">
-                <a16:creationId xmlns:a16="http://schemas.microsoft.com/office/drawing/2014/main" id="{72A8166A-D275-4B50-B6D8-0DB938661C24}"/>
+                <a16:creationId xmlns:a16="http://schemas.microsoft.com/office/drawing/2014/main" id="{52F908BB-5702-4587-89C3-7C3DDEAEA015}"/>
               </a:ext>
             </a:extLst>
           </p:cNvPr>
@@ -4427,10 +6210,10 @@
       </p:sp>
       <p:sp>
         <p:nvSpPr>
-          <p:cNvPr id="3" name="Subtitle 2">
+          <p:cNvPr id="5" name="Subtitle 4">
             <a:extLst>
               <a:ext uri="{FF2B5EF4-FFF2-40B4-BE49-F238E27FC236}">
-                <a16:creationId xmlns:a16="http://schemas.microsoft.com/office/drawing/2014/main" id="{42345507-6B03-439E-AB52-1CA92735FE45}"/>
+                <a16:creationId xmlns:a16="http://schemas.microsoft.com/office/drawing/2014/main" id="{2FCEBE0E-A91A-4635-85E1-701CCE0309DA}"/>
               </a:ext>
             </a:extLst>
           </p:cNvPr>
@@ -4454,6 +6237,86 @@
     <p:extLst>
       <p:ext uri="{BB962C8B-B14F-4D97-AF65-F5344CB8AC3E}">
         <p14:creationId xmlns:p14="http://schemas.microsoft.com/office/powerpoint/2010/main" val="1613215182"/>
+      </p:ext>
+    </p:extLst>
+  </p:cSld>
+  <p:clrMapOvr>
+    <a:masterClrMapping/>
+  </p:clrMapOvr>
+</p:sld>
+</file>
+
+<file path=ppt/slides/slide2.xml><?xml version="1.0" encoding="utf-8"?>
+<p:sld xmlns:a="http://schemas.openxmlformats.org/drawingml/2006/main" xmlns:r="http://schemas.openxmlformats.org/officeDocument/2006/relationships" xmlns:p="http://schemas.openxmlformats.org/presentationml/2006/main">
+  <p:cSld>
+    <p:spTree>
+      <p:nvGrpSpPr>
+        <p:cNvPr id="1" name=""/>
+        <p:cNvGrpSpPr/>
+        <p:nvPr/>
+      </p:nvGrpSpPr>
+      <p:grpSpPr>
+        <a:xfrm>
+          <a:off x="0" y="0"/>
+          <a:ext cx="0" cy="0"/>
+          <a:chOff x="0" y="0"/>
+          <a:chExt cx="0" cy="0"/>
+        </a:xfrm>
+      </p:grpSpPr>
+      <p:sp>
+        <p:nvSpPr>
+          <p:cNvPr id="5" name="Title 4">
+            <a:extLst>
+              <a:ext uri="{FF2B5EF4-FFF2-40B4-BE49-F238E27FC236}">
+                <a16:creationId xmlns:a16="http://schemas.microsoft.com/office/drawing/2014/main" id="{648E6F83-A0E3-42C4-A32B-E38810AEDD6A}"/>
+              </a:ext>
+            </a:extLst>
+          </p:cNvPr>
+          <p:cNvSpPr>
+            <a:spLocks noGrp="1"/>
+          </p:cNvSpPr>
+          <p:nvPr>
+            <p:ph type="title"/>
+          </p:nvPr>
+        </p:nvSpPr>
+        <p:spPr/>
+        <p:txBody>
+          <a:bodyPr/>
+          <a:lstStyle/>
+          <a:p>
+            <a:endParaRPr lang="en-US"/>
+          </a:p>
+        </p:txBody>
+      </p:sp>
+      <p:sp>
+        <p:nvSpPr>
+          <p:cNvPr id="6" name="Content Placeholder 5">
+            <a:extLst>
+              <a:ext uri="{FF2B5EF4-FFF2-40B4-BE49-F238E27FC236}">
+                <a16:creationId xmlns:a16="http://schemas.microsoft.com/office/drawing/2014/main" id="{42B3B4AD-2EA0-4969-A183-69F15BF76F66}"/>
+              </a:ext>
+            </a:extLst>
+          </p:cNvPr>
+          <p:cNvSpPr>
+            <a:spLocks noGrp="1"/>
+          </p:cNvSpPr>
+          <p:nvPr>
+            <p:ph idx="1"/>
+          </p:nvPr>
+        </p:nvSpPr>
+        <p:spPr/>
+        <p:txBody>
+          <a:bodyPr/>
+          <a:lstStyle/>
+          <a:p>
+            <a:endParaRPr lang="en-US"/>
+          </a:p>
+        </p:txBody>
+      </p:sp>
+    </p:spTree>
+    <p:extLst>
+      <p:ext uri="{BB962C8B-B14F-4D97-AF65-F5344CB8AC3E}">
+        <p14:creationId xmlns:p14="http://schemas.microsoft.com/office/powerpoint/2010/main" val="3529637247"/>
       </p:ext>
     </p:extLst>
   </p:cSld>
@@ -4504,15 +6367,15 @@
         <a:srgbClr val="999966"/>
       </a:folHlink>
     </a:clrScheme>
-    <a:fontScheme name="自訂 3">
+    <a:fontScheme name="Custom 5">
       <a:majorFont>
-        <a:latin typeface="Times New Roman"/>
-        <a:ea typeface="標楷體"/>
+        <a:latin typeface="Arial"/>
+        <a:ea typeface="Microsoft JhengHei"/>
         <a:cs typeface=""/>
       </a:majorFont>
       <a:minorFont>
         <a:latin typeface="Arial"/>
-        <a:ea typeface="標楷體"/>
+        <a:ea typeface="Microsoft JhengHei"/>
         <a:cs typeface=""/>
       </a:minorFont>
     </a:fontScheme>

</xml_diff>

<commit_message>
Update stylings in template
</commit_message>
<xml_diff>
--- a/designs/template.pptx
+++ b/designs/template.pptx
@@ -146,7 +146,7 @@
 <file path=ppt/revisionInfo.xml><?xml version="1.0" encoding="utf-8"?>
 <p1510:revInfo xmlns:a="http://schemas.openxmlformats.org/drawingml/2006/main" xmlns:r="http://schemas.openxmlformats.org/officeDocument/2006/relationships" xmlns:p1510="http://schemas.microsoft.com/office/powerpoint/2015/10/main">
   <p1510:revLst>
-    <p1510:client id="{963ABBFF-F7DD-4FE6-94B3-BE82FF263172}" v="71" dt="2019-10-24T21:55:42.301"/>
+    <p1510:client id="{963ABBFF-F7DD-4FE6-94B3-BE82FF263172}" v="91" dt="2019-10-24T22:18:09.620"/>
   </p1510:revLst>
 </p1510:revInfo>
 </file>
@@ -156,7 +156,7 @@
   <pc:docChgLst>
     <pc:chgData name="Still Hsu" userId="4ca04788c324ab33" providerId="LiveId" clId="{963ABBFF-F7DD-4FE6-94B3-BE82FF263172}"/>
     <pc:docChg chg="undo custSel addSld modSld modMainMaster">
-      <pc:chgData name="Still Hsu" userId="4ca04788c324ab33" providerId="LiveId" clId="{963ABBFF-F7DD-4FE6-94B3-BE82FF263172}" dt="2019-10-24T21:55:42.301" v="84" actId="207"/>
+      <pc:chgData name="Still Hsu" userId="4ca04788c324ab33" providerId="LiveId" clId="{963ABBFF-F7DD-4FE6-94B3-BE82FF263172}" dt="2019-10-24T22:18:09.620" v="104"/>
       <pc:docMkLst>
         <pc:docMk/>
       </pc:docMkLst>
@@ -200,11 +200,19 @@
         </pc:spChg>
       </pc:sldChg>
       <pc:sldChg chg="addSp delSp modSp new mod modClrScheme chgLayout">
-        <pc:chgData name="Still Hsu" userId="4ca04788c324ab33" providerId="LiveId" clId="{963ABBFF-F7DD-4FE6-94B3-BE82FF263172}" dt="2019-10-24T21:48:34.804" v="58"/>
+        <pc:chgData name="Still Hsu" userId="4ca04788c324ab33" providerId="LiveId" clId="{963ABBFF-F7DD-4FE6-94B3-BE82FF263172}" dt="2019-10-24T22:18:09.620" v="104"/>
         <pc:sldMkLst>
           <pc:docMk/>
           <pc:sldMk cId="3529637247" sldId="257"/>
         </pc:sldMkLst>
+        <pc:spChg chg="add mod">
+          <ac:chgData name="Still Hsu" userId="4ca04788c324ab33" providerId="LiveId" clId="{963ABBFF-F7DD-4FE6-94B3-BE82FF263172}" dt="2019-10-24T22:18:09.620" v="104"/>
+          <ac:spMkLst>
+            <pc:docMk/>
+            <pc:sldMk cId="3529637247" sldId="257"/>
+            <ac:spMk id="2" creationId="{5FE380D2-B97E-42F1-8F17-DFBDF4001072}"/>
+          </ac:spMkLst>
+        </pc:spChg>
         <pc:spChg chg="del mod ord">
           <ac:chgData name="Still Hsu" userId="4ca04788c324ab33" providerId="LiveId" clId="{963ABBFF-F7DD-4FE6-94B3-BE82FF263172}" dt="2019-10-24T21:41:21.104" v="7" actId="700"/>
           <ac:spMkLst>
@@ -221,6 +229,14 @@
             <ac:spMk id="3" creationId="{3EEFE02E-9973-4B14-83B7-82B51872FA08}"/>
           </ac:spMkLst>
         </pc:spChg>
+        <pc:spChg chg="add mod">
+          <ac:chgData name="Still Hsu" userId="4ca04788c324ab33" providerId="LiveId" clId="{963ABBFF-F7DD-4FE6-94B3-BE82FF263172}" dt="2019-10-24T22:18:09.620" v="104"/>
+          <ac:spMkLst>
+            <pc:docMk/>
+            <pc:sldMk cId="3529637247" sldId="257"/>
+            <ac:spMk id="3" creationId="{74CF3367-EF47-45F1-87D5-6A2A8446563C}"/>
+          </ac:spMkLst>
+        </pc:spChg>
         <pc:spChg chg="add del mod ord">
           <ac:chgData name="Still Hsu" userId="4ca04788c324ab33" providerId="LiveId" clId="{963ABBFF-F7DD-4FE6-94B3-BE82FF263172}" dt="2019-10-24T21:48:34.804" v="58"/>
           <ac:spMkLst>
@@ -229,16 +245,16 @@
             <ac:spMk id="4" creationId="{A075CD6F-1513-454D-ABBF-E241E0EE245C}"/>
           </ac:spMkLst>
         </pc:spChg>
-        <pc:spChg chg="add mod">
-          <ac:chgData name="Still Hsu" userId="4ca04788c324ab33" providerId="LiveId" clId="{963ABBFF-F7DD-4FE6-94B3-BE82FF263172}" dt="2019-10-24T21:48:34.804" v="58"/>
+        <pc:spChg chg="add del mod">
+          <ac:chgData name="Still Hsu" userId="4ca04788c324ab33" providerId="LiveId" clId="{963ABBFF-F7DD-4FE6-94B3-BE82FF263172}" dt="2019-10-24T22:18:09.620" v="104"/>
           <ac:spMkLst>
             <pc:docMk/>
             <pc:sldMk cId="3529637247" sldId="257"/>
             <ac:spMk id="5" creationId="{648E6F83-A0E3-42C4-A32B-E38810AEDD6A}"/>
           </ac:spMkLst>
         </pc:spChg>
-        <pc:spChg chg="add mod">
-          <ac:chgData name="Still Hsu" userId="4ca04788c324ab33" providerId="LiveId" clId="{963ABBFF-F7DD-4FE6-94B3-BE82FF263172}" dt="2019-10-24T21:48:34.804" v="58"/>
+        <pc:spChg chg="add del mod">
+          <ac:chgData name="Still Hsu" userId="4ca04788c324ab33" providerId="LiveId" clId="{963ABBFF-F7DD-4FE6-94B3-BE82FF263172}" dt="2019-10-24T22:18:09.620" v="104"/>
           <ac:spMkLst>
             <pc:docMk/>
             <pc:sldMk cId="3529637247" sldId="257"/>
@@ -246,26 +262,58 @@
           </ac:spMkLst>
         </pc:spChg>
       </pc:sldChg>
-      <pc:sldMasterChg chg="modSp addSldLayout delSldLayout modSldLayout sldLayoutOrd">
-        <pc:chgData name="Still Hsu" userId="4ca04788c324ab33" providerId="LiveId" clId="{963ABBFF-F7DD-4FE6-94B3-BE82FF263172}" dt="2019-10-24T21:55:42.301" v="84" actId="207"/>
+      <pc:sldMasterChg chg="addSp delSp modSp addSldLayout delSldLayout modSldLayout sldLayoutOrd">
+        <pc:chgData name="Still Hsu" userId="4ca04788c324ab33" providerId="LiveId" clId="{963ABBFF-F7DD-4FE6-94B3-BE82FF263172}" dt="2019-10-24T22:17:59.571" v="103" actId="14100"/>
         <pc:sldMasterMkLst>
           <pc:docMk/>
           <pc:sldMasterMk cId="490527102" sldId="2147483672"/>
         </pc:sldMasterMkLst>
-        <pc:spChg chg="mod">
-          <ac:chgData name="Still Hsu" userId="4ca04788c324ab33" providerId="LiveId" clId="{963ABBFF-F7DD-4FE6-94B3-BE82FF263172}" dt="2019-10-24T21:42:02.963" v="20" actId="403"/>
+        <pc:spChg chg="add">
+          <ac:chgData name="Still Hsu" userId="4ca04788c324ab33" providerId="LiveId" clId="{963ABBFF-F7DD-4FE6-94B3-BE82FF263172}" dt="2019-10-24T22:16:56.024" v="89"/>
+          <ac:spMkLst>
+            <pc:docMk/>
+            <pc:sldMasterMk cId="490527102" sldId="2147483672"/>
+            <ac:spMk id="11" creationId="{D716EBBB-2029-46AB-9536-AAE61F026E91}"/>
+          </ac:spMkLst>
+        </pc:spChg>
+        <pc:spChg chg="add">
+          <ac:chgData name="Still Hsu" userId="4ca04788c324ab33" providerId="LiveId" clId="{963ABBFF-F7DD-4FE6-94B3-BE82FF263172}" dt="2019-10-24T22:17:02.583" v="92"/>
+          <ac:spMkLst>
+            <pc:docMk/>
+            <pc:sldMasterMk cId="490527102" sldId="2147483672"/>
+            <ac:spMk id="12" creationId="{5E80AC26-2292-4FF2-8E3A-D103A435D4C3}"/>
+          </ac:spMkLst>
+        </pc:spChg>
+        <pc:spChg chg="add">
+          <ac:chgData name="Still Hsu" userId="4ca04788c324ab33" providerId="LiveId" clId="{963ABBFF-F7DD-4FE6-94B3-BE82FF263172}" dt="2019-10-24T22:17:02.583" v="92"/>
+          <ac:spMkLst>
+            <pc:docMk/>
+            <pc:sldMasterMk cId="490527102" sldId="2147483672"/>
+            <ac:spMk id="13" creationId="{0D7A6E2F-00D1-4D6F-9A6C-316CF984C62A}"/>
+          </ac:spMkLst>
+        </pc:spChg>
+        <pc:spChg chg="del mod">
+          <ac:chgData name="Still Hsu" userId="4ca04788c324ab33" providerId="LiveId" clId="{963ABBFF-F7DD-4FE6-94B3-BE82FF263172}" dt="2019-10-24T22:17:01.826" v="91" actId="478"/>
           <ac:spMkLst>
             <pc:docMk/>
             <pc:sldMasterMk cId="490527102" sldId="2147483672"/>
             <ac:spMk id="15362" creationId="{00000000-0000-0000-0000-000000000000}"/>
           </ac:spMkLst>
         </pc:spChg>
-        <pc:spChg chg="mod">
-          <ac:chgData name="Still Hsu" userId="4ca04788c324ab33" providerId="LiveId" clId="{963ABBFF-F7DD-4FE6-94B3-BE82FF263172}" dt="2019-10-24T21:41:57.220" v="15" actId="404"/>
+        <pc:spChg chg="del mod">
+          <ac:chgData name="Still Hsu" userId="4ca04788c324ab33" providerId="LiveId" clId="{963ABBFF-F7DD-4FE6-94B3-BE82FF263172}" dt="2019-10-24T22:17:01.375" v="90" actId="478"/>
           <ac:spMkLst>
             <pc:docMk/>
             <pc:sldMasterMk cId="490527102" sldId="2147483672"/>
             <ac:spMk id="15363" creationId="{00000000-0000-0000-0000-000000000000}"/>
+          </ac:spMkLst>
+        </pc:spChg>
+        <pc:spChg chg="del mod">
+          <ac:chgData name="Still Hsu" userId="4ca04788c324ab33" providerId="LiveId" clId="{963ABBFF-F7DD-4FE6-94B3-BE82FF263172}" dt="2019-10-24T22:16:55.272" v="88" actId="478"/>
+          <ac:spMkLst>
+            <pc:docMk/>
+            <pc:sldMasterMk cId="490527102" sldId="2147483672"/>
+            <ac:spMk id="15368" creationId="{00000000-0000-0000-0000-000000000000}"/>
           </ac:spMkLst>
         </pc:spChg>
         <pc:sldLayoutChg chg="addSp delSp modSp">
@@ -366,20 +414,47 @@
             </ac:spMkLst>
           </pc:spChg>
         </pc:sldLayoutChg>
-        <pc:sldLayoutChg chg="modSp">
-          <pc:chgData name="Still Hsu" userId="4ca04788c324ab33" providerId="LiveId" clId="{963ABBFF-F7DD-4FE6-94B3-BE82FF263172}" dt="2019-10-24T21:52:36.913" v="63" actId="404"/>
+        <pc:sldLayoutChg chg="addSp delSp modSp">
+          <pc:chgData name="Still Hsu" userId="4ca04788c324ab33" providerId="LiveId" clId="{963ABBFF-F7DD-4FE6-94B3-BE82FF263172}" dt="2019-10-24T22:17:16.267" v="94"/>
           <pc:sldLayoutMkLst>
             <pc:docMk/>
             <pc:sldMasterMk cId="490527102" sldId="2147483672"/>
             <pc:sldLayoutMk cId="1404864942" sldId="2147483674"/>
           </pc:sldLayoutMkLst>
-          <pc:spChg chg="mod">
-            <ac:chgData name="Still Hsu" userId="4ca04788c324ab33" providerId="LiveId" clId="{963ABBFF-F7DD-4FE6-94B3-BE82FF263172}" dt="2019-10-24T21:52:36.913" v="63" actId="404"/>
+          <pc:spChg chg="del mod">
+            <ac:chgData name="Still Hsu" userId="4ca04788c324ab33" providerId="LiveId" clId="{963ABBFF-F7DD-4FE6-94B3-BE82FF263172}" dt="2019-10-24T22:17:15.682" v="93" actId="478"/>
+            <ac:spMkLst>
+              <pc:docMk/>
+              <pc:sldMasterMk cId="490527102" sldId="2147483672"/>
+              <pc:sldLayoutMk cId="1404864942" sldId="2147483674"/>
+              <ac:spMk id="2" creationId="{00000000-0000-0000-0000-000000000000}"/>
+            </ac:spMkLst>
+          </pc:spChg>
+          <pc:spChg chg="del mod">
+            <ac:chgData name="Still Hsu" userId="4ca04788c324ab33" providerId="LiveId" clId="{963ABBFF-F7DD-4FE6-94B3-BE82FF263172}" dt="2019-10-24T22:17:15.682" v="93" actId="478"/>
             <ac:spMkLst>
               <pc:docMk/>
               <pc:sldMasterMk cId="490527102" sldId="2147483672"/>
               <pc:sldLayoutMk cId="1404864942" sldId="2147483674"/>
               <ac:spMk id="3" creationId="{00000000-0000-0000-0000-000000000000}"/>
+            </ac:spMkLst>
+          </pc:spChg>
+          <pc:spChg chg="add">
+            <ac:chgData name="Still Hsu" userId="4ca04788c324ab33" providerId="LiveId" clId="{963ABBFF-F7DD-4FE6-94B3-BE82FF263172}" dt="2019-10-24T22:17:16.267" v="94"/>
+            <ac:spMkLst>
+              <pc:docMk/>
+              <pc:sldMasterMk cId="490527102" sldId="2147483672"/>
+              <pc:sldLayoutMk cId="1404864942" sldId="2147483674"/>
+              <ac:spMk id="7" creationId="{E130F17D-975C-4988-8284-24B1E2654FD4}"/>
+            </ac:spMkLst>
+          </pc:spChg>
+          <pc:spChg chg="add">
+            <ac:chgData name="Still Hsu" userId="4ca04788c324ab33" providerId="LiveId" clId="{963ABBFF-F7DD-4FE6-94B3-BE82FF263172}" dt="2019-10-24T22:17:16.267" v="94"/>
+            <ac:spMkLst>
+              <pc:docMk/>
+              <pc:sldMasterMk cId="490527102" sldId="2147483672"/>
+              <pc:sldLayoutMk cId="1404864942" sldId="2147483674"/>
+              <ac:spMk id="8" creationId="{68924AEB-36F3-439A-B386-220C267B7A0C}"/>
             </ac:spMkLst>
           </pc:spChg>
         </pc:sldLayoutChg>
@@ -405,6 +480,128 @@
               <pc:docMk/>
               <pc:sldMasterMk cId="490527102" sldId="2147483672"/>
               <pc:sldLayoutMk cId="2864600874" sldId="2147483675"/>
+              <ac:spMk id="3" creationId="{00000000-0000-0000-0000-000000000000}"/>
+            </ac:spMkLst>
+          </pc:spChg>
+        </pc:sldLayoutChg>
+        <pc:sldLayoutChg chg="addSp delSp modSp">
+          <pc:chgData name="Still Hsu" userId="4ca04788c324ab33" providerId="LiveId" clId="{963ABBFF-F7DD-4FE6-94B3-BE82FF263172}" dt="2019-10-24T22:17:48.186" v="99" actId="14100"/>
+          <pc:sldLayoutMkLst>
+            <pc:docMk/>
+            <pc:sldMasterMk cId="490527102" sldId="2147483672"/>
+            <pc:sldLayoutMk cId="168560871" sldId="2147483676"/>
+          </pc:sldLayoutMkLst>
+          <pc:spChg chg="del mod">
+            <ac:chgData name="Still Hsu" userId="4ca04788c324ab33" providerId="LiveId" clId="{963ABBFF-F7DD-4FE6-94B3-BE82FF263172}" dt="2019-10-24T22:17:42.780" v="96" actId="478"/>
+            <ac:spMkLst>
+              <pc:docMk/>
+              <pc:sldMasterMk cId="490527102" sldId="2147483672"/>
+              <pc:sldLayoutMk cId="168560871" sldId="2147483676"/>
+              <ac:spMk id="2" creationId="{00000000-0000-0000-0000-000000000000}"/>
+            </ac:spMkLst>
+          </pc:spChg>
+          <pc:spChg chg="mod">
+            <ac:chgData name="Still Hsu" userId="4ca04788c324ab33" providerId="LiveId" clId="{963ABBFF-F7DD-4FE6-94B3-BE82FF263172}" dt="2019-10-24T22:17:45.831" v="98" actId="14100"/>
+            <ac:spMkLst>
+              <pc:docMk/>
+              <pc:sldMasterMk cId="490527102" sldId="2147483672"/>
+              <pc:sldLayoutMk cId="168560871" sldId="2147483676"/>
+              <ac:spMk id="3" creationId="{00000000-0000-0000-0000-000000000000}"/>
+            </ac:spMkLst>
+          </pc:spChg>
+          <pc:spChg chg="mod">
+            <ac:chgData name="Still Hsu" userId="4ca04788c324ab33" providerId="LiveId" clId="{963ABBFF-F7DD-4FE6-94B3-BE82FF263172}" dt="2019-10-24T22:17:48.186" v="99" actId="14100"/>
+            <ac:spMkLst>
+              <pc:docMk/>
+              <pc:sldMasterMk cId="490527102" sldId="2147483672"/>
+              <pc:sldLayoutMk cId="168560871" sldId="2147483676"/>
+              <ac:spMk id="4" creationId="{00000000-0000-0000-0000-000000000000}"/>
+            </ac:spMkLst>
+          </pc:spChg>
+          <pc:spChg chg="add">
+            <ac:chgData name="Still Hsu" userId="4ca04788c324ab33" providerId="LiveId" clId="{963ABBFF-F7DD-4FE6-94B3-BE82FF263172}" dt="2019-10-24T22:17:43.426" v="97"/>
+            <ac:spMkLst>
+              <pc:docMk/>
+              <pc:sldMasterMk cId="490527102" sldId="2147483672"/>
+              <pc:sldLayoutMk cId="168560871" sldId="2147483676"/>
+              <ac:spMk id="8" creationId="{71203D04-1BAA-440C-A365-B29A4F2FEFF1}"/>
+            </ac:spMkLst>
+          </pc:spChg>
+        </pc:sldLayoutChg>
+        <pc:sldLayoutChg chg="addSp delSp modSp">
+          <pc:chgData name="Still Hsu" userId="4ca04788c324ab33" providerId="LiveId" clId="{963ABBFF-F7DD-4FE6-94B3-BE82FF263172}" dt="2019-10-24T22:17:51.094" v="101"/>
+          <pc:sldLayoutMkLst>
+            <pc:docMk/>
+            <pc:sldMasterMk cId="490527102" sldId="2147483672"/>
+            <pc:sldLayoutMk cId="1158447595" sldId="2147483678"/>
+          </pc:sldLayoutMkLst>
+          <pc:spChg chg="del mod">
+            <ac:chgData name="Still Hsu" userId="4ca04788c324ab33" providerId="LiveId" clId="{963ABBFF-F7DD-4FE6-94B3-BE82FF263172}" dt="2019-10-24T22:17:50.458" v="100" actId="478"/>
+            <ac:spMkLst>
+              <pc:docMk/>
+              <pc:sldMasterMk cId="490527102" sldId="2147483672"/>
+              <pc:sldLayoutMk cId="1158447595" sldId="2147483678"/>
+              <ac:spMk id="2" creationId="{00000000-0000-0000-0000-000000000000}"/>
+            </ac:spMkLst>
+          </pc:spChg>
+          <pc:spChg chg="add">
+            <ac:chgData name="Still Hsu" userId="4ca04788c324ab33" providerId="LiveId" clId="{963ABBFF-F7DD-4FE6-94B3-BE82FF263172}" dt="2019-10-24T22:17:51.094" v="101"/>
+            <ac:spMkLst>
+              <pc:docMk/>
+              <pc:sldMasterMk cId="490527102" sldId="2147483672"/>
+              <pc:sldLayoutMk cId="1158447595" sldId="2147483678"/>
+              <ac:spMk id="6" creationId="{4FA48DA0-6574-4D29-86D9-9F9641477335}"/>
+            </ac:spMkLst>
+          </pc:spChg>
+        </pc:sldLayoutChg>
+        <pc:sldLayoutChg chg="modSp">
+          <pc:chgData name="Still Hsu" userId="4ca04788c324ab33" providerId="LiveId" clId="{963ABBFF-F7DD-4FE6-94B3-BE82FF263172}" dt="2019-10-24T22:17:59.571" v="103" actId="14100"/>
+          <pc:sldLayoutMkLst>
+            <pc:docMk/>
+            <pc:sldMasterMk cId="490527102" sldId="2147483672"/>
+            <pc:sldLayoutMk cId="872116414" sldId="2147483680"/>
+          </pc:sldLayoutMkLst>
+          <pc:spChg chg="mod">
+            <ac:chgData name="Still Hsu" userId="4ca04788c324ab33" providerId="LiveId" clId="{963ABBFF-F7DD-4FE6-94B3-BE82FF263172}" dt="2019-10-24T22:17:55.886" v="102" actId="14100"/>
+            <ac:spMkLst>
+              <pc:docMk/>
+              <pc:sldMasterMk cId="490527102" sldId="2147483672"/>
+              <pc:sldLayoutMk cId="872116414" sldId="2147483680"/>
+              <ac:spMk id="2" creationId="{00000000-0000-0000-0000-000000000000}"/>
+            </ac:spMkLst>
+          </pc:spChg>
+          <pc:spChg chg="mod">
+            <ac:chgData name="Still Hsu" userId="4ca04788c324ab33" providerId="LiveId" clId="{963ABBFF-F7DD-4FE6-94B3-BE82FF263172}" dt="2019-10-24T22:17:59.571" v="103" actId="14100"/>
+            <ac:spMkLst>
+              <pc:docMk/>
+              <pc:sldMasterMk cId="490527102" sldId="2147483672"/>
+              <pc:sldLayoutMk cId="872116414" sldId="2147483680"/>
+              <ac:spMk id="3" creationId="{00000000-0000-0000-0000-000000000000}"/>
+            </ac:spMkLst>
+          </pc:spChg>
+        </pc:sldLayoutChg>
+        <pc:sldLayoutChg chg="modSp">
+          <pc:chgData name="Still Hsu" userId="4ca04788c324ab33" providerId="LiveId" clId="{963ABBFF-F7DD-4FE6-94B3-BE82FF263172}" dt="2019-10-24T22:17:01.826" v="91" actId="478"/>
+          <pc:sldLayoutMkLst>
+            <pc:docMk/>
+            <pc:sldMasterMk cId="490527102" sldId="2147483672"/>
+            <pc:sldLayoutMk cId="3069479089" sldId="2147483682"/>
+          </pc:sldLayoutMkLst>
+          <pc:spChg chg="mod">
+            <ac:chgData name="Still Hsu" userId="4ca04788c324ab33" providerId="LiveId" clId="{963ABBFF-F7DD-4FE6-94B3-BE82FF263172}" dt="2019-10-24T22:17:01.826" v="91" actId="478"/>
+            <ac:spMkLst>
+              <pc:docMk/>
+              <pc:sldMasterMk cId="490527102" sldId="2147483672"/>
+              <pc:sldLayoutMk cId="3069479089" sldId="2147483682"/>
+              <ac:spMk id="2" creationId="{00000000-0000-0000-0000-000000000000}"/>
+            </ac:spMkLst>
+          </pc:spChg>
+          <pc:spChg chg="mod">
+            <ac:chgData name="Still Hsu" userId="4ca04788c324ab33" providerId="LiveId" clId="{963ABBFF-F7DD-4FE6-94B3-BE82FF263172}" dt="2019-10-24T22:17:01.375" v="90" actId="478"/>
+            <ac:spMkLst>
+              <pc:docMk/>
+              <pc:sldMasterMk cId="490527102" sldId="2147483672"/>
+              <pc:sldLayoutMk cId="3069479089" sldId="2147483682"/>
               <ac:spMk id="3" creationId="{00000000-0000-0000-0000-000000000000}"/>
             </ac:spMkLst>
           </pc:spChg>
@@ -988,6 +1185,9 @@
             <a:off x="685800" y="685800"/>
             <a:ext cx="7772400" cy="1735088"/>
           </a:xfrm>
+          <a:prstGeom prst="rect">
+            <a:avLst/>
+          </a:prstGeom>
         </p:spPr>
         <p:txBody>
           <a:bodyPr/>
@@ -1027,6 +1227,9 @@
             <a:off x="1371600" y="3270250"/>
             <a:ext cx="6400800" cy="2209800"/>
           </a:xfrm>
+          <a:prstGeom prst="rect">
+            <a:avLst/>
+          </a:prstGeom>
         </p:spPr>
         <p:txBody>
           <a:bodyPr/>
@@ -1197,8 +1400,11 @@
         <p:spPr>
           <a:xfrm>
             <a:off x="457200" y="273050"/>
-            <a:ext cx="3008313" cy="1162050"/>
+            <a:ext cx="3008313" cy="458787"/>
           </a:xfrm>
+          <a:prstGeom prst="rect">
+            <a:avLst/>
+          </a:prstGeom>
         </p:spPr>
         <p:txBody>
           <a:bodyPr/>
@@ -1209,10 +1415,10 @@
           </a:lstStyle>
           <a:p>
             <a:r>
-              <a:rPr lang="en-US" altLang="zh-TW"/>
+              <a:rPr lang="en-US" altLang="zh-TW" dirty="0"/>
               <a:t>Click to edit Master title style</a:t>
             </a:r>
-            <a:endParaRPr lang="en-US"/>
+            <a:endParaRPr lang="en-US" dirty="0"/>
           </a:p>
         </p:txBody>
       </p:sp>
@@ -1228,9 +1434,12 @@
         </p:nvSpPr>
         <p:spPr>
           <a:xfrm>
-            <a:off x="3575050" y="273050"/>
-            <a:ext cx="5111750" cy="5853113"/>
+            <a:off x="3575050" y="1435100"/>
+            <a:ext cx="5111750" cy="4691063"/>
           </a:xfrm>
+          <a:prstGeom prst="rect">
+            <a:avLst/>
+          </a:prstGeom>
         </p:spPr>
         <p:txBody>
           <a:bodyPr/>
@@ -1266,38 +1475,38 @@
           <a:p>
             <a:pPr lvl="0"/>
             <a:r>
-              <a:rPr lang="en-US" altLang="zh-TW"/>
+              <a:rPr lang="en-US" altLang="zh-TW" dirty="0"/>
               <a:t>Click to edit Master text styles</a:t>
             </a:r>
           </a:p>
           <a:p>
             <a:pPr lvl="1"/>
             <a:r>
-              <a:rPr lang="en-US" altLang="zh-TW"/>
+              <a:rPr lang="en-US" altLang="zh-TW" dirty="0"/>
               <a:t>Second level</a:t>
             </a:r>
           </a:p>
           <a:p>
             <a:pPr lvl="2"/>
             <a:r>
-              <a:rPr lang="en-US" altLang="zh-TW"/>
+              <a:rPr lang="en-US" altLang="zh-TW" dirty="0"/>
               <a:t>Third level</a:t>
             </a:r>
           </a:p>
           <a:p>
             <a:pPr lvl="3"/>
             <a:r>
-              <a:rPr lang="en-US" altLang="zh-TW"/>
+              <a:rPr lang="en-US" altLang="zh-TW" dirty="0"/>
               <a:t>Fourth level</a:t>
             </a:r>
           </a:p>
           <a:p>
             <a:pPr lvl="4"/>
             <a:r>
-              <a:rPr lang="en-US" altLang="zh-TW"/>
+              <a:rPr lang="en-US" altLang="zh-TW" dirty="0"/>
               <a:t>Fifth level</a:t>
             </a:r>
-            <a:endParaRPr lang="en-US"/>
+            <a:endParaRPr lang="en-US" dirty="0"/>
           </a:p>
         </p:txBody>
       </p:sp>
@@ -1316,6 +1525,9 @@
             <a:off x="457200" y="1435100"/>
             <a:ext cx="3008313" cy="4691063"/>
           </a:xfrm>
+          <a:prstGeom prst="rect">
+            <a:avLst/>
+          </a:prstGeom>
         </p:spPr>
         <p:txBody>
           <a:bodyPr/>
@@ -1488,6 +1700,9 @@
             <a:off x="1792288" y="4800600"/>
             <a:ext cx="5486400" cy="566738"/>
           </a:xfrm>
+          <a:prstGeom prst="rect">
+            <a:avLst/>
+          </a:prstGeom>
         </p:spPr>
         <p:txBody>
           <a:bodyPr/>
@@ -1520,6 +1735,9 @@
             <a:off x="1792288" y="612775"/>
             <a:ext cx="5486400" cy="4114800"/>
           </a:xfrm>
+          <a:prstGeom prst="rect">
+            <a:avLst/>
+          </a:prstGeom>
         </p:spPr>
         <p:txBody>
           <a:bodyPr/>
@@ -1585,6 +1803,9 @@
             <a:off x="1792288" y="5367338"/>
             <a:ext cx="5486400" cy="804862"/>
           </a:xfrm>
+          <a:prstGeom prst="rect">
+            <a:avLst/>
+          </a:prstGeom>
         </p:spPr>
         <p:txBody>
           <a:bodyPr/>
@@ -1752,7 +1973,15 @@
             <p:ph type="title"/>
           </p:nvPr>
         </p:nvSpPr>
-        <p:spPr/>
+        <p:spPr>
+          <a:xfrm>
+            <a:off x="457200" y="277814"/>
+            <a:ext cx="8229600" cy="449262"/>
+          </a:xfrm>
+          <a:prstGeom prst="rect">
+            <a:avLst/>
+          </a:prstGeom>
+        </p:spPr>
         <p:txBody>
           <a:bodyPr/>
           <a:lstStyle/>
@@ -1775,7 +2004,15 @@
             <p:ph type="body" orient="vert" idx="1"/>
           </p:nvPr>
         </p:nvSpPr>
-        <p:spPr/>
+        <p:spPr>
+          <a:xfrm>
+            <a:off x="457200" y="1600200"/>
+            <a:ext cx="8229600" cy="4530725"/>
+          </a:xfrm>
+          <a:prstGeom prst="rect">
+            <a:avLst/>
+          </a:prstGeom>
+        </p:spPr>
         <p:txBody>
           <a:bodyPr vert="eaVert"/>
           <a:lstStyle/>
@@ -1939,6 +2176,9 @@
             <a:off x="6629400" y="277813"/>
             <a:ext cx="2057400" cy="5853112"/>
           </a:xfrm>
+          <a:prstGeom prst="rect">
+            <a:avLst/>
+          </a:prstGeom>
         </p:spPr>
         <p:txBody>
           <a:bodyPr vert="eaVert"/>
@@ -1967,6 +2207,9 @@
             <a:off x="457200" y="277813"/>
             <a:ext cx="6019800" cy="5853112"/>
           </a:xfrm>
+          <a:prstGeom prst="rect">
+            <a:avLst/>
+          </a:prstGeom>
         </p:spPr>
         <p:txBody>
           <a:bodyPr vert="eaVert"/>
@@ -2131,6 +2374,9 @@
             <a:off x="457200" y="277813"/>
             <a:ext cx="8229600" cy="1139825"/>
           </a:xfrm>
+          <a:prstGeom prst="rect">
+            <a:avLst/>
+          </a:prstGeom>
         </p:spPr>
         <p:txBody>
           <a:bodyPr/>
@@ -2159,6 +2405,9 @@
             <a:off x="457200" y="1600200"/>
             <a:ext cx="4038600" cy="4530725"/>
           </a:xfrm>
+          <a:prstGeom prst="rect">
+            <a:avLst/>
+          </a:prstGeom>
         </p:spPr>
         <p:txBody>
           <a:bodyPr/>
@@ -2216,6 +2465,9 @@
             <a:off x="4648200" y="1600200"/>
             <a:ext cx="4038600" cy="2189163"/>
           </a:xfrm>
+          <a:prstGeom prst="rect">
+            <a:avLst/>
+          </a:prstGeom>
         </p:spPr>
         <p:txBody>
           <a:bodyPr/>
@@ -2273,6 +2525,9 @@
             <a:off x="4648200" y="3941763"/>
             <a:ext cx="4038600" cy="2189162"/>
           </a:xfrm>
+          <a:prstGeom prst="rect">
+            <a:avLst/>
+          </a:prstGeom>
         </p:spPr>
         <p:txBody>
           <a:bodyPr/>
@@ -2452,6 +2707,9 @@
             <a:off x="457200" y="277813"/>
             <a:ext cx="8229600" cy="1139825"/>
           </a:xfrm>
+          <a:prstGeom prst="rect">
+            <a:avLst/>
+          </a:prstGeom>
         </p:spPr>
         <p:txBody>
           <a:bodyPr/>
@@ -2480,6 +2738,9 @@
             <a:off x="457200" y="1600200"/>
             <a:ext cx="4038600" cy="4530725"/>
           </a:xfrm>
+          <a:prstGeom prst="rect">
+            <a:avLst/>
+          </a:prstGeom>
         </p:spPr>
         <p:txBody>
           <a:bodyPr/>
@@ -2537,6 +2798,9 @@
             <a:off x="4648200" y="1600200"/>
             <a:ext cx="4038600" cy="4530725"/>
           </a:xfrm>
+          <a:prstGeom prst="rect">
+            <a:avLst/>
+          </a:prstGeom>
         </p:spPr>
         <p:txBody>
           <a:bodyPr/>
@@ -2656,7 +2920,7 @@
 </file>
 
 <file path=ppt/slideLayouts/slideLayout2.xml><?xml version="1.0" encoding="utf-8"?>
-<p:sldLayout xmlns:a="http://schemas.openxmlformats.org/drawingml/2006/main" xmlns:r="http://schemas.openxmlformats.org/officeDocument/2006/relationships" xmlns:p="http://schemas.openxmlformats.org/presentationml/2006/main" type="obj" preserve="1">
+<p:sldLayout xmlns:a="http://schemas.openxmlformats.org/drawingml/2006/main" xmlns:r="http://schemas.openxmlformats.org/officeDocument/2006/relationships" xmlns:p="http://schemas.openxmlformats.org/presentationml/2006/main" preserve="1" userDrawn="1">
   <p:cSld name="標題及物件">
     <p:spTree>
       <p:nvGrpSpPr>
@@ -2674,97 +2938,6 @@
       </p:grpSpPr>
       <p:sp>
         <p:nvSpPr>
-          <p:cNvPr id="2" name="Title 1"/>
-          <p:cNvSpPr>
-            <a:spLocks noGrp="1"/>
-          </p:cNvSpPr>
-          <p:nvPr>
-            <p:ph type="title"/>
-          </p:nvPr>
-        </p:nvSpPr>
-        <p:spPr/>
-        <p:txBody>
-          <a:bodyPr/>
-          <a:lstStyle/>
-          <a:p>
-            <a:r>
-              <a:rPr lang="en-US" altLang="zh-TW"/>
-              <a:t>Click to edit Master title style</a:t>
-            </a:r>
-            <a:endParaRPr lang="en-US"/>
-          </a:p>
-        </p:txBody>
-      </p:sp>
-      <p:sp>
-        <p:nvSpPr>
-          <p:cNvPr id="3" name="Content Placeholder 2"/>
-          <p:cNvSpPr>
-            <a:spLocks noGrp="1"/>
-          </p:cNvSpPr>
-          <p:nvPr>
-            <p:ph idx="1"/>
-          </p:nvPr>
-        </p:nvSpPr>
-        <p:spPr/>
-        <p:txBody>
-          <a:bodyPr/>
-          <a:lstStyle>
-            <a:lvl1pPr>
-              <a:defRPr sz="2800"/>
-            </a:lvl1pPr>
-            <a:lvl2pPr>
-              <a:defRPr sz="2400"/>
-            </a:lvl2pPr>
-            <a:lvl3pPr>
-              <a:defRPr sz="2000"/>
-            </a:lvl3pPr>
-            <a:lvl4pPr>
-              <a:defRPr sz="1800"/>
-            </a:lvl4pPr>
-            <a:lvl5pPr>
-              <a:defRPr sz="1800"/>
-            </a:lvl5pPr>
-          </a:lstStyle>
-          <a:p>
-            <a:pPr lvl="0"/>
-            <a:r>
-              <a:rPr lang="en-US" altLang="zh-TW" dirty="0"/>
-              <a:t>Click to edit Master text styles</a:t>
-            </a:r>
-          </a:p>
-          <a:p>
-            <a:pPr lvl="1"/>
-            <a:r>
-              <a:rPr lang="en-US" altLang="zh-TW" dirty="0"/>
-              <a:t>Second level</a:t>
-            </a:r>
-          </a:p>
-          <a:p>
-            <a:pPr lvl="2"/>
-            <a:r>
-              <a:rPr lang="en-US" altLang="zh-TW" dirty="0"/>
-              <a:t>Third level</a:t>
-            </a:r>
-          </a:p>
-          <a:p>
-            <a:pPr lvl="3"/>
-            <a:r>
-              <a:rPr lang="en-US" altLang="zh-TW" dirty="0"/>
-              <a:t>Fourth level</a:t>
-            </a:r>
-          </a:p>
-          <a:p>
-            <a:pPr lvl="4"/>
-            <a:r>
-              <a:rPr lang="en-US" altLang="zh-TW" dirty="0"/>
-              <a:t>Fifth level</a:t>
-            </a:r>
-            <a:endParaRPr lang="en-US" dirty="0"/>
-          </a:p>
-        </p:txBody>
-      </p:sp>
-      <p:sp>
-        <p:nvSpPr>
           <p:cNvPr id="4" name="Date Placeholder 3"/>
           <p:cNvSpPr>
             <a:spLocks noGrp="1"/>
@@ -2836,6 +3009,103 @@
               <a:rPr lang="en-US" smtClean="0"/>
               <a:t>‹#›</a:t>
             </a:fld>
+            <a:endParaRPr lang="en-US"/>
+          </a:p>
+        </p:txBody>
+      </p:sp>
+      <p:sp>
+        <p:nvSpPr>
+          <p:cNvPr id="7" name="Title 1">
+            <a:extLst>
+              <a:ext uri="{FF2B5EF4-FFF2-40B4-BE49-F238E27FC236}">
+                <a16:creationId xmlns:a16="http://schemas.microsoft.com/office/drawing/2014/main" id="{E130F17D-975C-4988-8284-24B1E2654FD4}"/>
+              </a:ext>
+            </a:extLst>
+          </p:cNvPr>
+          <p:cNvSpPr>
+            <a:spLocks noGrp="1"/>
+          </p:cNvSpPr>
+          <p:nvPr>
+            <p:ph type="title"/>
+          </p:nvPr>
+        </p:nvSpPr>
+        <p:spPr>
+          <a:xfrm>
+            <a:off x="457200" y="116633"/>
+            <a:ext cx="8229600" cy="792088"/>
+          </a:xfrm>
+        </p:spPr>
+        <p:txBody>
+          <a:bodyPr/>
+          <a:lstStyle/>
+          <a:p>
+            <a:r>
+              <a:rPr lang="zh-TW" altLang="en-US"/>
+              <a:t>按一下以編輯母片標題樣式</a:t>
+            </a:r>
+            <a:endParaRPr lang="en-US"/>
+          </a:p>
+        </p:txBody>
+      </p:sp>
+      <p:sp>
+        <p:nvSpPr>
+          <p:cNvPr id="8" name="Content Placeholder 2">
+            <a:extLst>
+              <a:ext uri="{FF2B5EF4-FFF2-40B4-BE49-F238E27FC236}">
+                <a16:creationId xmlns:a16="http://schemas.microsoft.com/office/drawing/2014/main" id="{68924AEB-36F3-439A-B386-220C267B7A0C}"/>
+              </a:ext>
+            </a:extLst>
+          </p:cNvPr>
+          <p:cNvSpPr>
+            <a:spLocks noGrp="1"/>
+          </p:cNvSpPr>
+          <p:nvPr>
+            <p:ph idx="1"/>
+          </p:nvPr>
+        </p:nvSpPr>
+        <p:spPr>
+          <a:xfrm>
+            <a:off x="457200" y="980728"/>
+            <a:ext cx="8229600" cy="5150197"/>
+          </a:xfrm>
+        </p:spPr>
+        <p:txBody>
+          <a:bodyPr/>
+          <a:lstStyle/>
+          <a:p>
+            <a:pPr lvl="0"/>
+            <a:r>
+              <a:rPr lang="zh-TW" altLang="en-US"/>
+              <a:t>按一下以編輯母片文字樣式</a:t>
+            </a:r>
+          </a:p>
+          <a:p>
+            <a:pPr lvl="1"/>
+            <a:r>
+              <a:rPr lang="zh-TW" altLang="en-US"/>
+              <a:t>第二層</a:t>
+            </a:r>
+          </a:p>
+          <a:p>
+            <a:pPr lvl="2"/>
+            <a:r>
+              <a:rPr lang="zh-TW" altLang="en-US"/>
+              <a:t>第三層</a:t>
+            </a:r>
+          </a:p>
+          <a:p>
+            <a:pPr lvl="3"/>
+            <a:r>
+              <a:rPr lang="zh-TW" altLang="en-US"/>
+              <a:t>第四層</a:t>
+            </a:r>
+          </a:p>
+          <a:p>
+            <a:pPr lvl="4"/>
+            <a:r>
+              <a:rPr lang="zh-TW" altLang="en-US"/>
+              <a:t>第五層</a:t>
+            </a:r>
             <a:endParaRPr lang="en-US"/>
           </a:p>
         </p:txBody>
@@ -3145,6 +3415,9 @@
             <a:off x="228600" y="685800"/>
             <a:ext cx="8229600" cy="1589451"/>
           </a:xfrm>
+          <a:prstGeom prst="rect">
+            <a:avLst/>
+          </a:prstGeom>
         </p:spPr>
         <p:txBody>
           <a:bodyPr/>
@@ -3188,6 +3461,9 @@
             <a:off x="228599" y="2768138"/>
             <a:ext cx="8229599" cy="2711912"/>
           </a:xfrm>
+          <a:prstGeom prst="rect">
+            <a:avLst/>
+          </a:prstGeom>
         </p:spPr>
         <p:txBody>
           <a:bodyPr/>
@@ -3514,6 +3790,9 @@
             <a:off x="685800" y="685800"/>
             <a:ext cx="7772400" cy="1735088"/>
           </a:xfrm>
+          <a:prstGeom prst="rect">
+            <a:avLst/>
+          </a:prstGeom>
         </p:spPr>
         <p:txBody>
           <a:bodyPr/>
@@ -4062,6 +4341,9 @@
             <a:off x="685800" y="2880360"/>
             <a:ext cx="7772400" cy="1143000"/>
           </a:xfrm>
+          <a:prstGeom prst="rect">
+            <a:avLst/>
+          </a:prstGeom>
         </p:spPr>
         <p:txBody>
           <a:bodyPr/>
@@ -4125,6 +4407,9 @@
             <a:off x="722313" y="2523518"/>
             <a:ext cx="7772400" cy="1898853"/>
           </a:xfrm>
+          <a:prstGeom prst="rect">
+            <a:avLst/>
+          </a:prstGeom>
         </p:spPr>
         <p:txBody>
           <a:bodyPr anchor="t"/>
@@ -4233,7 +4518,7 @@
 </file>
 
 <file path=ppt/slideLayouts/slideLayout7.xml><?xml version="1.0" encoding="utf-8"?>
-<p:sldLayout xmlns:a="http://schemas.openxmlformats.org/drawingml/2006/main" xmlns:r="http://schemas.openxmlformats.org/officeDocument/2006/relationships" xmlns:p="http://schemas.openxmlformats.org/presentationml/2006/main" type="twoObj" preserve="1">
+<p:sldLayout xmlns:a="http://schemas.openxmlformats.org/drawingml/2006/main" xmlns:r="http://schemas.openxmlformats.org/officeDocument/2006/relationships" xmlns:p="http://schemas.openxmlformats.org/presentationml/2006/main" preserve="1" userDrawn="1">
   <p:cSld name="兩項物件">
     <p:spTree>
       <p:nvGrpSpPr>
@@ -4251,29 +4536,6 @@
       </p:grpSpPr>
       <p:sp>
         <p:nvSpPr>
-          <p:cNvPr id="2" name="Title 1"/>
-          <p:cNvSpPr>
-            <a:spLocks noGrp="1"/>
-          </p:cNvSpPr>
-          <p:nvPr>
-            <p:ph type="title"/>
-          </p:nvPr>
-        </p:nvSpPr>
-        <p:spPr/>
-        <p:txBody>
-          <a:bodyPr/>
-          <a:lstStyle/>
-          <a:p>
-            <a:r>
-              <a:rPr lang="en-US" altLang="zh-TW"/>
-              <a:t>Click to edit Master title style</a:t>
-            </a:r>
-            <a:endParaRPr lang="en-US"/>
-          </a:p>
-        </p:txBody>
-      </p:sp>
-      <p:sp>
-        <p:nvSpPr>
           <p:cNvPr id="3" name="Content Placeholder 2"/>
           <p:cNvSpPr>
             <a:spLocks noGrp="1"/>
@@ -4284,9 +4546,12 @@
         </p:nvSpPr>
         <p:spPr>
           <a:xfrm>
-            <a:off x="457200" y="1600200"/>
-            <a:ext cx="4038600" cy="4530725"/>
+            <a:off x="457200" y="1026196"/>
+            <a:ext cx="4038600" cy="5104730"/>
           </a:xfrm>
+          <a:prstGeom prst="rect">
+            <a:avLst/>
+          </a:prstGeom>
         </p:spPr>
         <p:txBody>
           <a:bodyPr/>
@@ -4369,9 +4634,12 @@
         </p:nvSpPr>
         <p:spPr>
           <a:xfrm>
-            <a:off x="4648200" y="1600200"/>
-            <a:ext cx="4038600" cy="4530725"/>
+            <a:off x="4648200" y="1026196"/>
+            <a:ext cx="4038600" cy="5104730"/>
           </a:xfrm>
+          <a:prstGeom prst="rect">
+            <a:avLst/>
+          </a:prstGeom>
         </p:spPr>
         <p:txBody>
           <a:bodyPr/>
@@ -4407,38 +4675,38 @@
           <a:p>
             <a:pPr lvl="0"/>
             <a:r>
-              <a:rPr lang="en-US" altLang="zh-TW"/>
+              <a:rPr lang="en-US" altLang="zh-TW" dirty="0"/>
               <a:t>Click to edit Master text styles</a:t>
             </a:r>
           </a:p>
           <a:p>
             <a:pPr lvl="1"/>
             <a:r>
-              <a:rPr lang="en-US" altLang="zh-TW"/>
+              <a:rPr lang="en-US" altLang="zh-TW" dirty="0"/>
               <a:t>Second level</a:t>
             </a:r>
           </a:p>
           <a:p>
             <a:pPr lvl="2"/>
             <a:r>
-              <a:rPr lang="en-US" altLang="zh-TW"/>
+              <a:rPr lang="en-US" altLang="zh-TW" dirty="0"/>
               <a:t>Third level</a:t>
             </a:r>
           </a:p>
           <a:p>
             <a:pPr lvl="3"/>
             <a:r>
-              <a:rPr lang="en-US" altLang="zh-TW"/>
+              <a:rPr lang="en-US" altLang="zh-TW" dirty="0"/>
               <a:t>Fourth level</a:t>
             </a:r>
           </a:p>
           <a:p>
             <a:pPr lvl="4"/>
             <a:r>
-              <a:rPr lang="en-US" altLang="zh-TW"/>
+              <a:rPr lang="en-US" altLang="zh-TW" dirty="0"/>
               <a:t>Fifth level</a:t>
             </a:r>
-            <a:endParaRPr lang="en-US"/>
+            <a:endParaRPr lang="en-US" dirty="0"/>
           </a:p>
         </p:txBody>
       </p:sp>
@@ -4515,6 +4783,40 @@
               <a:rPr lang="en-US" smtClean="0"/>
               <a:t>‹#›</a:t>
             </a:fld>
+            <a:endParaRPr lang="en-US"/>
+          </a:p>
+        </p:txBody>
+      </p:sp>
+      <p:sp>
+        <p:nvSpPr>
+          <p:cNvPr id="8" name="Title 1">
+            <a:extLst>
+              <a:ext uri="{FF2B5EF4-FFF2-40B4-BE49-F238E27FC236}">
+                <a16:creationId xmlns:a16="http://schemas.microsoft.com/office/drawing/2014/main" id="{71203D04-1BAA-440C-A365-B29A4F2FEFF1}"/>
+              </a:ext>
+            </a:extLst>
+          </p:cNvPr>
+          <p:cNvSpPr>
+            <a:spLocks noGrp="1"/>
+          </p:cNvSpPr>
+          <p:nvPr>
+            <p:ph type="title"/>
+          </p:nvPr>
+        </p:nvSpPr>
+        <p:spPr>
+          <a:xfrm>
+            <a:off x="457200" y="116633"/>
+            <a:ext cx="8229600" cy="792088"/>
+          </a:xfrm>
+        </p:spPr>
+        <p:txBody>
+          <a:bodyPr/>
+          <a:lstStyle/>
+          <a:p>
+            <a:r>
+              <a:rPr lang="zh-TW" altLang="en-US"/>
+              <a:t>按一下以編輯母片標題樣式</a:t>
+            </a:r>
             <a:endParaRPr lang="en-US"/>
           </a:p>
         </p:txBody>
@@ -4564,6 +4866,9 @@
             <a:off x="457200" y="274638"/>
             <a:ext cx="8229600" cy="1143000"/>
           </a:xfrm>
+          <a:prstGeom prst="rect">
+            <a:avLst/>
+          </a:prstGeom>
         </p:spPr>
         <p:txBody>
           <a:bodyPr/>
@@ -4596,6 +4901,9 @@
             <a:off x="457200" y="1535113"/>
             <a:ext cx="4040188" cy="639762"/>
           </a:xfrm>
+          <a:prstGeom prst="rect">
+            <a:avLst/>
+          </a:prstGeom>
         </p:spPr>
         <p:txBody>
           <a:bodyPr anchor="b"/>
@@ -4661,6 +4969,9 @@
             <a:off x="457200" y="2174875"/>
             <a:ext cx="4040188" cy="3951288"/>
           </a:xfrm>
+          <a:prstGeom prst="rect">
+            <a:avLst/>
+          </a:prstGeom>
         </p:spPr>
         <p:txBody>
           <a:bodyPr/>
@@ -4746,6 +5057,9 @@
             <a:off x="4645025" y="1535113"/>
             <a:ext cx="4041775" cy="639762"/>
           </a:xfrm>
+          <a:prstGeom prst="rect">
+            <a:avLst/>
+          </a:prstGeom>
         </p:spPr>
         <p:txBody>
           <a:bodyPr anchor="b"/>
@@ -4811,6 +5125,9 @@
             <a:off x="4645025" y="2174875"/>
             <a:ext cx="4041775" cy="3951288"/>
           </a:xfrm>
+          <a:prstGeom prst="rect">
+            <a:avLst/>
+          </a:prstGeom>
         </p:spPr>
         <p:txBody>
           <a:bodyPr/>
@@ -4972,7 +5289,7 @@
 </file>
 
 <file path=ppt/slideLayouts/slideLayout9.xml><?xml version="1.0" encoding="utf-8"?>
-<p:sldLayout xmlns:a="http://schemas.openxmlformats.org/drawingml/2006/main" xmlns:r="http://schemas.openxmlformats.org/officeDocument/2006/relationships" xmlns:p="http://schemas.openxmlformats.org/presentationml/2006/main" type="titleOnly" preserve="1">
+<p:sldLayout xmlns:a="http://schemas.openxmlformats.org/drawingml/2006/main" xmlns:r="http://schemas.openxmlformats.org/officeDocument/2006/relationships" xmlns:p="http://schemas.openxmlformats.org/presentationml/2006/main" preserve="1" userDrawn="1">
   <p:cSld name="只有標題">
     <p:spTree>
       <p:nvGrpSpPr>
@@ -4990,29 +5307,6 @@
       </p:grpSpPr>
       <p:sp>
         <p:nvSpPr>
-          <p:cNvPr id="2" name="Title 1"/>
-          <p:cNvSpPr>
-            <a:spLocks noGrp="1"/>
-          </p:cNvSpPr>
-          <p:nvPr>
-            <p:ph type="title"/>
-          </p:nvPr>
-        </p:nvSpPr>
-        <p:spPr/>
-        <p:txBody>
-          <a:bodyPr/>
-          <a:lstStyle/>
-          <a:p>
-            <a:r>
-              <a:rPr lang="en-US" altLang="zh-TW"/>
-              <a:t>Click to edit Master title style</a:t>
-            </a:r>
-            <a:endParaRPr lang="en-US"/>
-          </a:p>
-        </p:txBody>
-      </p:sp>
-      <p:sp>
-        <p:nvSpPr>
           <p:cNvPr id="3" name="Date Placeholder 2"/>
           <p:cNvSpPr>
             <a:spLocks noGrp="1"/>
@@ -5084,6 +5378,40 @@
               <a:rPr lang="en-US" smtClean="0"/>
               <a:t>‹#›</a:t>
             </a:fld>
+            <a:endParaRPr lang="en-US"/>
+          </a:p>
+        </p:txBody>
+      </p:sp>
+      <p:sp>
+        <p:nvSpPr>
+          <p:cNvPr id="6" name="Title 1">
+            <a:extLst>
+              <a:ext uri="{FF2B5EF4-FFF2-40B4-BE49-F238E27FC236}">
+                <a16:creationId xmlns:a16="http://schemas.microsoft.com/office/drawing/2014/main" id="{4FA48DA0-6574-4D29-86D9-9F9641477335}"/>
+              </a:ext>
+            </a:extLst>
+          </p:cNvPr>
+          <p:cNvSpPr>
+            <a:spLocks noGrp="1"/>
+          </p:cNvSpPr>
+          <p:nvPr>
+            <p:ph type="title"/>
+          </p:nvPr>
+        </p:nvSpPr>
+        <p:spPr>
+          <a:xfrm>
+            <a:off x="457200" y="116633"/>
+            <a:ext cx="8229600" cy="792088"/>
+          </a:xfrm>
+        </p:spPr>
+        <p:txBody>
+          <a:bodyPr/>
+          <a:lstStyle/>
+          <a:p>
+            <a:r>
+              <a:rPr lang="zh-TW" altLang="en-US"/>
+              <a:t>按一下以編輯母片標題樣式</a:t>
+            </a:r>
             <a:endParaRPr lang="en-US"/>
           </a:p>
         </p:txBody>
@@ -5126,172 +5454,6 @@
           <a:chExt cx="0" cy="0"/>
         </a:xfrm>
       </p:grpSpPr>
-      <p:sp>
-        <p:nvSpPr>
-          <p:cNvPr id="15362" name="Rectangle 2"/>
-          <p:cNvSpPr>
-            <a:spLocks noGrp="1" noChangeArrowheads="1"/>
-          </p:cNvSpPr>
-          <p:nvPr>
-            <p:ph type="title"/>
-          </p:nvPr>
-        </p:nvSpPr>
-        <p:spPr bwMode="auto">
-          <a:xfrm>
-            <a:off x="457200" y="277813"/>
-            <a:ext cx="8229600" cy="1139825"/>
-          </a:xfrm>
-          <a:prstGeom prst="rect">
-            <a:avLst/>
-          </a:prstGeom>
-          <a:noFill/>
-          <a:ln>
-            <a:noFill/>
-          </a:ln>
-          <a:effectLst/>
-          <a:extLst>
-            <a:ext uri="{909E8E84-426E-40DD-AFC4-6F175D3DCCD1}">
-              <a14:hiddenFill xmlns:a14="http://schemas.microsoft.com/office/drawing/2010/main">
-                <a:solidFill>
-                  <a:schemeClr val="accent1"/>
-                </a:solidFill>
-              </a14:hiddenFill>
-            </a:ext>
-            <a:ext uri="{91240B29-F687-4F45-9708-019B960494DF}">
-              <a14:hiddenLine xmlns:a14="http://schemas.microsoft.com/office/drawing/2010/main" w="9525">
-                <a:solidFill>
-                  <a:schemeClr val="tx1"/>
-                </a:solidFill>
-                <a:miter lim="800000"/>
-                <a:headEnd/>
-                <a:tailEnd/>
-              </a14:hiddenLine>
-            </a:ext>
-            <a:ext uri="{AF507438-7753-43E0-B8FC-AC1667EBCBE1}">
-              <a14:hiddenEffects xmlns:a14="http://schemas.microsoft.com/office/drawing/2010/main">
-                <a:effectLst>
-                  <a:outerShdw dist="35921" dir="2700000" algn="ctr" rotWithShape="0">
-                    <a:schemeClr val="bg2"/>
-                  </a:outerShdw>
-                </a:effectLst>
-              </a14:hiddenEffects>
-            </a:ext>
-          </a:extLst>
-        </p:spPr>
-        <p:txBody>
-          <a:bodyPr vert="horz" wrap="square" lIns="91440" tIns="45720" rIns="91440" bIns="45720" numCol="1" anchor="b" anchorCtr="0" compatLnSpc="1">
-            <a:prstTxWarp prst="textNoShape">
-              <a:avLst/>
-            </a:prstTxWarp>
-          </a:bodyPr>
-          <a:lstStyle/>
-          <a:p>
-            <a:pPr lvl="0"/>
-            <a:r>
-              <a:rPr lang="zh-TW" altLang="en-US" dirty="0"/>
-              <a:t>按一下以編輯母片標題樣式</a:t>
-            </a:r>
-            <a:endParaRPr lang="en-US" dirty="0"/>
-          </a:p>
-        </p:txBody>
-      </p:sp>
-      <p:sp>
-        <p:nvSpPr>
-          <p:cNvPr id="15363" name="Rectangle 3"/>
-          <p:cNvSpPr>
-            <a:spLocks noGrp="1" noChangeArrowheads="1"/>
-          </p:cNvSpPr>
-          <p:nvPr>
-            <p:ph type="body" idx="1"/>
-          </p:nvPr>
-        </p:nvSpPr>
-        <p:spPr bwMode="auto">
-          <a:xfrm>
-            <a:off x="457200" y="1600200"/>
-            <a:ext cx="8229600" cy="4530725"/>
-          </a:xfrm>
-          <a:prstGeom prst="rect">
-            <a:avLst/>
-          </a:prstGeom>
-          <a:noFill/>
-          <a:ln>
-            <a:noFill/>
-          </a:ln>
-          <a:effectLst/>
-          <a:extLst>
-            <a:ext uri="{909E8E84-426E-40DD-AFC4-6F175D3DCCD1}">
-              <a14:hiddenFill xmlns:a14="http://schemas.microsoft.com/office/drawing/2010/main">
-                <a:solidFill>
-                  <a:schemeClr val="accent1"/>
-                </a:solidFill>
-              </a14:hiddenFill>
-            </a:ext>
-            <a:ext uri="{91240B29-F687-4F45-9708-019B960494DF}">
-              <a14:hiddenLine xmlns:a14="http://schemas.microsoft.com/office/drawing/2010/main" w="9525">
-                <a:solidFill>
-                  <a:schemeClr val="tx1"/>
-                </a:solidFill>
-                <a:miter lim="800000"/>
-                <a:headEnd/>
-                <a:tailEnd/>
-              </a14:hiddenLine>
-            </a:ext>
-            <a:ext uri="{AF507438-7753-43E0-B8FC-AC1667EBCBE1}">
-              <a14:hiddenEffects xmlns:a14="http://schemas.microsoft.com/office/drawing/2010/main">
-                <a:effectLst>
-                  <a:outerShdw dist="35921" dir="2700000" algn="ctr" rotWithShape="0">
-                    <a:schemeClr val="bg2"/>
-                  </a:outerShdw>
-                </a:effectLst>
-              </a14:hiddenEffects>
-            </a:ext>
-          </a:extLst>
-        </p:spPr>
-        <p:txBody>
-          <a:bodyPr vert="horz" wrap="square" lIns="91440" tIns="45720" rIns="91440" bIns="45720" numCol="1" anchor="t" anchorCtr="0" compatLnSpc="1">
-            <a:prstTxWarp prst="textNoShape">
-              <a:avLst/>
-            </a:prstTxWarp>
-          </a:bodyPr>
-          <a:lstStyle/>
-          <a:p>
-            <a:pPr lvl="0"/>
-            <a:r>
-              <a:rPr lang="zh-TW" altLang="en-US" dirty="0"/>
-              <a:t>按一下以編輯母片文字樣式</a:t>
-            </a:r>
-          </a:p>
-          <a:p>
-            <a:pPr lvl="1"/>
-            <a:r>
-              <a:rPr lang="zh-TW" altLang="en-US" dirty="0"/>
-              <a:t>第二層</a:t>
-            </a:r>
-          </a:p>
-          <a:p>
-            <a:pPr lvl="2"/>
-            <a:r>
-              <a:rPr lang="zh-TW" altLang="en-US" dirty="0"/>
-              <a:t>第三層</a:t>
-            </a:r>
-          </a:p>
-          <a:p>
-            <a:pPr lvl="3"/>
-            <a:r>
-              <a:rPr lang="zh-TW" altLang="en-US" dirty="0"/>
-              <a:t>第四層</a:t>
-            </a:r>
-          </a:p>
-          <a:p>
-            <a:pPr lvl="4"/>
-            <a:r>
-              <a:rPr lang="zh-TW" altLang="en-US" dirty="0"/>
-              <a:t>第五層</a:t>
-            </a:r>
-            <a:endParaRPr lang="en-US" dirty="0"/>
-          </a:p>
-        </p:txBody>
-      </p:sp>
       <p:sp>
         <p:nvSpPr>
           <p:cNvPr id="15364" name="Rectangle 4"/>
@@ -5562,57 +5724,6 @@
       </p:sp>
       <p:sp>
         <p:nvSpPr>
-          <p:cNvPr id="15368" name="Line 8"/>
-          <p:cNvSpPr>
-            <a:spLocks noChangeShapeType="1"/>
-          </p:cNvSpPr>
-          <p:nvPr/>
-        </p:nvSpPr>
-        <p:spPr bwMode="auto">
-          <a:xfrm>
-            <a:off x="457200" y="1447800"/>
-            <a:ext cx="8077200" cy="0"/>
-          </a:xfrm>
-          <a:prstGeom prst="line">
-            <a:avLst/>
-          </a:prstGeom>
-          <a:noFill/>
-          <a:ln w="19050">
-            <a:solidFill>
-              <a:schemeClr val="tx2"/>
-            </a:solidFill>
-            <a:round/>
-            <a:headEnd/>
-            <a:tailEnd/>
-          </a:ln>
-          <a:effectLst/>
-          <a:extLst>
-            <a:ext uri="{909E8E84-426E-40DD-AFC4-6F175D3DCCD1}">
-              <a14:hiddenFill xmlns:a14="http://schemas.microsoft.com/office/drawing/2010/main">
-                <a:noFill/>
-              </a14:hiddenFill>
-            </a:ext>
-            <a:ext uri="{AF507438-7753-43E0-B8FC-AC1667EBCBE1}">
-              <a14:hiddenEffects xmlns:a14="http://schemas.microsoft.com/office/drawing/2010/main">
-                <a:effectLst>
-                  <a:outerShdw dist="35921" dir="2700000" algn="ctr" rotWithShape="0">
-                    <a:schemeClr val="bg2"/>
-                  </a:outerShdw>
-                </a:effectLst>
-              </a14:hiddenEffects>
-            </a:ext>
-          </a:extLst>
-        </p:spPr>
-        <p:txBody>
-          <a:bodyPr/>
-          <a:lstStyle/>
-          <a:p>
-            <a:endParaRPr lang="en-US"/>
-          </a:p>
-        </p:txBody>
-      </p:sp>
-      <p:sp>
-        <p:nvSpPr>
           <p:cNvPr id="15369" name="Rectangle 9" descr="Orange bar"/>
           <p:cNvSpPr>
             <a:spLocks noChangeArrowheads="1"/>
@@ -5720,6 +5831,241 @@
             <a:endParaRPr lang="en-US" sz="2400">
               <a:latin typeface="Times New Roman" pitchFamily="18" charset="0"/>
             </a:endParaRPr>
+          </a:p>
+        </p:txBody>
+      </p:sp>
+      <p:sp>
+        <p:nvSpPr>
+          <p:cNvPr id="11" name="Line 8">
+            <a:extLst>
+              <a:ext uri="{FF2B5EF4-FFF2-40B4-BE49-F238E27FC236}">
+                <a16:creationId xmlns:a16="http://schemas.microsoft.com/office/drawing/2014/main" id="{D716EBBB-2029-46AB-9536-AAE61F026E91}"/>
+              </a:ext>
+            </a:extLst>
+          </p:cNvPr>
+          <p:cNvSpPr>
+            <a:spLocks noChangeShapeType="1"/>
+          </p:cNvSpPr>
+          <p:nvPr userDrawn="1"/>
+        </p:nvSpPr>
+        <p:spPr bwMode="auto">
+          <a:xfrm>
+            <a:off x="395536" y="908720"/>
+            <a:ext cx="8077200" cy="0"/>
+          </a:xfrm>
+          <a:prstGeom prst="line">
+            <a:avLst/>
+          </a:prstGeom>
+          <a:noFill/>
+          <a:ln w="19050">
+            <a:solidFill>
+              <a:schemeClr val="tx2"/>
+            </a:solidFill>
+            <a:round/>
+            <a:headEnd/>
+            <a:tailEnd/>
+          </a:ln>
+          <a:effectLst/>
+          <a:extLst>
+            <a:ext uri="{909E8E84-426E-40DD-AFC4-6F175D3DCCD1}">
+              <a14:hiddenFill xmlns:a14="http://schemas.microsoft.com/office/drawing/2010/main">
+                <a:noFill/>
+              </a14:hiddenFill>
+            </a:ext>
+            <a:ext uri="{AF507438-7753-43E0-B8FC-AC1667EBCBE1}">
+              <a14:hiddenEffects xmlns:a14="http://schemas.microsoft.com/office/drawing/2010/main">
+                <a:effectLst>
+                  <a:outerShdw dist="35921" dir="2700000" algn="ctr" rotWithShape="0">
+                    <a:schemeClr val="bg2"/>
+                  </a:outerShdw>
+                </a:effectLst>
+              </a14:hiddenEffects>
+            </a:ext>
+          </a:extLst>
+        </p:spPr>
+        <p:txBody>
+          <a:bodyPr/>
+          <a:lstStyle/>
+          <a:p>
+            <a:endParaRPr lang="en-US"/>
+          </a:p>
+        </p:txBody>
+      </p:sp>
+      <p:sp>
+        <p:nvSpPr>
+          <p:cNvPr id="12" name="Rectangle 2">
+            <a:extLst>
+              <a:ext uri="{FF2B5EF4-FFF2-40B4-BE49-F238E27FC236}">
+                <a16:creationId xmlns:a16="http://schemas.microsoft.com/office/drawing/2014/main" id="{5E80AC26-2292-4FF2-8E3A-D103A435D4C3}"/>
+              </a:ext>
+            </a:extLst>
+          </p:cNvPr>
+          <p:cNvSpPr>
+            <a:spLocks noGrp="1" noChangeArrowheads="1"/>
+          </p:cNvSpPr>
+          <p:nvPr>
+            <p:ph type="title"/>
+          </p:nvPr>
+        </p:nvSpPr>
+        <p:spPr bwMode="auto">
+          <a:xfrm>
+            <a:off x="457200" y="116633"/>
+            <a:ext cx="8229600" cy="792088"/>
+          </a:xfrm>
+          <a:prstGeom prst="rect">
+            <a:avLst/>
+          </a:prstGeom>
+          <a:noFill/>
+          <a:ln>
+            <a:noFill/>
+          </a:ln>
+          <a:effectLst/>
+          <a:extLst>
+            <a:ext uri="{909E8E84-426E-40DD-AFC4-6F175D3DCCD1}">
+              <a14:hiddenFill xmlns:a14="http://schemas.microsoft.com/office/drawing/2010/main">
+                <a:solidFill>
+                  <a:schemeClr val="accent1"/>
+                </a:solidFill>
+              </a14:hiddenFill>
+            </a:ext>
+            <a:ext uri="{91240B29-F687-4F45-9708-019B960494DF}">
+              <a14:hiddenLine xmlns:a14="http://schemas.microsoft.com/office/drawing/2010/main" w="9525">
+                <a:solidFill>
+                  <a:schemeClr val="tx1"/>
+                </a:solidFill>
+                <a:miter lim="800000"/>
+                <a:headEnd/>
+                <a:tailEnd/>
+              </a14:hiddenLine>
+            </a:ext>
+            <a:ext uri="{AF507438-7753-43E0-B8FC-AC1667EBCBE1}">
+              <a14:hiddenEffects xmlns:a14="http://schemas.microsoft.com/office/drawing/2010/main">
+                <a:effectLst>
+                  <a:outerShdw dist="35921" dir="2700000" algn="ctr" rotWithShape="0">
+                    <a:schemeClr val="bg2"/>
+                  </a:outerShdw>
+                </a:effectLst>
+              </a14:hiddenEffects>
+            </a:ext>
+          </a:extLst>
+        </p:spPr>
+        <p:txBody>
+          <a:bodyPr vert="horz" wrap="square" lIns="91440" tIns="45720" rIns="91440" bIns="45720" numCol="1" anchor="b" anchorCtr="0" compatLnSpc="1">
+            <a:prstTxWarp prst="textNoShape">
+              <a:avLst/>
+            </a:prstTxWarp>
+          </a:bodyPr>
+          <a:lstStyle/>
+          <a:p>
+            <a:pPr lvl="0"/>
+            <a:r>
+              <a:rPr lang="zh-TW" altLang="en-US" dirty="0"/>
+              <a:t>按一下以編輯母片標題樣式</a:t>
+            </a:r>
+            <a:endParaRPr lang="en-US" dirty="0"/>
+          </a:p>
+        </p:txBody>
+      </p:sp>
+      <p:sp>
+        <p:nvSpPr>
+          <p:cNvPr id="13" name="Rectangle 3">
+            <a:extLst>
+              <a:ext uri="{FF2B5EF4-FFF2-40B4-BE49-F238E27FC236}">
+                <a16:creationId xmlns:a16="http://schemas.microsoft.com/office/drawing/2014/main" id="{0D7A6E2F-00D1-4D6F-9A6C-316CF984C62A}"/>
+              </a:ext>
+            </a:extLst>
+          </p:cNvPr>
+          <p:cNvSpPr>
+            <a:spLocks noGrp="1" noChangeArrowheads="1"/>
+          </p:cNvSpPr>
+          <p:nvPr>
+            <p:ph type="body" idx="1"/>
+          </p:nvPr>
+        </p:nvSpPr>
+        <p:spPr bwMode="auto">
+          <a:xfrm>
+            <a:off x="457200" y="980728"/>
+            <a:ext cx="8229600" cy="5150197"/>
+          </a:xfrm>
+          <a:prstGeom prst="rect">
+            <a:avLst/>
+          </a:prstGeom>
+          <a:noFill/>
+          <a:ln>
+            <a:noFill/>
+          </a:ln>
+          <a:effectLst/>
+          <a:extLst>
+            <a:ext uri="{909E8E84-426E-40DD-AFC4-6F175D3DCCD1}">
+              <a14:hiddenFill xmlns:a14="http://schemas.microsoft.com/office/drawing/2010/main">
+                <a:solidFill>
+                  <a:schemeClr val="accent1"/>
+                </a:solidFill>
+              </a14:hiddenFill>
+            </a:ext>
+            <a:ext uri="{91240B29-F687-4F45-9708-019B960494DF}">
+              <a14:hiddenLine xmlns:a14="http://schemas.microsoft.com/office/drawing/2010/main" w="9525">
+                <a:solidFill>
+                  <a:schemeClr val="tx1"/>
+                </a:solidFill>
+                <a:miter lim="800000"/>
+                <a:headEnd/>
+                <a:tailEnd/>
+              </a14:hiddenLine>
+            </a:ext>
+            <a:ext uri="{AF507438-7753-43E0-B8FC-AC1667EBCBE1}">
+              <a14:hiddenEffects xmlns:a14="http://schemas.microsoft.com/office/drawing/2010/main">
+                <a:effectLst>
+                  <a:outerShdw dist="35921" dir="2700000" algn="ctr" rotWithShape="0">
+                    <a:schemeClr val="bg2"/>
+                  </a:outerShdw>
+                </a:effectLst>
+              </a14:hiddenEffects>
+            </a:ext>
+          </a:extLst>
+        </p:spPr>
+        <p:txBody>
+          <a:bodyPr vert="horz" wrap="square" lIns="91440" tIns="45720" rIns="91440" bIns="45720" numCol="1" anchor="t" anchorCtr="0" compatLnSpc="1">
+            <a:prstTxWarp prst="textNoShape">
+              <a:avLst/>
+            </a:prstTxWarp>
+          </a:bodyPr>
+          <a:lstStyle/>
+          <a:p>
+            <a:pPr lvl="0"/>
+            <a:r>
+              <a:rPr lang="zh-TW" altLang="en-US" dirty="0"/>
+              <a:t>按一下以編輯母片文字樣式</a:t>
+            </a:r>
+          </a:p>
+          <a:p>
+            <a:pPr lvl="1"/>
+            <a:r>
+              <a:rPr lang="zh-TW" altLang="en-US" dirty="0"/>
+              <a:t>第二層</a:t>
+            </a:r>
+          </a:p>
+          <a:p>
+            <a:pPr lvl="2"/>
+            <a:r>
+              <a:rPr lang="zh-TW" altLang="en-US" dirty="0"/>
+              <a:t>第三層</a:t>
+            </a:r>
+          </a:p>
+          <a:p>
+            <a:pPr lvl="3"/>
+            <a:r>
+              <a:rPr lang="zh-TW" altLang="en-US" dirty="0"/>
+              <a:t>第四層</a:t>
+            </a:r>
+          </a:p>
+          <a:p>
+            <a:pPr lvl="4"/>
+            <a:r>
+              <a:rPr lang="zh-TW" altLang="en-US" dirty="0"/>
+              <a:t>第五層</a:t>
+            </a:r>
+            <a:endParaRPr lang="en-US" dirty="0"/>
           </a:p>
         </p:txBody>
       </p:sp>
@@ -6265,10 +6611,10 @@
       </p:grpSpPr>
       <p:sp>
         <p:nvSpPr>
-          <p:cNvPr id="5" name="Title 4">
+          <p:cNvPr id="2" name="Title 1">
             <a:extLst>
               <a:ext uri="{FF2B5EF4-FFF2-40B4-BE49-F238E27FC236}">
-                <a16:creationId xmlns:a16="http://schemas.microsoft.com/office/drawing/2014/main" id="{648E6F83-A0E3-42C4-A32B-E38810AEDD6A}"/>
+                <a16:creationId xmlns:a16="http://schemas.microsoft.com/office/drawing/2014/main" id="{5FE380D2-B97E-42F1-8F17-DFBDF4001072}"/>
               </a:ext>
             </a:extLst>
           </p:cNvPr>
@@ -6290,10 +6636,10 @@
       </p:sp>
       <p:sp>
         <p:nvSpPr>
-          <p:cNvPr id="6" name="Content Placeholder 5">
+          <p:cNvPr id="3" name="Content Placeholder 2">
             <a:extLst>
               <a:ext uri="{FF2B5EF4-FFF2-40B4-BE49-F238E27FC236}">
-                <a16:creationId xmlns:a16="http://schemas.microsoft.com/office/drawing/2014/main" id="{42B3B4AD-2EA0-4969-A183-69F15BF76F66}"/>
+                <a16:creationId xmlns:a16="http://schemas.microsoft.com/office/drawing/2014/main" id="{74CF3367-EF47-45F1-87D5-6A2A8446563C}"/>
               </a:ext>
             </a:extLst>
           </p:cNvPr>

</xml_diff>